<commit_message>
setup for portfolio-ready refactor: requirements.txt, README initial rewrite, etc.
</commit_message>
<xml_diff>
--- a/Mjolnir Group Presentation.pptx
+++ b/Mjolnir Group Presentation.pptx
@@ -119,16 +119,32 @@
 </p:presentation>
 </file>
 
-<file path=ppt/revisionInfo.xml><?xml version="1.0" encoding="utf-8"?>
-<p1510:revInfo xmlns:a="http://schemas.openxmlformats.org/drawingml/2006/main" xmlns:r="http://schemas.openxmlformats.org/officeDocument/2006/relationships" xmlns:p1510="http://schemas.microsoft.com/office/powerpoint/2015/10/main">
-  <p1510:revLst>
-    <p1510:client id="{586575FD-DEAD-44B2-9EB4-1FA0B1A76B65}" v="715" dt="2025-07-14T12:49:00.676"/>
-  </p1510:revLst>
-</p1510:revInfo>
-</file>
-
 <file path=ppt/changesInfos/changesInfo1.xml><?xml version="1.0" encoding="utf-8"?>
 <pc:chgInfo xmlns:a="http://schemas.openxmlformats.org/drawingml/2006/main" xmlns:r="http://schemas.openxmlformats.org/officeDocument/2006/relationships" xmlns:ac="http://schemas.microsoft.com/office/drawing/2013/main/command" xmlns:pc="http://schemas.microsoft.com/office/powerpoint/2013/main/command">
+  <pc:docChgLst>
+    <pc:chgData name="Joshua Stuckey" userId="5c960db8-adfa-4945-862f-e1da102aa351" providerId="ADAL" clId="{CEBB8238-ECCC-4DBE-90EB-E72065F98E61}"/>
+    <pc:docChg chg="modSld">
+      <pc:chgData name="Joshua Stuckey" userId="5c960db8-adfa-4945-862f-e1da102aa351" providerId="ADAL" clId="{CEBB8238-ECCC-4DBE-90EB-E72065F98E61}" dt="2025-09-09T14:55:19.474" v="15" actId="20577"/>
+      <pc:docMkLst>
+        <pc:docMk/>
+      </pc:docMkLst>
+      <pc:sldChg chg="modSp mod">
+        <pc:chgData name="Joshua Stuckey" userId="5c960db8-adfa-4945-862f-e1da102aa351" providerId="ADAL" clId="{CEBB8238-ECCC-4DBE-90EB-E72065F98E61}" dt="2025-09-09T14:55:19.474" v="15" actId="20577"/>
+        <pc:sldMkLst>
+          <pc:docMk/>
+          <pc:sldMk cId="485914459" sldId="257"/>
+        </pc:sldMkLst>
+        <pc:spChg chg="mod">
+          <ac:chgData name="Joshua Stuckey" userId="5c960db8-adfa-4945-862f-e1da102aa351" providerId="ADAL" clId="{CEBB8238-ECCC-4DBE-90EB-E72065F98E61}" dt="2025-09-09T14:55:19.474" v="15" actId="20577"/>
+          <ac:spMkLst>
+            <pc:docMk/>
+            <pc:sldMk cId="485914459" sldId="257"/>
+            <ac:spMk id="3" creationId="{8F762D15-7855-7B10-B554-9C7FB7CCD43C}"/>
+          </ac:spMkLst>
+        </pc:spChg>
+      </pc:sldChg>
+    </pc:docChg>
+  </pc:docChgLst>
   <pc:docChgLst>
     <pc:chgData name="Joshua Stuckey" userId="5c960db8-adfa-4945-862f-e1da102aa351" providerId="ADAL" clId="{586575FD-DEAD-44B2-9EB4-1FA0B1A76B65}"/>
     <pc:docChg chg="undo custSel addSld delSld modSld">
@@ -142,62 +158,6 @@
           <pc:docMk/>
           <pc:sldMk cId="109857222" sldId="256"/>
         </pc:sldMkLst>
-        <pc:spChg chg="mod">
-          <ac:chgData name="Joshua Stuckey" userId="5c960db8-adfa-4945-862f-e1da102aa351" providerId="ADAL" clId="{586575FD-DEAD-44B2-9EB4-1FA0B1A76B65}" dt="2025-07-10T17:24:46.107" v="328" actId="26606"/>
-          <ac:spMkLst>
-            <pc:docMk/>
-            <pc:sldMk cId="109857222" sldId="256"/>
-            <ac:spMk id="2" creationId="{00000000-0000-0000-0000-000000000000}"/>
-          </ac:spMkLst>
-        </pc:spChg>
-        <pc:spChg chg="mod">
-          <ac:chgData name="Joshua Stuckey" userId="5c960db8-adfa-4945-862f-e1da102aa351" providerId="ADAL" clId="{586575FD-DEAD-44B2-9EB4-1FA0B1A76B65}" dt="2025-07-10T17:24:46.107" v="328" actId="26606"/>
-          <ac:spMkLst>
-            <pc:docMk/>
-            <pc:sldMk cId="109857222" sldId="256"/>
-            <ac:spMk id="3" creationId="{00000000-0000-0000-0000-000000000000}"/>
-          </ac:spMkLst>
-        </pc:spChg>
-        <pc:spChg chg="add">
-          <ac:chgData name="Joshua Stuckey" userId="5c960db8-adfa-4945-862f-e1da102aa351" providerId="ADAL" clId="{586575FD-DEAD-44B2-9EB4-1FA0B1A76B65}" dt="2025-07-10T17:24:46.107" v="328" actId="26606"/>
-          <ac:spMkLst>
-            <pc:docMk/>
-            <pc:sldMk cId="109857222" sldId="256"/>
-            <ac:spMk id="8" creationId="{1BE7BD64-C268-4BE6-8D67-F5DD171F0154}"/>
-          </ac:spMkLst>
-        </pc:spChg>
-        <pc:spChg chg="add">
-          <ac:chgData name="Joshua Stuckey" userId="5c960db8-adfa-4945-862f-e1da102aa351" providerId="ADAL" clId="{586575FD-DEAD-44B2-9EB4-1FA0B1A76B65}" dt="2025-07-10T17:24:46.107" v="328" actId="26606"/>
-          <ac:spMkLst>
-            <pc:docMk/>
-            <pc:sldMk cId="109857222" sldId="256"/>
-            <ac:spMk id="16" creationId="{57E6F9A8-1B4B-4FEF-942A-15CA97ECE0BA}"/>
-          </ac:spMkLst>
-        </pc:spChg>
-        <pc:picChg chg="add">
-          <ac:chgData name="Joshua Stuckey" userId="5c960db8-adfa-4945-862f-e1da102aa351" providerId="ADAL" clId="{586575FD-DEAD-44B2-9EB4-1FA0B1A76B65}" dt="2025-07-10T17:24:46.107" v="328" actId="26606"/>
-          <ac:picMkLst>
-            <pc:docMk/>
-            <pc:sldMk cId="109857222" sldId="256"/>
-            <ac:picMk id="10" creationId="{7D6C6E9A-567D-4054-B920-2E1BAF6D2426}"/>
-          </ac:picMkLst>
-        </pc:picChg>
-        <pc:picChg chg="add">
-          <ac:chgData name="Joshua Stuckey" userId="5c960db8-adfa-4945-862f-e1da102aa351" providerId="ADAL" clId="{586575FD-DEAD-44B2-9EB4-1FA0B1A76B65}" dt="2025-07-10T17:24:46.107" v="328" actId="26606"/>
-          <ac:picMkLst>
-            <pc:docMk/>
-            <pc:sldMk cId="109857222" sldId="256"/>
-            <ac:picMk id="12" creationId="{94164FB2-EFB1-4531-A8F4-DD77A03E2CCB}"/>
-          </ac:picMkLst>
-        </pc:picChg>
-        <pc:picChg chg="add">
-          <ac:chgData name="Joshua Stuckey" userId="5c960db8-adfa-4945-862f-e1da102aa351" providerId="ADAL" clId="{586575FD-DEAD-44B2-9EB4-1FA0B1A76B65}" dt="2025-07-10T17:24:46.107" v="328" actId="26606"/>
-          <ac:picMkLst>
-            <pc:docMk/>
-            <pc:sldMk cId="109857222" sldId="256"/>
-            <ac:picMk id="14" creationId="{0E6BC652-4BE1-478A-BFA7-47149E82F2F1}"/>
-          </ac:picMkLst>
-        </pc:picChg>
       </pc:sldChg>
       <pc:sldChg chg="addSp delSp modSp new mod setBg setClrOvrMap">
         <pc:chgData name="Joshua Stuckey" userId="5c960db8-adfa-4945-862f-e1da102aa351" providerId="ADAL" clId="{586575FD-DEAD-44B2-9EB4-1FA0B1A76B65}" dt="2025-07-14T12:07:59.937" v="2027" actId="20577"/>
@@ -205,78 +165,6 @@
           <pc:docMk/>
           <pc:sldMk cId="485914459" sldId="257"/>
         </pc:sldMkLst>
-        <pc:spChg chg="mod">
-          <ac:chgData name="Joshua Stuckey" userId="5c960db8-adfa-4945-862f-e1da102aa351" providerId="ADAL" clId="{586575FD-DEAD-44B2-9EB4-1FA0B1A76B65}" dt="2025-07-10T17:23:42.850" v="324" actId="26606"/>
-          <ac:spMkLst>
-            <pc:docMk/>
-            <pc:sldMk cId="485914459" sldId="257"/>
-            <ac:spMk id="2" creationId="{90A09361-4DE4-90F5-BD95-FD9CE4995BCC}"/>
-          </ac:spMkLst>
-        </pc:spChg>
-        <pc:spChg chg="mod">
-          <ac:chgData name="Joshua Stuckey" userId="5c960db8-adfa-4945-862f-e1da102aa351" providerId="ADAL" clId="{586575FD-DEAD-44B2-9EB4-1FA0B1A76B65}" dt="2025-07-14T12:07:59.937" v="2027" actId="20577"/>
-          <ac:spMkLst>
-            <pc:docMk/>
-            <pc:sldMk cId="485914459" sldId="257"/>
-            <ac:spMk id="3" creationId="{8F762D15-7855-7B10-B554-9C7FB7CCD43C}"/>
-          </ac:spMkLst>
-        </pc:spChg>
-        <pc:spChg chg="add">
-          <ac:chgData name="Joshua Stuckey" userId="5c960db8-adfa-4945-862f-e1da102aa351" providerId="ADAL" clId="{586575FD-DEAD-44B2-9EB4-1FA0B1A76B65}" dt="2025-07-14T11:52:15.281" v="1812"/>
-          <ac:spMkLst>
-            <pc:docMk/>
-            <pc:sldMk cId="485914459" sldId="257"/>
-            <ac:spMk id="4" creationId="{3D291535-D6C4-4294-47F1-150602DFAE54}"/>
-          </ac:spMkLst>
-        </pc:spChg>
-        <pc:spChg chg="add">
-          <ac:chgData name="Joshua Stuckey" userId="5c960db8-adfa-4945-862f-e1da102aa351" providerId="ADAL" clId="{586575FD-DEAD-44B2-9EB4-1FA0B1A76B65}" dt="2025-07-14T11:52:39.600" v="1813"/>
-          <ac:spMkLst>
-            <pc:docMk/>
-            <pc:sldMk cId="485914459" sldId="257"/>
-            <ac:spMk id="5" creationId="{D2CFD222-96BE-D6FD-3AE7-BFFCF8D87095}"/>
-          </ac:spMkLst>
-        </pc:spChg>
-        <pc:spChg chg="add del">
-          <ac:chgData name="Joshua Stuckey" userId="5c960db8-adfa-4945-862f-e1da102aa351" providerId="ADAL" clId="{586575FD-DEAD-44B2-9EB4-1FA0B1A76B65}" dt="2025-07-14T11:52:56.679" v="1817" actId="478"/>
-          <ac:spMkLst>
-            <pc:docMk/>
-            <pc:sldMk cId="485914459" sldId="257"/>
-            <ac:spMk id="6" creationId="{39E80631-BA91-BB9B-5C8B-D3DEE88E730A}"/>
-          </ac:spMkLst>
-        </pc:spChg>
-        <pc:spChg chg="add">
-          <ac:chgData name="Joshua Stuckey" userId="5c960db8-adfa-4945-862f-e1da102aa351" providerId="ADAL" clId="{586575FD-DEAD-44B2-9EB4-1FA0B1A76B65}" dt="2025-07-10T17:23:42.850" v="324" actId="26606"/>
-          <ac:spMkLst>
-            <pc:docMk/>
-            <pc:sldMk cId="485914459" sldId="257"/>
-            <ac:spMk id="8" creationId="{E1EB41F2-E181-4D4D-9131-A30F6B0AE596}"/>
-          </ac:spMkLst>
-        </pc:spChg>
-        <pc:spChg chg="add">
-          <ac:chgData name="Joshua Stuckey" userId="5c960db8-adfa-4945-862f-e1da102aa351" providerId="ADAL" clId="{586575FD-DEAD-44B2-9EB4-1FA0B1A76B65}" dt="2025-07-10T17:23:42.850" v="324" actId="26606"/>
-          <ac:spMkLst>
-            <pc:docMk/>
-            <pc:sldMk cId="485914459" sldId="257"/>
-            <ac:spMk id="10" creationId="{3D63CC92-C517-4C71-9222-4579252CD62E}"/>
-          </ac:spMkLst>
-        </pc:spChg>
-        <pc:picChg chg="add">
-          <ac:chgData name="Joshua Stuckey" userId="5c960db8-adfa-4945-862f-e1da102aa351" providerId="ADAL" clId="{586575FD-DEAD-44B2-9EB4-1FA0B1A76B65}" dt="2025-07-10T17:23:42.850" v="324" actId="26606"/>
-          <ac:picMkLst>
-            <pc:docMk/>
-            <pc:sldMk cId="485914459" sldId="257"/>
-            <ac:picMk id="12" creationId="{40A39FDC-39F4-4CB7-873B-8D786EC02516}"/>
-          </ac:picMkLst>
-        </pc:picChg>
-        <pc:picChg chg="add mod">
-          <ac:chgData name="Joshua Stuckey" userId="5c960db8-adfa-4945-862f-e1da102aa351" providerId="ADAL" clId="{586575FD-DEAD-44B2-9EB4-1FA0B1A76B65}" dt="2025-07-14T11:56:30.334" v="2002" actId="14100"/>
-          <ac:picMkLst>
-            <pc:docMk/>
-            <pc:sldMk cId="485914459" sldId="257"/>
-            <ac:picMk id="1029" creationId="{3DC582AE-0A77-FB06-C5A5-408CFE2B9FBB}"/>
-          </ac:picMkLst>
-        </pc:picChg>
       </pc:sldChg>
       <pc:sldChg chg="addSp delSp modSp new mod setBg setClrOvrMap">
         <pc:chgData name="Joshua Stuckey" userId="5c960db8-adfa-4945-862f-e1da102aa351" providerId="ADAL" clId="{586575FD-DEAD-44B2-9EB4-1FA0B1A76B65}" dt="2025-07-14T11:56:54.387" v="2005" actId="12100"/>
@@ -284,54 +172,6 @@
           <pc:docMk/>
           <pc:sldMk cId="3867904348" sldId="258"/>
         </pc:sldMkLst>
-        <pc:spChg chg="mod">
-          <ac:chgData name="Joshua Stuckey" userId="5c960db8-adfa-4945-862f-e1da102aa351" providerId="ADAL" clId="{586575FD-DEAD-44B2-9EB4-1FA0B1A76B65}" dt="2025-07-10T17:24:56.863" v="329" actId="26606"/>
-          <ac:spMkLst>
-            <pc:docMk/>
-            <pc:sldMk cId="3867904348" sldId="258"/>
-            <ac:spMk id="2" creationId="{4A702E90-10A7-1BE4-E42E-F7CD0912E95E}"/>
-          </ac:spMkLst>
-        </pc:spChg>
-        <pc:spChg chg="del mod">
-          <ac:chgData name="Joshua Stuckey" userId="5c960db8-adfa-4945-862f-e1da102aa351" providerId="ADAL" clId="{586575FD-DEAD-44B2-9EB4-1FA0B1A76B65}" dt="2025-07-14T11:37:14.174" v="444" actId="1032"/>
-          <ac:spMkLst>
-            <pc:docMk/>
-            <pc:sldMk cId="3867904348" sldId="258"/>
-            <ac:spMk id="3" creationId="{3E9D51FB-6556-D20E-BDF8-2C65F7272ADF}"/>
-          </ac:spMkLst>
-        </pc:spChg>
-        <pc:spChg chg="add">
-          <ac:chgData name="Joshua Stuckey" userId="5c960db8-adfa-4945-862f-e1da102aa351" providerId="ADAL" clId="{586575FD-DEAD-44B2-9EB4-1FA0B1A76B65}" dt="2025-07-10T17:24:56.863" v="329" actId="26606"/>
-          <ac:spMkLst>
-            <pc:docMk/>
-            <pc:sldMk cId="3867904348" sldId="258"/>
-            <ac:spMk id="22" creationId="{E1EB41F2-E181-4D4D-9131-A30F6B0AE596}"/>
-          </ac:spMkLst>
-        </pc:spChg>
-        <pc:spChg chg="add">
-          <ac:chgData name="Joshua Stuckey" userId="5c960db8-adfa-4945-862f-e1da102aa351" providerId="ADAL" clId="{586575FD-DEAD-44B2-9EB4-1FA0B1A76B65}" dt="2025-07-10T17:24:56.863" v="329" actId="26606"/>
-          <ac:spMkLst>
-            <pc:docMk/>
-            <pc:sldMk cId="3867904348" sldId="258"/>
-            <ac:spMk id="24" creationId="{3D63CC92-C517-4C71-9222-4579252CD62E}"/>
-          </ac:spMkLst>
-        </pc:spChg>
-        <pc:graphicFrameChg chg="add mod modGraphic">
-          <ac:chgData name="Joshua Stuckey" userId="5c960db8-adfa-4945-862f-e1da102aa351" providerId="ADAL" clId="{586575FD-DEAD-44B2-9EB4-1FA0B1A76B65}" dt="2025-07-14T11:56:54.387" v="2005" actId="12100"/>
-          <ac:graphicFrameMkLst>
-            <pc:docMk/>
-            <pc:sldMk cId="3867904348" sldId="258"/>
-            <ac:graphicFrameMk id="4" creationId="{57BC6CE4-E4B4-9384-0470-3EC55E2A3F9C}"/>
-          </ac:graphicFrameMkLst>
-        </pc:graphicFrameChg>
-        <pc:picChg chg="add">
-          <ac:chgData name="Joshua Stuckey" userId="5c960db8-adfa-4945-862f-e1da102aa351" providerId="ADAL" clId="{586575FD-DEAD-44B2-9EB4-1FA0B1A76B65}" dt="2025-07-10T17:24:56.863" v="329" actId="26606"/>
-          <ac:picMkLst>
-            <pc:docMk/>
-            <pc:sldMk cId="3867904348" sldId="258"/>
-            <ac:picMk id="26" creationId="{40A39FDC-39F4-4CB7-873B-8D786EC02516}"/>
-          </ac:picMkLst>
-        </pc:picChg>
       </pc:sldChg>
       <pc:sldChg chg="addSp delSp modSp new mod setBg setClrOvrMap">
         <pc:chgData name="Joshua Stuckey" userId="5c960db8-adfa-4945-862f-e1da102aa351" providerId="ADAL" clId="{586575FD-DEAD-44B2-9EB4-1FA0B1A76B65}" dt="2025-07-10T18:12:57.351" v="359" actId="14100"/>
@@ -339,46 +179,6 @@
           <pc:docMk/>
           <pc:sldMk cId="3458770537" sldId="259"/>
         </pc:sldMkLst>
-        <pc:spChg chg="mod">
-          <ac:chgData name="Joshua Stuckey" userId="5c960db8-adfa-4945-862f-e1da102aa351" providerId="ADAL" clId="{586575FD-DEAD-44B2-9EB4-1FA0B1A76B65}" dt="2025-07-10T17:25:25.291" v="330" actId="26606"/>
-          <ac:spMkLst>
-            <pc:docMk/>
-            <pc:sldMk cId="3458770537" sldId="259"/>
-            <ac:spMk id="2" creationId="{E648950A-B410-81C3-DD5E-1F0B5C22E0B5}"/>
-          </ac:spMkLst>
-        </pc:spChg>
-        <pc:spChg chg="add">
-          <ac:chgData name="Joshua Stuckey" userId="5c960db8-adfa-4945-862f-e1da102aa351" providerId="ADAL" clId="{586575FD-DEAD-44B2-9EB4-1FA0B1A76B65}" dt="2025-07-10T17:25:25.291" v="330" actId="26606"/>
-          <ac:spMkLst>
-            <pc:docMk/>
-            <pc:sldMk cId="3458770537" sldId="259"/>
-            <ac:spMk id="13" creationId="{E1EB41F2-E181-4D4D-9131-A30F6B0AE596}"/>
-          </ac:spMkLst>
-        </pc:spChg>
-        <pc:spChg chg="add">
-          <ac:chgData name="Joshua Stuckey" userId="5c960db8-adfa-4945-862f-e1da102aa351" providerId="ADAL" clId="{586575FD-DEAD-44B2-9EB4-1FA0B1A76B65}" dt="2025-07-10T17:25:25.291" v="330" actId="26606"/>
-          <ac:spMkLst>
-            <pc:docMk/>
-            <pc:sldMk cId="3458770537" sldId="259"/>
-            <ac:spMk id="15" creationId="{3D63CC92-C517-4C71-9222-4579252CD62E}"/>
-          </ac:spMkLst>
-        </pc:spChg>
-        <pc:picChg chg="add mod">
-          <ac:chgData name="Joshua Stuckey" userId="5c960db8-adfa-4945-862f-e1da102aa351" providerId="ADAL" clId="{586575FD-DEAD-44B2-9EB4-1FA0B1A76B65}" dt="2025-07-10T18:12:57.351" v="359" actId="14100"/>
-          <ac:picMkLst>
-            <pc:docMk/>
-            <pc:sldMk cId="3458770537" sldId="259"/>
-            <ac:picMk id="10" creationId="{0C6F9F6E-8CB4-AB8A-753D-4EC0136044B1}"/>
-          </ac:picMkLst>
-        </pc:picChg>
-        <pc:picChg chg="add">
-          <ac:chgData name="Joshua Stuckey" userId="5c960db8-adfa-4945-862f-e1da102aa351" providerId="ADAL" clId="{586575FD-DEAD-44B2-9EB4-1FA0B1A76B65}" dt="2025-07-10T17:25:25.291" v="330" actId="26606"/>
-          <ac:picMkLst>
-            <pc:docMk/>
-            <pc:sldMk cId="3458770537" sldId="259"/>
-            <ac:picMk id="17" creationId="{40A39FDC-39F4-4CB7-873B-8D786EC02516}"/>
-          </ac:picMkLst>
-        </pc:picChg>
       </pc:sldChg>
       <pc:sldChg chg="addSp delSp modSp new mod setBg setClrOvrMap">
         <pc:chgData name="Joshua Stuckey" userId="5c960db8-adfa-4945-862f-e1da102aa351" providerId="ADAL" clId="{586575FD-DEAD-44B2-9EB4-1FA0B1A76B65}" dt="2025-07-11T19:51:16.583" v="404"/>
@@ -386,46 +186,6 @@
           <pc:docMk/>
           <pc:sldMk cId="1700194541" sldId="260"/>
         </pc:sldMkLst>
-        <pc:spChg chg="mod">
-          <ac:chgData name="Joshua Stuckey" userId="5c960db8-adfa-4945-862f-e1da102aa351" providerId="ADAL" clId="{586575FD-DEAD-44B2-9EB4-1FA0B1A76B65}" dt="2025-07-10T17:25:33.221" v="331" actId="26606"/>
-          <ac:spMkLst>
-            <pc:docMk/>
-            <pc:sldMk cId="1700194541" sldId="260"/>
-            <ac:spMk id="2" creationId="{2C583EF9-DDC4-D022-FB80-A043108B259D}"/>
-          </ac:spMkLst>
-        </pc:spChg>
-        <pc:spChg chg="add">
-          <ac:chgData name="Joshua Stuckey" userId="5c960db8-adfa-4945-862f-e1da102aa351" providerId="ADAL" clId="{586575FD-DEAD-44B2-9EB4-1FA0B1A76B65}" dt="2025-07-10T17:25:33.221" v="331" actId="26606"/>
-          <ac:spMkLst>
-            <pc:docMk/>
-            <pc:sldMk cId="1700194541" sldId="260"/>
-            <ac:spMk id="8" creationId="{E1EB41F2-E181-4D4D-9131-A30F6B0AE596}"/>
-          </ac:spMkLst>
-        </pc:spChg>
-        <pc:spChg chg="add">
-          <ac:chgData name="Joshua Stuckey" userId="5c960db8-adfa-4945-862f-e1da102aa351" providerId="ADAL" clId="{586575FD-DEAD-44B2-9EB4-1FA0B1A76B65}" dt="2025-07-10T17:25:33.221" v="331" actId="26606"/>
-          <ac:spMkLst>
-            <pc:docMk/>
-            <pc:sldMk cId="1700194541" sldId="260"/>
-            <ac:spMk id="10" creationId="{3D63CC92-C517-4C71-9222-4579252CD62E}"/>
-          </ac:spMkLst>
-        </pc:spChg>
-        <pc:picChg chg="add mod">
-          <ac:chgData name="Joshua Stuckey" userId="5c960db8-adfa-4945-862f-e1da102aa351" providerId="ADAL" clId="{586575FD-DEAD-44B2-9EB4-1FA0B1A76B65}" dt="2025-07-11T19:51:16.583" v="404"/>
-          <ac:picMkLst>
-            <pc:docMk/>
-            <pc:sldMk cId="1700194541" sldId="260"/>
-            <ac:picMk id="5" creationId="{F3CC48D4-0946-A3C2-BA3E-0E082AE59A85}"/>
-          </ac:picMkLst>
-        </pc:picChg>
-        <pc:picChg chg="add">
-          <ac:chgData name="Joshua Stuckey" userId="5c960db8-adfa-4945-862f-e1da102aa351" providerId="ADAL" clId="{586575FD-DEAD-44B2-9EB4-1FA0B1A76B65}" dt="2025-07-10T17:25:33.221" v="331" actId="26606"/>
-          <ac:picMkLst>
-            <pc:docMk/>
-            <pc:sldMk cId="1700194541" sldId="260"/>
-            <ac:picMk id="12" creationId="{40A39FDC-39F4-4CB7-873B-8D786EC02516}"/>
-          </ac:picMkLst>
-        </pc:picChg>
       </pc:sldChg>
       <pc:sldChg chg="addSp modSp new del mod setBg setClrOvrMap">
         <pc:chgData name="Joshua Stuckey" userId="5c960db8-adfa-4945-862f-e1da102aa351" providerId="ADAL" clId="{586575FD-DEAD-44B2-9EB4-1FA0B1A76B65}" dt="2025-07-11T19:44:13.470" v="385" actId="47"/>
@@ -440,30 +200,6 @@
           <pc:docMk/>
           <pc:sldMk cId="3957587931" sldId="262"/>
         </pc:sldMkLst>
-        <pc:spChg chg="mod">
-          <ac:chgData name="Joshua Stuckey" userId="5c960db8-adfa-4945-862f-e1da102aa351" providerId="ADAL" clId="{586575FD-DEAD-44B2-9EB4-1FA0B1A76B65}" dt="2025-07-11T19:55:14.250" v="443" actId="20577"/>
-          <ac:spMkLst>
-            <pc:docMk/>
-            <pc:sldMk cId="3957587931" sldId="262"/>
-            <ac:spMk id="2" creationId="{70259AA4-8B35-0946-7DFD-AEC38D309AF7}"/>
-          </ac:spMkLst>
-        </pc:spChg>
-        <pc:spChg chg="add">
-          <ac:chgData name="Joshua Stuckey" userId="5c960db8-adfa-4945-862f-e1da102aa351" providerId="ADAL" clId="{586575FD-DEAD-44B2-9EB4-1FA0B1A76B65}" dt="2025-07-11T19:44:43.370" v="386" actId="26606"/>
-          <ac:spMkLst>
-            <pc:docMk/>
-            <pc:sldMk cId="3957587931" sldId="262"/>
-            <ac:spMk id="17" creationId="{54309F57-B331-41A7-9154-15EC2AF45A60}"/>
-          </ac:spMkLst>
-        </pc:spChg>
-        <pc:picChg chg="add mod">
-          <ac:chgData name="Joshua Stuckey" userId="5c960db8-adfa-4945-862f-e1da102aa351" providerId="ADAL" clId="{586575FD-DEAD-44B2-9EB4-1FA0B1A76B65}" dt="2025-07-11T19:53:06.821" v="413" actId="1076"/>
-          <ac:picMkLst>
-            <pc:docMk/>
-            <pc:sldMk cId="3957587931" sldId="262"/>
-            <ac:picMk id="16" creationId="{07BE12F0-D246-0672-651A-288EDD720CEE}"/>
-          </ac:picMkLst>
-        </pc:picChg>
       </pc:sldChg>
       <pc:sldChg chg="addSp delSp modSp new mod">
         <pc:chgData name="Joshua Stuckey" userId="5c960db8-adfa-4945-862f-e1da102aa351" providerId="ADAL" clId="{586575FD-DEAD-44B2-9EB4-1FA0B1A76B65}" dt="2025-07-14T13:01:55.161" v="2029" actId="1035"/>
@@ -471,22 +207,6 @@
           <pc:docMk/>
           <pc:sldMk cId="1364987764" sldId="263"/>
         </pc:sldMkLst>
-        <pc:spChg chg="mod">
-          <ac:chgData name="Joshua Stuckey" userId="5c960db8-adfa-4945-862f-e1da102aa351" providerId="ADAL" clId="{586575FD-DEAD-44B2-9EB4-1FA0B1A76B65}" dt="2025-07-10T17:23:11.203" v="309" actId="20577"/>
-          <ac:spMkLst>
-            <pc:docMk/>
-            <pc:sldMk cId="1364987764" sldId="263"/>
-            <ac:spMk id="2" creationId="{9375814D-7DB3-6DDD-B456-A716BD5DE6EC}"/>
-          </ac:spMkLst>
-        </pc:spChg>
-        <pc:graphicFrameChg chg="add mod">
-          <ac:chgData name="Joshua Stuckey" userId="5c960db8-adfa-4945-862f-e1da102aa351" providerId="ADAL" clId="{586575FD-DEAD-44B2-9EB4-1FA0B1A76B65}" dt="2025-07-14T13:01:55.161" v="2029" actId="1035"/>
-          <ac:graphicFrameMkLst>
-            <pc:docMk/>
-            <pc:sldMk cId="1364987764" sldId="263"/>
-            <ac:graphicFrameMk id="8" creationId="{25A9274E-9FEC-EBCA-3855-54B1D262D654}"/>
-          </ac:graphicFrameMkLst>
-        </pc:graphicFrameChg>
       </pc:sldChg>
       <pc:sldChg chg="modSp new del mod">
         <pc:chgData name="Joshua Stuckey" userId="5c960db8-adfa-4945-862f-e1da102aa351" providerId="ADAL" clId="{586575FD-DEAD-44B2-9EB4-1FA0B1A76B65}" dt="2025-07-14T11:45:23.105" v="850" actId="47"/>
@@ -501,118 +221,6 @@
           <pc:docMk/>
           <pc:sldMk cId="857782669" sldId="265"/>
         </pc:sldMkLst>
-        <pc:spChg chg="mod ord">
-          <ac:chgData name="Joshua Stuckey" userId="5c960db8-adfa-4945-862f-e1da102aa351" providerId="ADAL" clId="{586575FD-DEAD-44B2-9EB4-1FA0B1A76B65}" dt="2025-07-14T11:57:05.376" v="2006" actId="1076"/>
-          <ac:spMkLst>
-            <pc:docMk/>
-            <pc:sldMk cId="857782669" sldId="265"/>
-            <ac:spMk id="2" creationId="{A0A2C4BE-E71F-3422-2F7E-F30A16EC79FA}"/>
-          </ac:spMkLst>
-        </pc:spChg>
-        <pc:spChg chg="del mod ord">
-          <ac:chgData name="Joshua Stuckey" userId="5c960db8-adfa-4945-862f-e1da102aa351" providerId="ADAL" clId="{586575FD-DEAD-44B2-9EB4-1FA0B1A76B65}" dt="2025-07-14T11:41:45.028" v="795" actId="700"/>
-          <ac:spMkLst>
-            <pc:docMk/>
-            <pc:sldMk cId="857782669" sldId="265"/>
-            <ac:spMk id="3" creationId="{47DE4382-B908-E0FE-D0B9-E0A7DB377453}"/>
-          </ac:spMkLst>
-        </pc:spChg>
-        <pc:spChg chg="add mod ord">
-          <ac:chgData name="Joshua Stuckey" userId="5c960db8-adfa-4945-862f-e1da102aa351" providerId="ADAL" clId="{586575FD-DEAD-44B2-9EB4-1FA0B1A76B65}" dt="2025-07-14T11:42:22.431" v="816" actId="1076"/>
-          <ac:spMkLst>
-            <pc:docMk/>
-            <pc:sldMk cId="857782669" sldId="265"/>
-            <ac:spMk id="4" creationId="{7AE04580-B1DF-1649-6224-AB6478659E2E}"/>
-          </ac:spMkLst>
-        </pc:spChg>
-        <pc:spChg chg="add del mod ord">
-          <ac:chgData name="Joshua Stuckey" userId="5c960db8-adfa-4945-862f-e1da102aa351" providerId="ADAL" clId="{586575FD-DEAD-44B2-9EB4-1FA0B1A76B65}" dt="2025-07-14T11:42:16.203" v="815" actId="22"/>
-          <ac:spMkLst>
-            <pc:docMk/>
-            <pc:sldMk cId="857782669" sldId="265"/>
-            <ac:spMk id="5" creationId="{5498F6CE-F04D-3FE3-FCBD-F1C1F8EE80C9}"/>
-          </ac:spMkLst>
-        </pc:spChg>
-        <pc:spChg chg="add mod ord">
-          <ac:chgData name="Joshua Stuckey" userId="5c960db8-adfa-4945-862f-e1da102aa351" providerId="ADAL" clId="{586575FD-DEAD-44B2-9EB4-1FA0B1A76B65}" dt="2025-07-14T11:44:54.287" v="845" actId="1076"/>
-          <ac:spMkLst>
-            <pc:docMk/>
-            <pc:sldMk cId="857782669" sldId="265"/>
-            <ac:spMk id="6" creationId="{1E71AF79-0CDC-5BAA-C79F-094BE8F812A1}"/>
-          </ac:spMkLst>
-        </pc:spChg>
-        <pc:spChg chg="add del mod ord">
-          <ac:chgData name="Joshua Stuckey" userId="5c960db8-adfa-4945-862f-e1da102aa351" providerId="ADAL" clId="{586575FD-DEAD-44B2-9EB4-1FA0B1A76B65}" dt="2025-07-14T11:44:39.846" v="824" actId="22"/>
-          <ac:spMkLst>
-            <pc:docMk/>
-            <pc:sldMk cId="857782669" sldId="265"/>
-            <ac:spMk id="7" creationId="{2E99D1EE-752F-C190-9301-C23CD4E32FEA}"/>
-          </ac:spMkLst>
-        </pc:spChg>
-        <pc:spChg chg="add del">
-          <ac:chgData name="Joshua Stuckey" userId="5c960db8-adfa-4945-862f-e1da102aa351" providerId="ADAL" clId="{586575FD-DEAD-44B2-9EB4-1FA0B1A76B65}" dt="2025-07-14T11:41:45.028" v="795" actId="700"/>
-          <ac:spMkLst>
-            <pc:docMk/>
-            <pc:sldMk cId="857782669" sldId="265"/>
-            <ac:spMk id="10" creationId="{3D63CC92-C517-4C71-9222-4579252CD62E}"/>
-          </ac:spMkLst>
-        </pc:spChg>
-        <pc:spChg chg="add del">
-          <ac:chgData name="Joshua Stuckey" userId="5c960db8-adfa-4945-862f-e1da102aa351" providerId="ADAL" clId="{586575FD-DEAD-44B2-9EB4-1FA0B1A76B65}" dt="2025-07-14T11:41:45.028" v="795" actId="700"/>
-          <ac:spMkLst>
-            <pc:docMk/>
-            <pc:sldMk cId="857782669" sldId="265"/>
-            <ac:spMk id="11" creationId="{E1EB41F2-E181-4D4D-9131-A30F6B0AE596}"/>
-          </ac:spMkLst>
-        </pc:spChg>
-        <pc:spChg chg="add del mod">
-          <ac:chgData name="Joshua Stuckey" userId="5c960db8-adfa-4945-862f-e1da102aa351" providerId="ADAL" clId="{586575FD-DEAD-44B2-9EB4-1FA0B1A76B65}" dt="2025-07-14T11:43:38.504" v="822"/>
-          <ac:spMkLst>
-            <pc:docMk/>
-            <pc:sldMk cId="857782669" sldId="265"/>
-            <ac:spMk id="16" creationId="{0DAF2136-7C53-1AF7-E386-202B6CA032FF}"/>
-          </ac:spMkLst>
-        </pc:spChg>
-        <pc:picChg chg="add del mod ord">
-          <ac:chgData name="Joshua Stuckey" userId="5c960db8-adfa-4945-862f-e1da102aa351" providerId="ADAL" clId="{586575FD-DEAD-44B2-9EB4-1FA0B1A76B65}" dt="2025-07-14T11:43:34.931" v="820" actId="478"/>
-          <ac:picMkLst>
-            <pc:docMk/>
-            <pc:sldMk cId="857782669" sldId="265"/>
-            <ac:picMk id="9" creationId="{AE144999-6BE7-E833-4016-F350A2F3A1B8}"/>
-          </ac:picMkLst>
-        </pc:picChg>
-        <pc:picChg chg="add del">
-          <ac:chgData name="Joshua Stuckey" userId="5c960db8-adfa-4945-862f-e1da102aa351" providerId="ADAL" clId="{586575FD-DEAD-44B2-9EB4-1FA0B1A76B65}" dt="2025-07-14T11:41:45.028" v="795" actId="700"/>
-          <ac:picMkLst>
-            <pc:docMk/>
-            <pc:sldMk cId="857782669" sldId="265"/>
-            <ac:picMk id="12" creationId="{40A39FDC-39F4-4CB7-873B-8D786EC02516}"/>
-          </ac:picMkLst>
-        </pc:picChg>
-        <pc:picChg chg="add del">
-          <ac:chgData name="Joshua Stuckey" userId="5c960db8-adfa-4945-862f-e1da102aa351" providerId="ADAL" clId="{586575FD-DEAD-44B2-9EB4-1FA0B1A76B65}" dt="2025-07-14T11:43:37.155" v="821" actId="21"/>
-          <ac:picMkLst>
-            <pc:docMk/>
-            <pc:sldMk cId="857782669" sldId="265"/>
-            <ac:picMk id="14" creationId="{66D1C4F0-76E9-4894-5CEB-B87E6386C6A8}"/>
-          </ac:picMkLst>
-        </pc:picChg>
-        <pc:picChg chg="add mod">
-          <ac:chgData name="Joshua Stuckey" userId="5c960db8-adfa-4945-862f-e1da102aa351" providerId="ADAL" clId="{586575FD-DEAD-44B2-9EB4-1FA0B1A76B65}" dt="2025-07-14T11:43:42.703" v="823" actId="14100"/>
-          <ac:picMkLst>
-            <pc:docMk/>
-            <pc:sldMk cId="857782669" sldId="265"/>
-            <ac:picMk id="17" creationId="{66D1C4F0-76E9-4894-5CEB-B87E6386C6A8}"/>
-          </ac:picMkLst>
-        </pc:picChg>
-        <pc:picChg chg="add mod ord">
-          <ac:chgData name="Joshua Stuckey" userId="5c960db8-adfa-4945-862f-e1da102aa351" providerId="ADAL" clId="{586575FD-DEAD-44B2-9EB4-1FA0B1A76B65}" dt="2025-07-14T11:45:10.226" v="849" actId="1076"/>
-          <ac:picMkLst>
-            <pc:docMk/>
-            <pc:sldMk cId="857782669" sldId="265"/>
-            <ac:picMk id="19" creationId="{EB41E570-516D-53FD-994F-9313907066E8}"/>
-          </ac:picMkLst>
-        </pc:picChg>
       </pc:sldChg>
     </pc:docChg>
   </pc:docChgLst>
@@ -3571,7 +3179,7 @@
           <a:p>
             <a:fld id="{846CE7D5-CF57-46EF-B807-FDD0502418D4}" type="datetimeFigureOut">
               <a:rPr lang="en-US" smtClean="0"/>
-              <a:t>7/14/2025</a:t>
+              <a:t>9/9/2025</a:t>
             </a:fld>
             <a:endParaRPr lang="en-US"/>
           </a:p>
@@ -3905,7 +3513,7 @@
           <a:p>
             <a:fld id="{846CE7D5-CF57-46EF-B807-FDD0502418D4}" type="datetimeFigureOut">
               <a:rPr lang="en-US" smtClean="0"/>
-              <a:t>7/14/2025</a:t>
+              <a:t>9/9/2025</a:t>
             </a:fld>
             <a:endParaRPr lang="en-US"/>
           </a:p>
@@ -4183,7 +3791,7 @@
           <a:p>
             <a:fld id="{846CE7D5-CF57-46EF-B807-FDD0502418D4}" type="datetimeFigureOut">
               <a:rPr lang="en-US" smtClean="0"/>
-              <a:t>7/14/2025</a:t>
+              <a:t>9/9/2025</a:t>
             </a:fld>
             <a:endParaRPr lang="en-US"/>
           </a:p>
@@ -4751,7 +4359,7 @@
           <a:p>
             <a:fld id="{846CE7D5-CF57-46EF-B807-FDD0502418D4}" type="datetimeFigureOut">
               <a:rPr lang="en-US" smtClean="0"/>
-              <a:t>7/14/2025</a:t>
+              <a:t>9/9/2025</a:t>
             </a:fld>
             <a:endParaRPr lang="en-US"/>
           </a:p>
@@ -5029,7 +4637,7 @@
           <a:p>
             <a:fld id="{846CE7D5-CF57-46EF-B807-FDD0502418D4}" type="datetimeFigureOut">
               <a:rPr lang="en-US" smtClean="0"/>
-              <a:t>7/14/2025</a:t>
+              <a:t>9/9/2025</a:t>
             </a:fld>
             <a:endParaRPr lang="en-US"/>
           </a:p>
@@ -5591,7 +5199,7 @@
           <a:p>
             <a:fld id="{846CE7D5-CF57-46EF-B807-FDD0502418D4}" type="datetimeFigureOut">
               <a:rPr lang="en-US" smtClean="0"/>
-              <a:t>7/14/2025</a:t>
+              <a:t>9/9/2025</a:t>
             </a:fld>
             <a:endParaRPr lang="en-US"/>
           </a:p>
@@ -5918,7 +5526,7 @@
           <a:p>
             <a:fld id="{846CE7D5-CF57-46EF-B807-FDD0502418D4}" type="datetimeFigureOut">
               <a:rPr lang="en-US" smtClean="0"/>
-              <a:t>7/14/2025</a:t>
+              <a:t>9/9/2025</a:t>
             </a:fld>
             <a:endParaRPr lang="en-US"/>
           </a:p>
@@ -6095,7 +5703,7 @@
           <a:p>
             <a:fld id="{846CE7D5-CF57-46EF-B807-FDD0502418D4}" type="datetimeFigureOut">
               <a:rPr lang="en-US" smtClean="0"/>
-              <a:t>7/14/2025</a:t>
+              <a:t>9/9/2025</a:t>
             </a:fld>
             <a:endParaRPr lang="en-US"/>
           </a:p>
@@ -6333,7 +5941,7 @@
           <a:p>
             <a:fld id="{846CE7D5-CF57-46EF-B807-FDD0502418D4}" type="datetimeFigureOut">
               <a:rPr lang="en-US" smtClean="0"/>
-              <a:t>7/14/2025</a:t>
+              <a:t>9/9/2025</a:t>
             </a:fld>
             <a:endParaRPr lang="en-US"/>
           </a:p>
@@ -6533,7 +6141,7 @@
           <a:p>
             <a:fld id="{846CE7D5-CF57-46EF-B807-FDD0502418D4}" type="datetimeFigureOut">
               <a:rPr lang="en-US" smtClean="0"/>
-              <a:t>7/14/2025</a:t>
+              <a:t>9/9/2025</a:t>
             </a:fld>
             <a:endParaRPr lang="en-US"/>
           </a:p>
@@ -6809,7 +6417,7 @@
           <a:p>
             <a:fld id="{846CE7D5-CF57-46EF-B807-FDD0502418D4}" type="datetimeFigureOut">
               <a:rPr lang="en-US" smtClean="0"/>
-              <a:t>7/14/2025</a:t>
+              <a:t>9/9/2025</a:t>
             </a:fld>
             <a:endParaRPr lang="en-US"/>
           </a:p>
@@ -7075,7 +6683,7 @@
           <a:p>
             <a:fld id="{846CE7D5-CF57-46EF-B807-FDD0502418D4}" type="datetimeFigureOut">
               <a:rPr lang="en-US" smtClean="0"/>
-              <a:t>7/14/2025</a:t>
+              <a:t>9/9/2025</a:t>
             </a:fld>
             <a:endParaRPr lang="en-US"/>
           </a:p>
@@ -7449,7 +7057,7 @@
           <a:p>
             <a:fld id="{846CE7D5-CF57-46EF-B807-FDD0502418D4}" type="datetimeFigureOut">
               <a:rPr lang="en-US" smtClean="0"/>
-              <a:t>7/14/2025</a:t>
+              <a:t>9/9/2025</a:t>
             </a:fld>
             <a:endParaRPr lang="en-US"/>
           </a:p>
@@ -7597,7 +7205,7 @@
           <a:p>
             <a:fld id="{846CE7D5-CF57-46EF-B807-FDD0502418D4}" type="datetimeFigureOut">
               <a:rPr lang="en-US" smtClean="0"/>
-              <a:t>7/14/2025</a:t>
+              <a:t>9/9/2025</a:t>
             </a:fld>
             <a:endParaRPr lang="en-US"/>
           </a:p>
@@ -7722,7 +7330,7 @@
           <a:p>
             <a:fld id="{846CE7D5-CF57-46EF-B807-FDD0502418D4}" type="datetimeFigureOut">
               <a:rPr lang="en-US" smtClean="0"/>
-              <a:t>7/14/2025</a:t>
+              <a:t>9/9/2025</a:t>
             </a:fld>
             <a:endParaRPr lang="en-US"/>
           </a:p>
@@ -8007,7 +7615,7 @@
           <a:p>
             <a:fld id="{846CE7D5-CF57-46EF-B807-FDD0502418D4}" type="datetimeFigureOut">
               <a:rPr lang="en-US" smtClean="0"/>
-              <a:t>7/14/2025</a:t>
+              <a:t>9/9/2025</a:t>
             </a:fld>
             <a:endParaRPr lang="en-US"/>
           </a:p>
@@ -8331,7 +7939,7 @@
           <a:p>
             <a:fld id="{846CE7D5-CF57-46EF-B807-FDD0502418D4}" type="datetimeFigureOut">
               <a:rPr lang="en-US" smtClean="0"/>
-              <a:t>7/14/2025</a:t>
+              <a:t>9/9/2025</a:t>
             </a:fld>
             <a:endParaRPr lang="en-US"/>
           </a:p>
@@ -8545,7 +8153,7 @@
           <a:p>
             <a:fld id="{846CE7D5-CF57-46EF-B807-FDD0502418D4}" type="datetimeFigureOut">
               <a:rPr lang="en-US" smtClean="0"/>
-              <a:t>7/14/2025</a:t>
+              <a:t>9/9/2025</a:t>
             </a:fld>
             <a:endParaRPr lang="en-US"/>
           </a:p>
@@ -12210,7 +11818,7 @@
             </a:r>
             <a:r>
               <a:rPr lang="en-US" dirty="0"/>
-              <a:t>comprehensive data set of Meteorite Landings from The Meteoritical Society</a:t>
+              <a:t>comprehensive data set of Meteorite Landings from The Meteorological Society</a:t>
             </a:r>
           </a:p>
         </p:txBody>

</xml_diff>

<commit_message>
updated Scrum artifacts and presentation
</commit_message>
<xml_diff>
--- a/Mjolnir Group Presentation.pptx
+++ b/Mjolnir Group Presentation.pptx
@@ -9,10 +9,12 @@
     <p:sldId id="257" r:id="rId3"/>
     <p:sldId id="258" r:id="rId4"/>
     <p:sldId id="265" r:id="rId5"/>
-    <p:sldId id="259" r:id="rId6"/>
-    <p:sldId id="260" r:id="rId7"/>
-    <p:sldId id="262" r:id="rId8"/>
-    <p:sldId id="263" r:id="rId9"/>
+    <p:sldId id="269" r:id="rId6"/>
+    <p:sldId id="259" r:id="rId7"/>
+    <p:sldId id="271" r:id="rId8"/>
+    <p:sldId id="272" r:id="rId9"/>
+    <p:sldId id="262" r:id="rId10"/>
+    <p:sldId id="273" r:id="rId11"/>
   </p:sldIdLst>
   <p:sldSz cx="12192000" cy="6858000"/>
   <p:notesSz cx="6858000" cy="9144000"/>
@@ -119,29 +121,511 @@
 </p:presentation>
 </file>
 
+<file path=ppt/revisionInfo.xml><?xml version="1.0" encoding="utf-8"?>
+<p1510:revInfo xmlns:a="http://schemas.openxmlformats.org/drawingml/2006/main" xmlns:r="http://schemas.openxmlformats.org/officeDocument/2006/relationships" xmlns:p1510="http://schemas.microsoft.com/office/powerpoint/2015/10/main">
+  <p1510:revLst>
+    <p1510:client id="{CEBB8238-ECCC-4DBE-90EB-E72065F98E61}" v="24" dt="2025-09-12T18:36:19.947"/>
+  </p1510:revLst>
+</p1510:revInfo>
+</file>
+
 <file path=ppt/changesInfos/changesInfo1.xml><?xml version="1.0" encoding="utf-8"?>
 <pc:chgInfo xmlns:a="http://schemas.openxmlformats.org/drawingml/2006/main" xmlns:r="http://schemas.openxmlformats.org/officeDocument/2006/relationships" xmlns:ac="http://schemas.microsoft.com/office/drawing/2013/main/command" xmlns:pc="http://schemas.microsoft.com/office/powerpoint/2013/main/command">
   <pc:docChgLst>
     <pc:chgData name="Joshua Stuckey" userId="5c960db8-adfa-4945-862f-e1da102aa351" providerId="ADAL" clId="{CEBB8238-ECCC-4DBE-90EB-E72065F98E61}"/>
-    <pc:docChg chg="modSld">
-      <pc:chgData name="Joshua Stuckey" userId="5c960db8-adfa-4945-862f-e1da102aa351" providerId="ADAL" clId="{CEBB8238-ECCC-4DBE-90EB-E72065F98E61}" dt="2025-09-09T14:55:19.474" v="15" actId="20577"/>
+    <pc:docChg chg="undo custSel addSld delSld modSld sldOrd">
+      <pc:chgData name="Joshua Stuckey" userId="5c960db8-adfa-4945-862f-e1da102aa351" providerId="ADAL" clId="{CEBB8238-ECCC-4DBE-90EB-E72065F98E61}" dt="2025-09-12T18:41:56.431" v="3829" actId="20577"/>
       <pc:docMkLst>
         <pc:docMk/>
       </pc:docMkLst>
       <pc:sldChg chg="modSp mod">
-        <pc:chgData name="Joshua Stuckey" userId="5c960db8-adfa-4945-862f-e1da102aa351" providerId="ADAL" clId="{CEBB8238-ECCC-4DBE-90EB-E72065F98E61}" dt="2025-09-09T14:55:19.474" v="15" actId="20577"/>
+        <pc:chgData name="Joshua Stuckey" userId="5c960db8-adfa-4945-862f-e1da102aa351" providerId="ADAL" clId="{CEBB8238-ECCC-4DBE-90EB-E72065F98E61}" dt="2025-09-12T16:01:34.686" v="308" actId="15"/>
         <pc:sldMkLst>
           <pc:docMk/>
           <pc:sldMk cId="485914459" sldId="257"/>
         </pc:sldMkLst>
         <pc:spChg chg="mod">
-          <ac:chgData name="Joshua Stuckey" userId="5c960db8-adfa-4945-862f-e1da102aa351" providerId="ADAL" clId="{CEBB8238-ECCC-4DBE-90EB-E72065F98E61}" dt="2025-09-09T14:55:19.474" v="15" actId="20577"/>
+          <ac:chgData name="Joshua Stuckey" userId="5c960db8-adfa-4945-862f-e1da102aa351" providerId="ADAL" clId="{CEBB8238-ECCC-4DBE-90EB-E72065F98E61}" dt="2025-09-12T16:01:34.686" v="308" actId="15"/>
           <ac:spMkLst>
             <pc:docMk/>
             <pc:sldMk cId="485914459" sldId="257"/>
             <ac:spMk id="3" creationId="{8F762D15-7855-7B10-B554-9C7FB7CCD43C}"/>
           </ac:spMkLst>
         </pc:spChg>
+      </pc:sldChg>
+      <pc:sldChg chg="addSp modSp mod">
+        <pc:chgData name="Joshua Stuckey" userId="5c960db8-adfa-4945-862f-e1da102aa351" providerId="ADAL" clId="{CEBB8238-ECCC-4DBE-90EB-E72065F98E61}" dt="2025-09-12T15:52:53.707" v="153" actId="1076"/>
+        <pc:sldMkLst>
+          <pc:docMk/>
+          <pc:sldMk cId="3867904348" sldId="258"/>
+        </pc:sldMkLst>
+        <pc:spChg chg="add mod">
+          <ac:chgData name="Joshua Stuckey" userId="5c960db8-adfa-4945-862f-e1da102aa351" providerId="ADAL" clId="{CEBB8238-ECCC-4DBE-90EB-E72065F98E61}" dt="2025-09-12T15:50:40.572" v="68" actId="1076"/>
+          <ac:spMkLst>
+            <pc:docMk/>
+            <pc:sldMk cId="3867904348" sldId="258"/>
+            <ac:spMk id="3" creationId="{DA74F699-FDC6-F555-0A5F-B6A7A01B698C}"/>
+          </ac:spMkLst>
+        </pc:spChg>
+        <pc:spChg chg="add mod">
+          <ac:chgData name="Joshua Stuckey" userId="5c960db8-adfa-4945-862f-e1da102aa351" providerId="ADAL" clId="{CEBB8238-ECCC-4DBE-90EB-E72065F98E61}" dt="2025-09-12T15:52:01.375" v="109" actId="1076"/>
+          <ac:spMkLst>
+            <pc:docMk/>
+            <pc:sldMk cId="3867904348" sldId="258"/>
+            <ac:spMk id="5" creationId="{295C7ECA-A571-5FE1-4F82-7E4701FDBB78}"/>
+          </ac:spMkLst>
+        </pc:spChg>
+        <pc:spChg chg="add mod">
+          <ac:chgData name="Joshua Stuckey" userId="5c960db8-adfa-4945-862f-e1da102aa351" providerId="ADAL" clId="{CEBB8238-ECCC-4DBE-90EB-E72065F98E61}" dt="2025-09-12T15:52:24.127" v="130" actId="1076"/>
+          <ac:spMkLst>
+            <pc:docMk/>
+            <pc:sldMk cId="3867904348" sldId="258"/>
+            <ac:spMk id="6" creationId="{C0ADCD60-5CE3-2C6B-C5ED-CCDB0E7C858E}"/>
+          </ac:spMkLst>
+        </pc:spChg>
+        <pc:spChg chg="add mod">
+          <ac:chgData name="Joshua Stuckey" userId="5c960db8-adfa-4945-862f-e1da102aa351" providerId="ADAL" clId="{CEBB8238-ECCC-4DBE-90EB-E72065F98E61}" dt="2025-09-12T15:52:53.707" v="153" actId="1076"/>
+          <ac:spMkLst>
+            <pc:docMk/>
+            <pc:sldMk cId="3867904348" sldId="258"/>
+            <ac:spMk id="7" creationId="{5F1D113F-A3D4-5388-F4D0-F9AA479A76E3}"/>
+          </ac:spMkLst>
+        </pc:spChg>
+      </pc:sldChg>
+      <pc:sldChg chg="addSp modSp mod">
+        <pc:chgData name="Joshua Stuckey" userId="5c960db8-adfa-4945-862f-e1da102aa351" providerId="ADAL" clId="{CEBB8238-ECCC-4DBE-90EB-E72065F98E61}" dt="2025-09-12T18:31:45.115" v="3098" actId="1076"/>
+        <pc:sldMkLst>
+          <pc:docMk/>
+          <pc:sldMk cId="3458770537" sldId="259"/>
+        </pc:sldMkLst>
+        <pc:spChg chg="add mod">
+          <ac:chgData name="Joshua Stuckey" userId="5c960db8-adfa-4945-862f-e1da102aa351" providerId="ADAL" clId="{CEBB8238-ECCC-4DBE-90EB-E72065F98E61}" dt="2025-09-12T18:31:45.115" v="3098" actId="1076"/>
+          <ac:spMkLst>
+            <pc:docMk/>
+            <pc:sldMk cId="3458770537" sldId="259"/>
+            <ac:spMk id="3" creationId="{6D512EF8-AEFA-0F10-6765-37897951434B}"/>
+          </ac:spMkLst>
+        </pc:spChg>
+        <pc:picChg chg="mod">
+          <ac:chgData name="Joshua Stuckey" userId="5c960db8-adfa-4945-862f-e1da102aa351" providerId="ADAL" clId="{CEBB8238-ECCC-4DBE-90EB-E72065F98E61}" dt="2025-09-12T18:31:19.968" v="3069" actId="1076"/>
+          <ac:picMkLst>
+            <pc:docMk/>
+            <pc:sldMk cId="3458770537" sldId="259"/>
+            <ac:picMk id="10" creationId="{0C6F9F6E-8CB4-AB8A-753D-4EC0136044B1}"/>
+          </ac:picMkLst>
+        </pc:picChg>
+      </pc:sldChg>
+      <pc:sldChg chg="addSp delSp modSp del mod delDesignElem chgLayout">
+        <pc:chgData name="Joshua Stuckey" userId="5c960db8-adfa-4945-862f-e1da102aa351" providerId="ADAL" clId="{CEBB8238-ECCC-4DBE-90EB-E72065F98E61}" dt="2025-09-12T18:21:55.665" v="2032" actId="47"/>
+        <pc:sldMkLst>
+          <pc:docMk/>
+          <pc:sldMk cId="1700194541" sldId="260"/>
+        </pc:sldMkLst>
+        <pc:spChg chg="mod ord">
+          <ac:chgData name="Joshua Stuckey" userId="5c960db8-adfa-4945-862f-e1da102aa351" providerId="ADAL" clId="{CEBB8238-ECCC-4DBE-90EB-E72065F98E61}" dt="2025-09-12T18:15:06.427" v="1182" actId="700"/>
+          <ac:spMkLst>
+            <pc:docMk/>
+            <pc:sldMk cId="1700194541" sldId="260"/>
+            <ac:spMk id="2" creationId="{2C583EF9-DDC4-D022-FB80-A043108B259D}"/>
+          </ac:spMkLst>
+        </pc:spChg>
+        <pc:spChg chg="add del mod ord">
+          <ac:chgData name="Joshua Stuckey" userId="5c960db8-adfa-4945-862f-e1da102aa351" providerId="ADAL" clId="{CEBB8238-ECCC-4DBE-90EB-E72065F98E61}" dt="2025-09-12T18:13:25.076" v="1164" actId="700"/>
+          <ac:spMkLst>
+            <pc:docMk/>
+            <pc:sldMk cId="1700194541" sldId="260"/>
+            <ac:spMk id="3" creationId="{FBBE0036-0802-7088-645E-2EA314884CBE}"/>
+          </ac:spMkLst>
+        </pc:spChg>
+        <pc:spChg chg="add mod">
+          <ac:chgData name="Joshua Stuckey" userId="5c960db8-adfa-4945-862f-e1da102aa351" providerId="ADAL" clId="{CEBB8238-ECCC-4DBE-90EB-E72065F98E61}" dt="2025-09-12T18:13:55.367" v="1165" actId="767"/>
+          <ac:spMkLst>
+            <pc:docMk/>
+            <pc:sldMk cId="1700194541" sldId="260"/>
+            <ac:spMk id="4" creationId="{1DC14B88-1866-EBFE-D4F6-A92E4780269E}"/>
+          </ac:spMkLst>
+        </pc:spChg>
+        <pc:spChg chg="add del mod ord">
+          <ac:chgData name="Joshua Stuckey" userId="5c960db8-adfa-4945-862f-e1da102aa351" providerId="ADAL" clId="{CEBB8238-ECCC-4DBE-90EB-E72065F98E61}" dt="2025-09-12T18:15:06.427" v="1182" actId="700"/>
+          <ac:spMkLst>
+            <pc:docMk/>
+            <pc:sldMk cId="1700194541" sldId="260"/>
+            <ac:spMk id="6" creationId="{929999AB-33E4-3850-877A-B75ED7663FC2}"/>
+          </ac:spMkLst>
+        </pc:spChg>
+        <pc:spChg chg="add del">
+          <ac:chgData name="Joshua Stuckey" userId="5c960db8-adfa-4945-862f-e1da102aa351" providerId="ADAL" clId="{CEBB8238-ECCC-4DBE-90EB-E72065F98E61}" dt="2025-09-12T18:15:06.427" v="1182" actId="700"/>
+          <ac:spMkLst>
+            <pc:docMk/>
+            <pc:sldMk cId="1700194541" sldId="260"/>
+            <ac:spMk id="8" creationId="{E1EB41F2-E181-4D4D-9131-A30F6B0AE596}"/>
+          </ac:spMkLst>
+        </pc:spChg>
+        <pc:spChg chg="add del mod">
+          <ac:chgData name="Joshua Stuckey" userId="5c960db8-adfa-4945-862f-e1da102aa351" providerId="ADAL" clId="{CEBB8238-ECCC-4DBE-90EB-E72065F98E61}" dt="2025-09-12T18:15:01.328" v="1178" actId="21"/>
+          <ac:spMkLst>
+            <pc:docMk/>
+            <pc:sldMk cId="1700194541" sldId="260"/>
+            <ac:spMk id="9" creationId="{2A93E261-2964-2549-9CC4-44D2F17F90F7}"/>
+          </ac:spMkLst>
+        </pc:spChg>
+        <pc:spChg chg="add del">
+          <ac:chgData name="Joshua Stuckey" userId="5c960db8-adfa-4945-862f-e1da102aa351" providerId="ADAL" clId="{CEBB8238-ECCC-4DBE-90EB-E72065F98E61}" dt="2025-09-12T18:15:06.427" v="1182" actId="700"/>
+          <ac:spMkLst>
+            <pc:docMk/>
+            <pc:sldMk cId="1700194541" sldId="260"/>
+            <ac:spMk id="10" creationId="{3D63CC92-C517-4C71-9222-4579252CD62E}"/>
+          </ac:spMkLst>
+        </pc:spChg>
+        <pc:spChg chg="add mod">
+          <ac:chgData name="Joshua Stuckey" userId="5c960db8-adfa-4945-862f-e1da102aa351" providerId="ADAL" clId="{CEBB8238-ECCC-4DBE-90EB-E72065F98E61}" dt="2025-09-12T18:16:09.454" v="1211" actId="21"/>
+          <ac:spMkLst>
+            <pc:docMk/>
+            <pc:sldMk cId="1700194541" sldId="260"/>
+            <ac:spMk id="13" creationId="{9DBE96EE-CD4F-199C-69C6-716CB0F54534}"/>
+          </ac:spMkLst>
+        </pc:spChg>
+        <pc:picChg chg="add del mod ord">
+          <ac:chgData name="Joshua Stuckey" userId="5c960db8-adfa-4945-862f-e1da102aa351" providerId="ADAL" clId="{CEBB8238-ECCC-4DBE-90EB-E72065F98E61}" dt="2025-09-12T18:16:09.454" v="1211" actId="21"/>
+          <ac:picMkLst>
+            <pc:docMk/>
+            <pc:sldMk cId="1700194541" sldId="260"/>
+            <ac:picMk id="5" creationId="{F3CC48D4-0946-A3C2-BA3E-0E082AE59A85}"/>
+          </ac:picMkLst>
+        </pc:picChg>
+        <pc:picChg chg="add del">
+          <ac:chgData name="Joshua Stuckey" userId="5c960db8-adfa-4945-862f-e1da102aa351" providerId="ADAL" clId="{CEBB8238-ECCC-4DBE-90EB-E72065F98E61}" dt="2025-09-12T18:15:06.427" v="1182" actId="700"/>
+          <ac:picMkLst>
+            <pc:docMk/>
+            <pc:sldMk cId="1700194541" sldId="260"/>
+            <ac:picMk id="12" creationId="{40A39FDC-39F4-4CB7-873B-8D786EC02516}"/>
+          </ac:picMkLst>
+        </pc:picChg>
+      </pc:sldChg>
+      <pc:sldChg chg="addSp delSp modSp mod">
+        <pc:chgData name="Joshua Stuckey" userId="5c960db8-adfa-4945-862f-e1da102aa351" providerId="ADAL" clId="{CEBB8238-ECCC-4DBE-90EB-E72065F98E61}" dt="2025-09-12T18:36:37.021" v="3495" actId="1076"/>
+        <pc:sldMkLst>
+          <pc:docMk/>
+          <pc:sldMk cId="3957587931" sldId="262"/>
+        </pc:sldMkLst>
+        <pc:spChg chg="add del mod">
+          <ac:chgData name="Joshua Stuckey" userId="5c960db8-adfa-4945-862f-e1da102aa351" providerId="ADAL" clId="{CEBB8238-ECCC-4DBE-90EB-E72065F98E61}" dt="2025-09-12T18:36:19.947" v="3488"/>
+          <ac:spMkLst>
+            <pc:docMk/>
+            <pc:sldMk cId="3957587931" sldId="262"/>
+            <ac:spMk id="4" creationId="{0FB8FCB6-475B-5612-DA61-C3525399FC7C}"/>
+          </ac:spMkLst>
+        </pc:spChg>
+        <pc:picChg chg="add mod">
+          <ac:chgData name="Joshua Stuckey" userId="5c960db8-adfa-4945-862f-e1da102aa351" providerId="ADAL" clId="{CEBB8238-ECCC-4DBE-90EB-E72065F98E61}" dt="2025-09-12T18:36:37.021" v="3495" actId="1076"/>
+          <ac:picMkLst>
+            <pc:docMk/>
+            <pc:sldMk cId="3957587931" sldId="262"/>
+            <ac:picMk id="5" creationId="{07BE12F0-D246-0672-651A-288EDD720CEE}"/>
+          </ac:picMkLst>
+        </pc:picChg>
+        <pc:picChg chg="del">
+          <ac:chgData name="Joshua Stuckey" userId="5c960db8-adfa-4945-862f-e1da102aa351" providerId="ADAL" clId="{CEBB8238-ECCC-4DBE-90EB-E72065F98E61}" dt="2025-09-12T18:34:05.576" v="3191" actId="21"/>
+          <ac:picMkLst>
+            <pc:docMk/>
+            <pc:sldMk cId="3957587931" sldId="262"/>
+            <ac:picMk id="16" creationId="{07BE12F0-D246-0672-651A-288EDD720CEE}"/>
+          </ac:picMkLst>
+        </pc:picChg>
+      </pc:sldChg>
+      <pc:sldChg chg="del">
+        <pc:chgData name="Joshua Stuckey" userId="5c960db8-adfa-4945-862f-e1da102aa351" providerId="ADAL" clId="{CEBB8238-ECCC-4DBE-90EB-E72065F98E61}" dt="2025-09-12T18:39:57.366" v="3813" actId="47"/>
+        <pc:sldMkLst>
+          <pc:docMk/>
+          <pc:sldMk cId="1364987764" sldId="263"/>
+        </pc:sldMkLst>
+      </pc:sldChg>
+      <pc:sldChg chg="new del">
+        <pc:chgData name="Joshua Stuckey" userId="5c960db8-adfa-4945-862f-e1da102aa351" providerId="ADAL" clId="{CEBB8238-ECCC-4DBE-90EB-E72065F98E61}" dt="2025-09-12T15:54:58.721" v="157" actId="47"/>
+        <pc:sldMkLst>
+          <pc:docMk/>
+          <pc:sldMk cId="3003922653" sldId="266"/>
+        </pc:sldMkLst>
+      </pc:sldChg>
+      <pc:sldChg chg="delSp add del setBg delDesignElem">
+        <pc:chgData name="Joshua Stuckey" userId="5c960db8-adfa-4945-862f-e1da102aa351" providerId="ADAL" clId="{CEBB8238-ECCC-4DBE-90EB-E72065F98E61}" dt="2025-09-12T15:55:16.799" v="160" actId="47"/>
+        <pc:sldMkLst>
+          <pc:docMk/>
+          <pc:sldMk cId="500666649" sldId="267"/>
+        </pc:sldMkLst>
+        <pc:spChg chg="del">
+          <ac:chgData name="Joshua Stuckey" userId="5c960db8-adfa-4945-862f-e1da102aa351" providerId="ADAL" clId="{CEBB8238-ECCC-4DBE-90EB-E72065F98E61}" dt="2025-09-12T15:54:54.673" v="156"/>
+          <ac:spMkLst>
+            <pc:docMk/>
+            <pc:sldMk cId="500666649" sldId="267"/>
+            <ac:spMk id="8" creationId="{30A76743-0783-05DD-0BC7-F2E84CDE5CDF}"/>
+          </ac:spMkLst>
+        </pc:spChg>
+        <pc:spChg chg="del">
+          <ac:chgData name="Joshua Stuckey" userId="5c960db8-adfa-4945-862f-e1da102aa351" providerId="ADAL" clId="{CEBB8238-ECCC-4DBE-90EB-E72065F98E61}" dt="2025-09-12T15:54:54.673" v="156"/>
+          <ac:spMkLst>
+            <pc:docMk/>
+            <pc:sldMk cId="500666649" sldId="267"/>
+            <ac:spMk id="10" creationId="{EB4A8590-0821-A282-1332-7E755B37D7E6}"/>
+          </ac:spMkLst>
+        </pc:spChg>
+        <pc:picChg chg="del">
+          <ac:chgData name="Joshua Stuckey" userId="5c960db8-adfa-4945-862f-e1da102aa351" providerId="ADAL" clId="{CEBB8238-ECCC-4DBE-90EB-E72065F98E61}" dt="2025-09-12T15:54:54.673" v="156"/>
+          <ac:picMkLst>
+            <pc:docMk/>
+            <pc:sldMk cId="500666649" sldId="267"/>
+            <ac:picMk id="12" creationId="{E8ADC189-5B0B-F047-46E9-82BF96D77DF2}"/>
+          </ac:picMkLst>
+        </pc:picChg>
+      </pc:sldChg>
+      <pc:sldChg chg="delSp add del setBg delDesignElem">
+        <pc:chgData name="Joshua Stuckey" userId="5c960db8-adfa-4945-862f-e1da102aa351" providerId="ADAL" clId="{CEBB8238-ECCC-4DBE-90EB-E72065F98E61}" dt="2025-09-12T15:57:39.059" v="164" actId="47"/>
+        <pc:sldMkLst>
+          <pc:docMk/>
+          <pc:sldMk cId="4148609420" sldId="268"/>
+        </pc:sldMkLst>
+        <pc:spChg chg="del">
+          <ac:chgData name="Joshua Stuckey" userId="5c960db8-adfa-4945-862f-e1da102aa351" providerId="ADAL" clId="{CEBB8238-ECCC-4DBE-90EB-E72065F98E61}" dt="2025-09-12T15:55:13.486" v="159"/>
+          <ac:spMkLst>
+            <pc:docMk/>
+            <pc:sldMk cId="4148609420" sldId="268"/>
+            <ac:spMk id="22" creationId="{B230BF65-D287-FE56-B82B-A7ED970D46CE}"/>
+          </ac:spMkLst>
+        </pc:spChg>
+        <pc:spChg chg="del">
+          <ac:chgData name="Joshua Stuckey" userId="5c960db8-adfa-4945-862f-e1da102aa351" providerId="ADAL" clId="{CEBB8238-ECCC-4DBE-90EB-E72065F98E61}" dt="2025-09-12T15:55:13.486" v="159"/>
+          <ac:spMkLst>
+            <pc:docMk/>
+            <pc:sldMk cId="4148609420" sldId="268"/>
+            <ac:spMk id="24" creationId="{3BEECE27-CB42-3232-C7CA-F410AC42BF18}"/>
+          </ac:spMkLst>
+        </pc:spChg>
+        <pc:picChg chg="del">
+          <ac:chgData name="Joshua Stuckey" userId="5c960db8-adfa-4945-862f-e1da102aa351" providerId="ADAL" clId="{CEBB8238-ECCC-4DBE-90EB-E72065F98E61}" dt="2025-09-12T15:55:13.486" v="159"/>
+          <ac:picMkLst>
+            <pc:docMk/>
+            <pc:sldMk cId="4148609420" sldId="268"/>
+            <ac:picMk id="26" creationId="{BDE17E9B-547C-139A-6615-FF9B1C02292B}"/>
+          </ac:picMkLst>
+        </pc:picChg>
+      </pc:sldChg>
+      <pc:sldChg chg="addSp delSp modSp add mod ord">
+        <pc:chgData name="Joshua Stuckey" userId="5c960db8-adfa-4945-862f-e1da102aa351" providerId="ADAL" clId="{CEBB8238-ECCC-4DBE-90EB-E72065F98E61}" dt="2025-09-12T18:41:56.431" v="3829" actId="20577"/>
+        <pc:sldMkLst>
+          <pc:docMk/>
+          <pc:sldMk cId="126246168" sldId="269"/>
+        </pc:sldMkLst>
+        <pc:spChg chg="mod">
+          <ac:chgData name="Joshua Stuckey" userId="5c960db8-adfa-4945-862f-e1da102aa351" providerId="ADAL" clId="{CEBB8238-ECCC-4DBE-90EB-E72065F98E61}" dt="2025-09-12T17:56:07.563" v="375" actId="20577"/>
+          <ac:spMkLst>
+            <pc:docMk/>
+            <pc:sldMk cId="126246168" sldId="269"/>
+            <ac:spMk id="2" creationId="{DAF0ABD0-9507-EE8A-BD29-A1FB8BA75C34}"/>
+          </ac:spMkLst>
+        </pc:spChg>
+        <pc:spChg chg="mod">
+          <ac:chgData name="Joshua Stuckey" userId="5c960db8-adfa-4945-862f-e1da102aa351" providerId="ADAL" clId="{CEBB8238-ECCC-4DBE-90EB-E72065F98E61}" dt="2025-09-12T18:41:56.431" v="3829" actId="20577"/>
+          <ac:spMkLst>
+            <pc:docMk/>
+            <pc:sldMk cId="126246168" sldId="269"/>
+            <ac:spMk id="3" creationId="{A6D3616A-72AE-E977-2A46-0EE3A31C0652}"/>
+          </ac:spMkLst>
+        </pc:spChg>
+        <pc:spChg chg="add del mod">
+          <ac:chgData name="Joshua Stuckey" userId="5c960db8-adfa-4945-862f-e1da102aa351" providerId="ADAL" clId="{CEBB8238-ECCC-4DBE-90EB-E72065F98E61}" dt="2025-09-12T18:24:18.337" v="2044" actId="478"/>
+          <ac:spMkLst>
+            <pc:docMk/>
+            <pc:sldMk cId="126246168" sldId="269"/>
+            <ac:spMk id="5" creationId="{01EF42D2-0CD3-53FB-5015-F7F948A6F7A5}"/>
+          </ac:spMkLst>
+        </pc:spChg>
+        <pc:picChg chg="add mod modCrop">
+          <ac:chgData name="Joshua Stuckey" userId="5c960db8-adfa-4945-862f-e1da102aa351" providerId="ADAL" clId="{CEBB8238-ECCC-4DBE-90EB-E72065F98E61}" dt="2025-09-12T18:24:14.837" v="2043" actId="1076"/>
+          <ac:picMkLst>
+            <pc:docMk/>
+            <pc:sldMk cId="126246168" sldId="269"/>
+            <ac:picMk id="4" creationId="{2AA67520-8264-A413-3903-82A8A61314FD}"/>
+          </ac:picMkLst>
+        </pc:picChg>
+        <pc:picChg chg="del">
+          <ac:chgData name="Joshua Stuckey" userId="5c960db8-adfa-4945-862f-e1da102aa351" providerId="ADAL" clId="{CEBB8238-ECCC-4DBE-90EB-E72065F98E61}" dt="2025-09-12T17:56:11.391" v="376" actId="478"/>
+          <ac:picMkLst>
+            <pc:docMk/>
+            <pc:sldMk cId="126246168" sldId="269"/>
+            <ac:picMk id="1029" creationId="{08856F28-ED97-9B86-AADD-F580CD38050D}"/>
+          </ac:picMkLst>
+        </pc:picChg>
+        <pc:cxnChg chg="add mod">
+          <ac:chgData name="Joshua Stuckey" userId="5c960db8-adfa-4945-862f-e1da102aa351" providerId="ADAL" clId="{CEBB8238-ECCC-4DBE-90EB-E72065F98E61}" dt="2025-09-12T18:41:35.472" v="3815" actId="14100"/>
+          <ac:cxnSpMkLst>
+            <pc:docMk/>
+            <pc:sldMk cId="126246168" sldId="269"/>
+            <ac:cxnSpMk id="7" creationId="{E03ED068-BAA2-F520-5B5B-FDD727A4D7AA}"/>
+          </ac:cxnSpMkLst>
+        </pc:cxnChg>
+      </pc:sldChg>
+      <pc:sldChg chg="add del ord">
+        <pc:chgData name="Joshua Stuckey" userId="5c960db8-adfa-4945-862f-e1da102aa351" providerId="ADAL" clId="{CEBB8238-ECCC-4DBE-90EB-E72065F98E61}" dt="2025-09-12T18:15:15.275" v="1184" actId="47"/>
+        <pc:sldMkLst>
+          <pc:docMk/>
+          <pc:sldMk cId="1419255087" sldId="270"/>
+        </pc:sldMkLst>
+      </pc:sldChg>
+      <pc:sldChg chg="addSp modSp add mod ord">
+        <pc:chgData name="Joshua Stuckey" userId="5c960db8-adfa-4945-862f-e1da102aa351" providerId="ADAL" clId="{CEBB8238-ECCC-4DBE-90EB-E72065F98E61}" dt="2025-09-12T18:10:46.632" v="1157" actId="1076"/>
+        <pc:sldMkLst>
+          <pc:docMk/>
+          <pc:sldMk cId="1836900225" sldId="271"/>
+        </pc:sldMkLst>
+        <pc:spChg chg="mod">
+          <ac:chgData name="Joshua Stuckey" userId="5c960db8-adfa-4945-862f-e1da102aa351" providerId="ADAL" clId="{CEBB8238-ECCC-4DBE-90EB-E72065F98E61}" dt="2025-09-12T17:56:40.141" v="417" actId="20577"/>
+          <ac:spMkLst>
+            <pc:docMk/>
+            <pc:sldMk cId="1836900225" sldId="271"/>
+            <ac:spMk id="2" creationId="{2A9E5544-C59C-BB80-FC8A-D20DEF7A0F63}"/>
+          </ac:spMkLst>
+        </pc:spChg>
+        <pc:spChg chg="mod">
+          <ac:chgData name="Joshua Stuckey" userId="5c960db8-adfa-4945-862f-e1da102aa351" providerId="ADAL" clId="{CEBB8238-ECCC-4DBE-90EB-E72065F98E61}" dt="2025-09-12T18:09:32.224" v="1047" actId="20577"/>
+          <ac:spMkLst>
+            <pc:docMk/>
+            <pc:sldMk cId="1836900225" sldId="271"/>
+            <ac:spMk id="3" creationId="{061B102A-76E3-00CD-C16F-40830DCFB7AA}"/>
+          </ac:spMkLst>
+        </pc:spChg>
+        <pc:spChg chg="add mod">
+          <ac:chgData name="Joshua Stuckey" userId="5c960db8-adfa-4945-862f-e1da102aa351" providerId="ADAL" clId="{CEBB8238-ECCC-4DBE-90EB-E72065F98E61}" dt="2025-09-12T18:10:46.632" v="1157" actId="1076"/>
+          <ac:spMkLst>
+            <pc:docMk/>
+            <pc:sldMk cId="1836900225" sldId="271"/>
+            <ac:spMk id="6" creationId="{C0972A1E-637E-3891-1E57-DF87F10109FE}"/>
+          </ac:spMkLst>
+        </pc:spChg>
+        <pc:picChg chg="add mod">
+          <ac:chgData name="Joshua Stuckey" userId="5c960db8-adfa-4945-862f-e1da102aa351" providerId="ADAL" clId="{CEBB8238-ECCC-4DBE-90EB-E72065F98E61}" dt="2025-09-12T17:58:05.286" v="419" actId="1076"/>
+          <ac:picMkLst>
+            <pc:docMk/>
+            <pc:sldMk cId="1836900225" sldId="271"/>
+            <ac:picMk id="5" creationId="{ACB4FEDD-B9C8-8BA5-C9AB-8019F26D8DCF}"/>
+          </ac:picMkLst>
+        </pc:picChg>
+      </pc:sldChg>
+      <pc:sldChg chg="addSp delSp modSp add mod">
+        <pc:chgData name="Joshua Stuckey" userId="5c960db8-adfa-4945-862f-e1da102aa351" providerId="ADAL" clId="{CEBB8238-ECCC-4DBE-90EB-E72065F98E61}" dt="2025-09-12T18:32:37.214" v="3120" actId="20577"/>
+        <pc:sldMkLst>
+          <pc:docMk/>
+          <pc:sldMk cId="59254839" sldId="272"/>
+        </pc:sldMkLst>
+        <pc:spChg chg="mod">
+          <ac:chgData name="Joshua Stuckey" userId="5c960db8-adfa-4945-862f-e1da102aa351" providerId="ADAL" clId="{CEBB8238-ECCC-4DBE-90EB-E72065F98E61}" dt="2025-09-12T18:15:31.061" v="1208" actId="20577"/>
+          <ac:spMkLst>
+            <pc:docMk/>
+            <pc:sldMk cId="59254839" sldId="272"/>
+            <ac:spMk id="2" creationId="{AB02C960-1F8D-2041-68B9-D2382D1556EC}"/>
+          </ac:spMkLst>
+        </pc:spChg>
+        <pc:spChg chg="mod">
+          <ac:chgData name="Joshua Stuckey" userId="5c960db8-adfa-4945-862f-e1da102aa351" providerId="ADAL" clId="{CEBB8238-ECCC-4DBE-90EB-E72065F98E61}" dt="2025-09-12T18:32:37.214" v="3120" actId="20577"/>
+          <ac:spMkLst>
+            <pc:docMk/>
+            <pc:sldMk cId="59254839" sldId="272"/>
+            <ac:spMk id="3" creationId="{6C47CF8A-BCF2-120C-E1DD-FCE6C91295A3}"/>
+          </ac:spMkLst>
+        </pc:spChg>
+        <pc:spChg chg="del">
+          <ac:chgData name="Joshua Stuckey" userId="5c960db8-adfa-4945-862f-e1da102aa351" providerId="ADAL" clId="{CEBB8238-ECCC-4DBE-90EB-E72065F98E61}" dt="2025-09-12T18:16:35.632" v="1215" actId="478"/>
+          <ac:spMkLst>
+            <pc:docMk/>
+            <pc:sldMk cId="59254839" sldId="272"/>
+            <ac:spMk id="6" creationId="{2FB6BBBF-5C70-B2D4-6977-6C0D269E50AA}"/>
+          </ac:spMkLst>
+        </pc:spChg>
+        <pc:picChg chg="add mod">
+          <ac:chgData name="Joshua Stuckey" userId="5c960db8-adfa-4945-862f-e1da102aa351" providerId="ADAL" clId="{CEBB8238-ECCC-4DBE-90EB-E72065F98E61}" dt="2025-09-12T18:16:31.444" v="1214" actId="1076"/>
+          <ac:picMkLst>
+            <pc:docMk/>
+            <pc:sldMk cId="59254839" sldId="272"/>
+            <ac:picMk id="4" creationId="{F3CC48D4-0946-A3C2-BA3E-0E082AE59A85}"/>
+          </ac:picMkLst>
+        </pc:picChg>
+        <pc:picChg chg="del">
+          <ac:chgData name="Joshua Stuckey" userId="5c960db8-adfa-4945-862f-e1da102aa351" providerId="ADAL" clId="{CEBB8238-ECCC-4DBE-90EB-E72065F98E61}" dt="2025-09-12T18:16:01.467" v="1209" actId="478"/>
+          <ac:picMkLst>
+            <pc:docMk/>
+            <pc:sldMk cId="59254839" sldId="272"/>
+            <ac:picMk id="5" creationId="{DF9F95EE-D4BC-77B3-D79E-2054EAF0AE5D}"/>
+          </ac:picMkLst>
+        </pc:picChg>
+      </pc:sldChg>
+      <pc:sldChg chg="addSp delSp modSp add del mod ord">
+        <pc:chgData name="Joshua Stuckey" userId="5c960db8-adfa-4945-862f-e1da102aa351" providerId="ADAL" clId="{CEBB8238-ECCC-4DBE-90EB-E72065F98E61}" dt="2025-09-12T18:15:04.536" v="1181" actId="2890"/>
+        <pc:sldMkLst>
+          <pc:docMk/>
+          <pc:sldMk cId="4108132344" sldId="272"/>
+        </pc:sldMkLst>
+        <pc:picChg chg="add mod">
+          <ac:chgData name="Joshua Stuckey" userId="5c960db8-adfa-4945-862f-e1da102aa351" providerId="ADAL" clId="{CEBB8238-ECCC-4DBE-90EB-E72065F98E61}" dt="2025-09-12T18:15:00.624" v="1177"/>
+          <ac:picMkLst>
+            <pc:docMk/>
+            <pc:sldMk cId="4108132344" sldId="272"/>
+            <ac:picMk id="4" creationId="{F3CC48D4-0946-A3C2-BA3E-0E082AE59A85}"/>
+          </ac:picMkLst>
+        </pc:picChg>
+        <pc:picChg chg="add del">
+          <ac:chgData name="Joshua Stuckey" userId="5c960db8-adfa-4945-862f-e1da102aa351" providerId="ADAL" clId="{CEBB8238-ECCC-4DBE-90EB-E72065F98E61}" dt="2025-09-12T18:15:02.423" v="1179" actId="478"/>
+          <ac:picMkLst>
+            <pc:docMk/>
+            <pc:sldMk cId="4108132344" sldId="272"/>
+            <ac:picMk id="5" creationId="{AD77B215-504D-FA5A-785D-8D949BE66E60}"/>
+          </ac:picMkLst>
+        </pc:picChg>
+      </pc:sldChg>
+      <pc:sldChg chg="addSp delSp modSp add mod ord">
+        <pc:chgData name="Joshua Stuckey" userId="5c960db8-adfa-4945-862f-e1da102aa351" providerId="ADAL" clId="{CEBB8238-ECCC-4DBE-90EB-E72065F98E61}" dt="2025-09-12T18:39:38.754" v="3812" actId="20577"/>
+        <pc:sldMkLst>
+          <pc:docMk/>
+          <pc:sldMk cId="1353324587" sldId="273"/>
+        </pc:sldMkLst>
+        <pc:spChg chg="mod">
+          <ac:chgData name="Joshua Stuckey" userId="5c960db8-adfa-4945-862f-e1da102aa351" providerId="ADAL" clId="{CEBB8238-ECCC-4DBE-90EB-E72065F98E61}" dt="2025-09-12T18:33:55.449" v="3189" actId="20577"/>
+          <ac:spMkLst>
+            <pc:docMk/>
+            <pc:sldMk cId="1353324587" sldId="273"/>
+            <ac:spMk id="2" creationId="{674CE8CA-2AB0-935B-A4D6-567C36B30575}"/>
+          </ac:spMkLst>
+        </pc:spChg>
+        <pc:spChg chg="mod">
+          <ac:chgData name="Joshua Stuckey" userId="5c960db8-adfa-4945-862f-e1da102aa351" providerId="ADAL" clId="{CEBB8238-ECCC-4DBE-90EB-E72065F98E61}" dt="2025-09-12T18:39:38.754" v="3812" actId="20577"/>
+          <ac:spMkLst>
+            <pc:docMk/>
+            <pc:sldMk cId="1353324587" sldId="273"/>
+            <ac:spMk id="3" creationId="{55BCD8E3-E3F6-765E-373E-6DB10DD6CE2C}"/>
+          </ac:spMkLst>
+        </pc:spChg>
+        <pc:picChg chg="del">
+          <ac:chgData name="Joshua Stuckey" userId="5c960db8-adfa-4945-862f-e1da102aa351" providerId="ADAL" clId="{CEBB8238-ECCC-4DBE-90EB-E72065F98E61}" dt="2025-09-12T18:33:57.135" v="3190" actId="478"/>
+          <ac:picMkLst>
+            <pc:docMk/>
+            <pc:sldMk cId="1353324587" sldId="273"/>
+            <ac:picMk id="4" creationId="{324D467E-A169-469C-C4ED-8DEE3D7A9944}"/>
+          </ac:picMkLst>
+        </pc:picChg>
+        <pc:picChg chg="add mod">
+          <ac:chgData name="Joshua Stuckey" userId="5c960db8-adfa-4945-862f-e1da102aa351" providerId="ADAL" clId="{CEBB8238-ECCC-4DBE-90EB-E72065F98E61}" dt="2025-09-12T18:37:13.737" v="3497" actId="1076"/>
+          <ac:picMkLst>
+            <pc:docMk/>
+            <pc:sldMk cId="1353324587" sldId="273"/>
+            <ac:picMk id="6" creationId="{B43780B8-9ABC-D724-9BD3-B9F60C7C16DB}"/>
+          </ac:picMkLst>
+        </pc:picChg>
+        <pc:picChg chg="add del mod">
+          <ac:chgData name="Joshua Stuckey" userId="5c960db8-adfa-4945-862f-e1da102aa351" providerId="ADAL" clId="{CEBB8238-ECCC-4DBE-90EB-E72065F98E61}" dt="2025-09-12T18:36:15.492" v="3487" actId="21"/>
+          <ac:picMkLst>
+            <pc:docMk/>
+            <pc:sldMk cId="1353324587" sldId="273"/>
+            <ac:picMk id="16" creationId="{07BE12F0-D246-0672-651A-288EDD720CEE}"/>
+          </ac:picMkLst>
+        </pc:picChg>
       </pc:sldChg>
     </pc:docChg>
   </pc:docChgLst>
@@ -3179,7 +3663,7 @@
           <a:p>
             <a:fld id="{846CE7D5-CF57-46EF-B807-FDD0502418D4}" type="datetimeFigureOut">
               <a:rPr lang="en-US" smtClean="0"/>
-              <a:t>9/9/2025</a:t>
+              <a:t>9/12/2025</a:t>
             </a:fld>
             <a:endParaRPr lang="en-US"/>
           </a:p>
@@ -3513,7 +3997,7 @@
           <a:p>
             <a:fld id="{846CE7D5-CF57-46EF-B807-FDD0502418D4}" type="datetimeFigureOut">
               <a:rPr lang="en-US" smtClean="0"/>
-              <a:t>9/9/2025</a:t>
+              <a:t>9/12/2025</a:t>
             </a:fld>
             <a:endParaRPr lang="en-US"/>
           </a:p>
@@ -3791,7 +4275,7 @@
           <a:p>
             <a:fld id="{846CE7D5-CF57-46EF-B807-FDD0502418D4}" type="datetimeFigureOut">
               <a:rPr lang="en-US" smtClean="0"/>
-              <a:t>9/9/2025</a:t>
+              <a:t>9/12/2025</a:t>
             </a:fld>
             <a:endParaRPr lang="en-US"/>
           </a:p>
@@ -4359,7 +4843,7 @@
           <a:p>
             <a:fld id="{846CE7D5-CF57-46EF-B807-FDD0502418D4}" type="datetimeFigureOut">
               <a:rPr lang="en-US" smtClean="0"/>
-              <a:t>9/9/2025</a:t>
+              <a:t>9/12/2025</a:t>
             </a:fld>
             <a:endParaRPr lang="en-US"/>
           </a:p>
@@ -4637,7 +5121,7 @@
           <a:p>
             <a:fld id="{846CE7D5-CF57-46EF-B807-FDD0502418D4}" type="datetimeFigureOut">
               <a:rPr lang="en-US" smtClean="0"/>
-              <a:t>9/9/2025</a:t>
+              <a:t>9/12/2025</a:t>
             </a:fld>
             <a:endParaRPr lang="en-US"/>
           </a:p>
@@ -5199,7 +5683,7 @@
           <a:p>
             <a:fld id="{846CE7D5-CF57-46EF-B807-FDD0502418D4}" type="datetimeFigureOut">
               <a:rPr lang="en-US" smtClean="0"/>
-              <a:t>9/9/2025</a:t>
+              <a:t>9/12/2025</a:t>
             </a:fld>
             <a:endParaRPr lang="en-US"/>
           </a:p>
@@ -5526,7 +6010,7 @@
           <a:p>
             <a:fld id="{846CE7D5-CF57-46EF-B807-FDD0502418D4}" type="datetimeFigureOut">
               <a:rPr lang="en-US" smtClean="0"/>
-              <a:t>9/9/2025</a:t>
+              <a:t>9/12/2025</a:t>
             </a:fld>
             <a:endParaRPr lang="en-US"/>
           </a:p>
@@ -5703,7 +6187,7 @@
           <a:p>
             <a:fld id="{846CE7D5-CF57-46EF-B807-FDD0502418D4}" type="datetimeFigureOut">
               <a:rPr lang="en-US" smtClean="0"/>
-              <a:t>9/9/2025</a:t>
+              <a:t>9/12/2025</a:t>
             </a:fld>
             <a:endParaRPr lang="en-US"/>
           </a:p>
@@ -5941,7 +6425,7 @@
           <a:p>
             <a:fld id="{846CE7D5-CF57-46EF-B807-FDD0502418D4}" type="datetimeFigureOut">
               <a:rPr lang="en-US" smtClean="0"/>
-              <a:t>9/9/2025</a:t>
+              <a:t>9/12/2025</a:t>
             </a:fld>
             <a:endParaRPr lang="en-US"/>
           </a:p>
@@ -6141,7 +6625,7 @@
           <a:p>
             <a:fld id="{846CE7D5-CF57-46EF-B807-FDD0502418D4}" type="datetimeFigureOut">
               <a:rPr lang="en-US" smtClean="0"/>
-              <a:t>9/9/2025</a:t>
+              <a:t>9/12/2025</a:t>
             </a:fld>
             <a:endParaRPr lang="en-US"/>
           </a:p>
@@ -6417,7 +6901,7 @@
           <a:p>
             <a:fld id="{846CE7D5-CF57-46EF-B807-FDD0502418D4}" type="datetimeFigureOut">
               <a:rPr lang="en-US" smtClean="0"/>
-              <a:t>9/9/2025</a:t>
+              <a:t>9/12/2025</a:t>
             </a:fld>
             <a:endParaRPr lang="en-US"/>
           </a:p>
@@ -6683,7 +7167,7 @@
           <a:p>
             <a:fld id="{846CE7D5-CF57-46EF-B807-FDD0502418D4}" type="datetimeFigureOut">
               <a:rPr lang="en-US" smtClean="0"/>
-              <a:t>9/9/2025</a:t>
+              <a:t>9/12/2025</a:t>
             </a:fld>
             <a:endParaRPr lang="en-US"/>
           </a:p>
@@ -7057,7 +7541,7 @@
           <a:p>
             <a:fld id="{846CE7D5-CF57-46EF-B807-FDD0502418D4}" type="datetimeFigureOut">
               <a:rPr lang="en-US" smtClean="0"/>
-              <a:t>9/9/2025</a:t>
+              <a:t>9/12/2025</a:t>
             </a:fld>
             <a:endParaRPr lang="en-US"/>
           </a:p>
@@ -7205,7 +7689,7 @@
           <a:p>
             <a:fld id="{846CE7D5-CF57-46EF-B807-FDD0502418D4}" type="datetimeFigureOut">
               <a:rPr lang="en-US" smtClean="0"/>
-              <a:t>9/9/2025</a:t>
+              <a:t>9/12/2025</a:t>
             </a:fld>
             <a:endParaRPr lang="en-US"/>
           </a:p>
@@ -7330,7 +7814,7 @@
           <a:p>
             <a:fld id="{846CE7D5-CF57-46EF-B807-FDD0502418D4}" type="datetimeFigureOut">
               <a:rPr lang="en-US" smtClean="0"/>
-              <a:t>9/9/2025</a:t>
+              <a:t>9/12/2025</a:t>
             </a:fld>
             <a:endParaRPr lang="en-US"/>
           </a:p>
@@ -7615,7 +8099,7 @@
           <a:p>
             <a:fld id="{846CE7D5-CF57-46EF-B807-FDD0502418D4}" type="datetimeFigureOut">
               <a:rPr lang="en-US" smtClean="0"/>
-              <a:t>9/9/2025</a:t>
+              <a:t>9/12/2025</a:t>
             </a:fld>
             <a:endParaRPr lang="en-US"/>
           </a:p>
@@ -7939,7 +8423,7 @@
           <a:p>
             <a:fld id="{846CE7D5-CF57-46EF-B807-FDD0502418D4}" type="datetimeFigureOut">
               <a:rPr lang="en-US" smtClean="0"/>
-              <a:t>9/9/2025</a:t>
+              <a:t>9/12/2025</a:t>
             </a:fld>
             <a:endParaRPr lang="en-US"/>
           </a:p>
@@ -8153,7 +8637,7 @@
           <a:p>
             <a:fld id="{846CE7D5-CF57-46EF-B807-FDD0502418D4}" type="datetimeFigureOut">
               <a:rPr lang="en-US" smtClean="0"/>
-              <a:t>9/9/2025</a:t>
+              <a:t>9/12/2025</a:t>
             </a:fld>
             <a:endParaRPr lang="en-US"/>
           </a:p>
@@ -10761,6 +11245,1079 @@
 </p:sld>
 </file>
 
+<file path=ppt/slides/slide10.xml><?xml version="1.0" encoding="utf-8"?>
+<p:sld xmlns:a="http://schemas.openxmlformats.org/drawingml/2006/main" xmlns:r="http://schemas.openxmlformats.org/officeDocument/2006/relationships" xmlns:p="http://schemas.openxmlformats.org/presentationml/2006/main">
+  <p:cSld>
+    <p:bg>
+      <p:bgPr>
+        <a:solidFill>
+          <a:schemeClr val="bg2"/>
+        </a:solidFill>
+        <a:effectLst/>
+      </p:bgPr>
+    </p:bg>
+    <p:spTree>
+      <p:nvGrpSpPr>
+        <p:cNvPr id="1" name="">
+          <a:extLst>
+            <a:ext uri="{FF2B5EF4-FFF2-40B4-BE49-F238E27FC236}">
+              <a16:creationId xmlns:a16="http://schemas.microsoft.com/office/drawing/2014/main" id="{A6D619C6-3342-28A3-53CE-C52DF98C6B3E}"/>
+            </a:ext>
+          </a:extLst>
+        </p:cNvPr>
+        <p:cNvGrpSpPr/>
+        <p:nvPr/>
+      </p:nvGrpSpPr>
+      <p:grpSpPr>
+        <a:xfrm>
+          <a:off x="0" y="0"/>
+          <a:ext cx="0" cy="0"/>
+          <a:chOff x="0" y="0"/>
+          <a:chExt cx="0" cy="0"/>
+        </a:xfrm>
+      </p:grpSpPr>
+      <p:sp useBgFill="1">
+        <p:nvSpPr>
+          <p:cNvPr id="8" name="Rectangle 7">
+            <a:extLst>
+              <a:ext uri="{FF2B5EF4-FFF2-40B4-BE49-F238E27FC236}">
+                <a16:creationId xmlns:a16="http://schemas.microsoft.com/office/drawing/2014/main" id="{D25EEAC4-7772-0939-864E-63013CD5329C}"/>
+              </a:ext>
+              <a:ext uri="{C183D7F6-B498-43B3-948B-1728B52AA6E4}">
+                <adec:decorative xmlns:adec="http://schemas.microsoft.com/office/drawing/2017/decorative" val="1"/>
+              </a:ext>
+            </a:extLst>
+          </p:cNvPr>
+          <p:cNvSpPr>
+            <a:spLocks noGrp="1" noRot="1" noChangeAspect="1" noMove="1" noResize="1" noEditPoints="1" noAdjustHandles="1" noChangeArrowheads="1" noChangeShapeType="1" noTextEdit="1"/>
+          </p:cNvSpPr>
+          <p:nvPr>
+            <p:extLst>
+              <p:ext uri="{386F3935-93C4-4BCD-93E2-E3B085C9AB24}">
+                <p16:designElem xmlns:p16="http://schemas.microsoft.com/office/powerpoint/2015/main" val="1"/>
+              </p:ext>
+            </p:extLst>
+          </p:nvPr>
+        </p:nvSpPr>
+        <p:spPr>
+          <a:xfrm>
+            <a:off x="0" y="0"/>
+            <a:ext cx="12192000" cy="6858000"/>
+          </a:xfrm>
+          <a:prstGeom prst="rect">
+            <a:avLst/>
+          </a:prstGeom>
+          <a:ln>
+            <a:noFill/>
+          </a:ln>
+        </p:spPr>
+        <p:style>
+          <a:lnRef idx="2">
+            <a:schemeClr val="accent1">
+              <a:shade val="50000"/>
+            </a:schemeClr>
+          </a:lnRef>
+          <a:fillRef idx="1">
+            <a:schemeClr val="accent1"/>
+          </a:fillRef>
+          <a:effectRef idx="0">
+            <a:schemeClr val="accent1"/>
+          </a:effectRef>
+          <a:fontRef idx="minor">
+            <a:schemeClr val="lt1"/>
+          </a:fontRef>
+        </p:style>
+        <p:txBody>
+          <a:bodyPr rtlCol="0" anchor="ctr"/>
+          <a:lstStyle/>
+          <a:p>
+            <a:pPr algn="ctr"/>
+            <a:endParaRPr lang="en-US"/>
+          </a:p>
+        </p:txBody>
+      </p:sp>
+      <p:sp>
+        <p:nvSpPr>
+          <p:cNvPr id="10" name="Freeform: Shape 9">
+            <a:extLst>
+              <a:ext uri="{FF2B5EF4-FFF2-40B4-BE49-F238E27FC236}">
+                <a16:creationId xmlns:a16="http://schemas.microsoft.com/office/drawing/2014/main" id="{DF01F57C-5141-A71B-9E1F-945AECA0B9AD}"/>
+              </a:ext>
+              <a:ext uri="{C183D7F6-B498-43B3-948B-1728B52AA6E4}">
+                <adec:decorative xmlns:adec="http://schemas.microsoft.com/office/drawing/2017/decorative" val="1"/>
+              </a:ext>
+            </a:extLst>
+          </p:cNvPr>
+          <p:cNvSpPr>
+            <a:spLocks noGrp="1" noRot="1" noChangeAspect="1" noMove="1" noResize="1" noEditPoints="1" noAdjustHandles="1" noChangeArrowheads="1" noChangeShapeType="1" noTextEdit="1"/>
+          </p:cNvSpPr>
+          <p:nvPr>
+            <p:extLst>
+              <p:ext uri="{386F3935-93C4-4BCD-93E2-E3B085C9AB24}">
+                <p16:designElem xmlns:p16="http://schemas.microsoft.com/office/powerpoint/2015/main" val="1"/>
+              </p:ext>
+            </p:extLst>
+          </p:nvPr>
+        </p:nvSpPr>
+        <p:spPr>
+          <a:xfrm>
+            <a:off x="0" y="0"/>
+            <a:ext cx="12192000" cy="2270839"/>
+          </a:xfrm>
+          <a:custGeom>
+            <a:avLst/>
+            <a:gdLst>
+              <a:gd name="connsiteX0" fmla="*/ 0 w 12192000"/>
+              <a:gd name="connsiteY0" fmla="*/ 0 h 2270839"/>
+              <a:gd name="connsiteX1" fmla="*/ 12192000 w 12192000"/>
+              <a:gd name="connsiteY1" fmla="*/ 0 h 2270839"/>
+              <a:gd name="connsiteX2" fmla="*/ 12192000 w 12192000"/>
+              <a:gd name="connsiteY2" fmla="*/ 213719 h 2270839"/>
+              <a:gd name="connsiteX3" fmla="*/ 12192000 w 12192000"/>
+              <a:gd name="connsiteY3" fmla="*/ 471948 h 2270839"/>
+              <a:gd name="connsiteX4" fmla="*/ 12192000 w 12192000"/>
+              <a:gd name="connsiteY4" fmla="*/ 519830 h 2270839"/>
+              <a:gd name="connsiteX5" fmla="*/ 12192000 w 12192000"/>
+              <a:gd name="connsiteY5" fmla="*/ 744793 h 2270839"/>
+              <a:gd name="connsiteX6" fmla="*/ 12192000 w 12192000"/>
+              <a:gd name="connsiteY6" fmla="*/ 1754021 h 2270839"/>
+              <a:gd name="connsiteX7" fmla="*/ 11957522 w 12192000"/>
+              <a:gd name="connsiteY7" fmla="*/ 1797923 h 2270839"/>
+              <a:gd name="connsiteX8" fmla="*/ 11679973 w 12192000"/>
+              <a:gd name="connsiteY8" fmla="*/ 1847667 h 2270839"/>
+              <a:gd name="connsiteX9" fmla="*/ 11401197 w 12192000"/>
+              <a:gd name="connsiteY9" fmla="*/ 1896360 h 2270839"/>
+              <a:gd name="connsiteX10" fmla="*/ 11121192 w 12192000"/>
+              <a:gd name="connsiteY10" fmla="*/ 1938046 h 2270839"/>
+              <a:gd name="connsiteX11" fmla="*/ 10842416 w 12192000"/>
+              <a:gd name="connsiteY11" fmla="*/ 1980083 h 2270839"/>
+              <a:gd name="connsiteX12" fmla="*/ 10562411 w 12192000"/>
+              <a:gd name="connsiteY12" fmla="*/ 2019318 h 2270839"/>
+              <a:gd name="connsiteX13" fmla="*/ 10286091 w 12192000"/>
+              <a:gd name="connsiteY13" fmla="*/ 2052947 h 2270839"/>
+              <a:gd name="connsiteX14" fmla="*/ 10006086 w 12192000"/>
+              <a:gd name="connsiteY14" fmla="*/ 2084825 h 2270839"/>
+              <a:gd name="connsiteX15" fmla="*/ 9727310 w 12192000"/>
+              <a:gd name="connsiteY15" fmla="*/ 2113901 h 2270839"/>
+              <a:gd name="connsiteX16" fmla="*/ 9453445 w 12192000"/>
+              <a:gd name="connsiteY16" fmla="*/ 2139123 h 2270839"/>
+              <a:gd name="connsiteX17" fmla="*/ 9175897 w 12192000"/>
+              <a:gd name="connsiteY17" fmla="*/ 2164345 h 2270839"/>
+              <a:gd name="connsiteX18" fmla="*/ 8902033 w 12192000"/>
+              <a:gd name="connsiteY18" fmla="*/ 2185364 h 2270839"/>
+              <a:gd name="connsiteX19" fmla="*/ 8628169 w 12192000"/>
+              <a:gd name="connsiteY19" fmla="*/ 2201828 h 2270839"/>
+              <a:gd name="connsiteX20" fmla="*/ 8355533 w 12192000"/>
+              <a:gd name="connsiteY20" fmla="*/ 2218994 h 2270839"/>
+              <a:gd name="connsiteX21" fmla="*/ 8085353 w 12192000"/>
+              <a:gd name="connsiteY21" fmla="*/ 2233356 h 2270839"/>
+              <a:gd name="connsiteX22" fmla="*/ 7817629 w 12192000"/>
+              <a:gd name="connsiteY22" fmla="*/ 2243515 h 2270839"/>
+              <a:gd name="connsiteX23" fmla="*/ 7549905 w 12192000"/>
+              <a:gd name="connsiteY23" fmla="*/ 2252273 h 2270839"/>
+              <a:gd name="connsiteX24" fmla="*/ 7284638 w 12192000"/>
+              <a:gd name="connsiteY24" fmla="*/ 2260680 h 2270839"/>
+              <a:gd name="connsiteX25" fmla="*/ 7023055 w 12192000"/>
+              <a:gd name="connsiteY25" fmla="*/ 2264534 h 2270839"/>
+              <a:gd name="connsiteX26" fmla="*/ 6761472 w 12192000"/>
+              <a:gd name="connsiteY26" fmla="*/ 2268737 h 2270839"/>
+              <a:gd name="connsiteX27" fmla="*/ 6503573 w 12192000"/>
+              <a:gd name="connsiteY27" fmla="*/ 2270839 h 2270839"/>
+              <a:gd name="connsiteX28" fmla="*/ 6248130 w 12192000"/>
+              <a:gd name="connsiteY28" fmla="*/ 2268737 h 2270839"/>
+              <a:gd name="connsiteX29" fmla="*/ 5995144 w 12192000"/>
+              <a:gd name="connsiteY29" fmla="*/ 2268737 h 2270839"/>
+              <a:gd name="connsiteX30" fmla="*/ 5744613 w 12192000"/>
+              <a:gd name="connsiteY30" fmla="*/ 2264534 h 2270839"/>
+              <a:gd name="connsiteX31" fmla="*/ 5498995 w 12192000"/>
+              <a:gd name="connsiteY31" fmla="*/ 2258228 h 2270839"/>
+              <a:gd name="connsiteX32" fmla="*/ 5255834 w 12192000"/>
+              <a:gd name="connsiteY32" fmla="*/ 2252273 h 2270839"/>
+              <a:gd name="connsiteX33" fmla="*/ 5017584 w 12192000"/>
+              <a:gd name="connsiteY33" fmla="*/ 2245617 h 2270839"/>
+              <a:gd name="connsiteX34" fmla="*/ 4780562 w 12192000"/>
+              <a:gd name="connsiteY34" fmla="*/ 2235458 h 2270839"/>
+              <a:gd name="connsiteX35" fmla="*/ 4547227 w 12192000"/>
+              <a:gd name="connsiteY35" fmla="*/ 2224598 h 2270839"/>
+              <a:gd name="connsiteX36" fmla="*/ 4318800 w 12192000"/>
+              <a:gd name="connsiteY36" fmla="*/ 2214790 h 2270839"/>
+              <a:gd name="connsiteX37" fmla="*/ 3873004 w 12192000"/>
+              <a:gd name="connsiteY37" fmla="*/ 2187115 h 2270839"/>
+              <a:gd name="connsiteX38" fmla="*/ 3445628 w 12192000"/>
+              <a:gd name="connsiteY38" fmla="*/ 2157690 h 2270839"/>
+              <a:gd name="connsiteX39" fmla="*/ 3035446 w 12192000"/>
+              <a:gd name="connsiteY39" fmla="*/ 2126862 h 2270839"/>
+              <a:gd name="connsiteX40" fmla="*/ 2647370 w 12192000"/>
+              <a:gd name="connsiteY40" fmla="*/ 2092883 h 2270839"/>
+              <a:gd name="connsiteX41" fmla="*/ 2276487 w 12192000"/>
+              <a:gd name="connsiteY41" fmla="*/ 2057501 h 2270839"/>
+              <a:gd name="connsiteX42" fmla="*/ 1932621 w 12192000"/>
+              <a:gd name="connsiteY42" fmla="*/ 2019318 h 2270839"/>
+              <a:gd name="connsiteX43" fmla="*/ 1609634 w 12192000"/>
+              <a:gd name="connsiteY43" fmla="*/ 1981835 h 2270839"/>
+              <a:gd name="connsiteX44" fmla="*/ 1312435 w 12192000"/>
+              <a:gd name="connsiteY44" fmla="*/ 1944352 h 2270839"/>
+              <a:gd name="connsiteX45" fmla="*/ 1039799 w 12192000"/>
+              <a:gd name="connsiteY45" fmla="*/ 1908971 h 2270839"/>
+              <a:gd name="connsiteX46" fmla="*/ 797865 w 12192000"/>
+              <a:gd name="connsiteY46" fmla="*/ 1875341 h 2270839"/>
+              <a:gd name="connsiteX47" fmla="*/ 579265 w 12192000"/>
+              <a:gd name="connsiteY47" fmla="*/ 1843463 h 2270839"/>
+              <a:gd name="connsiteX48" fmla="*/ 395052 w 12192000"/>
+              <a:gd name="connsiteY48" fmla="*/ 1816840 h 2270839"/>
+              <a:gd name="connsiteX49" fmla="*/ 240312 w 12192000"/>
+              <a:gd name="connsiteY49" fmla="*/ 1791617 h 2270839"/>
+              <a:gd name="connsiteX50" fmla="*/ 27853 w 12192000"/>
+              <a:gd name="connsiteY50" fmla="*/ 1755536 h 2270839"/>
+              <a:gd name="connsiteX51" fmla="*/ 0 w 12192000"/>
+              <a:gd name="connsiteY51" fmla="*/ 1750823 h 2270839"/>
+              <a:gd name="connsiteX52" fmla="*/ 0 w 12192000"/>
+              <a:gd name="connsiteY52" fmla="*/ 744793 h 2270839"/>
+              <a:gd name="connsiteX53" fmla="*/ 0 w 12192000"/>
+              <a:gd name="connsiteY53" fmla="*/ 519830 h 2270839"/>
+              <a:gd name="connsiteX54" fmla="*/ 0 w 12192000"/>
+              <a:gd name="connsiteY54" fmla="*/ 471948 h 2270839"/>
+              <a:gd name="connsiteX55" fmla="*/ 0 w 12192000"/>
+              <a:gd name="connsiteY55" fmla="*/ 213719 h 2270839"/>
+            </a:gdLst>
+            <a:ahLst/>
+            <a:cxnLst>
+              <a:cxn ang="0">
+                <a:pos x="connsiteX0" y="connsiteY0"/>
+              </a:cxn>
+              <a:cxn ang="0">
+                <a:pos x="connsiteX1" y="connsiteY1"/>
+              </a:cxn>
+              <a:cxn ang="0">
+                <a:pos x="connsiteX2" y="connsiteY2"/>
+              </a:cxn>
+              <a:cxn ang="0">
+                <a:pos x="connsiteX3" y="connsiteY3"/>
+              </a:cxn>
+              <a:cxn ang="0">
+                <a:pos x="connsiteX4" y="connsiteY4"/>
+              </a:cxn>
+              <a:cxn ang="0">
+                <a:pos x="connsiteX5" y="connsiteY5"/>
+              </a:cxn>
+              <a:cxn ang="0">
+                <a:pos x="connsiteX6" y="connsiteY6"/>
+              </a:cxn>
+              <a:cxn ang="0">
+                <a:pos x="connsiteX7" y="connsiteY7"/>
+              </a:cxn>
+              <a:cxn ang="0">
+                <a:pos x="connsiteX8" y="connsiteY8"/>
+              </a:cxn>
+              <a:cxn ang="0">
+                <a:pos x="connsiteX9" y="connsiteY9"/>
+              </a:cxn>
+              <a:cxn ang="0">
+                <a:pos x="connsiteX10" y="connsiteY10"/>
+              </a:cxn>
+              <a:cxn ang="0">
+                <a:pos x="connsiteX11" y="connsiteY11"/>
+              </a:cxn>
+              <a:cxn ang="0">
+                <a:pos x="connsiteX12" y="connsiteY12"/>
+              </a:cxn>
+              <a:cxn ang="0">
+                <a:pos x="connsiteX13" y="connsiteY13"/>
+              </a:cxn>
+              <a:cxn ang="0">
+                <a:pos x="connsiteX14" y="connsiteY14"/>
+              </a:cxn>
+              <a:cxn ang="0">
+                <a:pos x="connsiteX15" y="connsiteY15"/>
+              </a:cxn>
+              <a:cxn ang="0">
+                <a:pos x="connsiteX16" y="connsiteY16"/>
+              </a:cxn>
+              <a:cxn ang="0">
+                <a:pos x="connsiteX17" y="connsiteY17"/>
+              </a:cxn>
+              <a:cxn ang="0">
+                <a:pos x="connsiteX18" y="connsiteY18"/>
+              </a:cxn>
+              <a:cxn ang="0">
+                <a:pos x="connsiteX19" y="connsiteY19"/>
+              </a:cxn>
+              <a:cxn ang="0">
+                <a:pos x="connsiteX20" y="connsiteY20"/>
+              </a:cxn>
+              <a:cxn ang="0">
+                <a:pos x="connsiteX21" y="connsiteY21"/>
+              </a:cxn>
+              <a:cxn ang="0">
+                <a:pos x="connsiteX22" y="connsiteY22"/>
+              </a:cxn>
+              <a:cxn ang="0">
+                <a:pos x="connsiteX23" y="connsiteY23"/>
+              </a:cxn>
+              <a:cxn ang="0">
+                <a:pos x="connsiteX24" y="connsiteY24"/>
+              </a:cxn>
+              <a:cxn ang="0">
+                <a:pos x="connsiteX25" y="connsiteY25"/>
+              </a:cxn>
+              <a:cxn ang="0">
+                <a:pos x="connsiteX26" y="connsiteY26"/>
+              </a:cxn>
+              <a:cxn ang="0">
+                <a:pos x="connsiteX27" y="connsiteY27"/>
+              </a:cxn>
+              <a:cxn ang="0">
+                <a:pos x="connsiteX28" y="connsiteY28"/>
+              </a:cxn>
+              <a:cxn ang="0">
+                <a:pos x="connsiteX29" y="connsiteY29"/>
+              </a:cxn>
+              <a:cxn ang="0">
+                <a:pos x="connsiteX30" y="connsiteY30"/>
+              </a:cxn>
+              <a:cxn ang="0">
+                <a:pos x="connsiteX31" y="connsiteY31"/>
+              </a:cxn>
+              <a:cxn ang="0">
+                <a:pos x="connsiteX32" y="connsiteY32"/>
+              </a:cxn>
+              <a:cxn ang="0">
+                <a:pos x="connsiteX33" y="connsiteY33"/>
+              </a:cxn>
+              <a:cxn ang="0">
+                <a:pos x="connsiteX34" y="connsiteY34"/>
+              </a:cxn>
+              <a:cxn ang="0">
+                <a:pos x="connsiteX35" y="connsiteY35"/>
+              </a:cxn>
+              <a:cxn ang="0">
+                <a:pos x="connsiteX36" y="connsiteY36"/>
+              </a:cxn>
+              <a:cxn ang="0">
+                <a:pos x="connsiteX37" y="connsiteY37"/>
+              </a:cxn>
+              <a:cxn ang="0">
+                <a:pos x="connsiteX38" y="connsiteY38"/>
+              </a:cxn>
+              <a:cxn ang="0">
+                <a:pos x="connsiteX39" y="connsiteY39"/>
+              </a:cxn>
+              <a:cxn ang="0">
+                <a:pos x="connsiteX40" y="connsiteY40"/>
+              </a:cxn>
+              <a:cxn ang="0">
+                <a:pos x="connsiteX41" y="connsiteY41"/>
+              </a:cxn>
+              <a:cxn ang="0">
+                <a:pos x="connsiteX42" y="connsiteY42"/>
+              </a:cxn>
+              <a:cxn ang="0">
+                <a:pos x="connsiteX43" y="connsiteY43"/>
+              </a:cxn>
+              <a:cxn ang="0">
+                <a:pos x="connsiteX44" y="connsiteY44"/>
+              </a:cxn>
+              <a:cxn ang="0">
+                <a:pos x="connsiteX45" y="connsiteY45"/>
+              </a:cxn>
+              <a:cxn ang="0">
+                <a:pos x="connsiteX46" y="connsiteY46"/>
+              </a:cxn>
+              <a:cxn ang="0">
+                <a:pos x="connsiteX47" y="connsiteY47"/>
+              </a:cxn>
+              <a:cxn ang="0">
+                <a:pos x="connsiteX48" y="connsiteY48"/>
+              </a:cxn>
+              <a:cxn ang="0">
+                <a:pos x="connsiteX49" y="connsiteY49"/>
+              </a:cxn>
+              <a:cxn ang="0">
+                <a:pos x="connsiteX50" y="connsiteY50"/>
+              </a:cxn>
+              <a:cxn ang="0">
+                <a:pos x="connsiteX51" y="connsiteY51"/>
+              </a:cxn>
+              <a:cxn ang="0">
+                <a:pos x="connsiteX52" y="connsiteY52"/>
+              </a:cxn>
+              <a:cxn ang="0">
+                <a:pos x="connsiteX53" y="connsiteY53"/>
+              </a:cxn>
+              <a:cxn ang="0">
+                <a:pos x="connsiteX54" y="connsiteY54"/>
+              </a:cxn>
+              <a:cxn ang="0">
+                <a:pos x="connsiteX55" y="connsiteY55"/>
+              </a:cxn>
+            </a:cxnLst>
+            <a:rect l="l" t="t" r="r" b="b"/>
+            <a:pathLst>
+              <a:path w="12192000" h="2270839">
+                <a:moveTo>
+                  <a:pt x="0" y="0"/>
+                </a:moveTo>
+                <a:lnTo>
+                  <a:pt x="12192000" y="0"/>
+                </a:lnTo>
+                <a:lnTo>
+                  <a:pt x="12192000" y="213719"/>
+                </a:lnTo>
+                <a:lnTo>
+                  <a:pt x="12192000" y="471948"/>
+                </a:lnTo>
+                <a:lnTo>
+                  <a:pt x="12192000" y="519830"/>
+                </a:lnTo>
+                <a:lnTo>
+                  <a:pt x="12192000" y="744793"/>
+                </a:lnTo>
+                <a:lnTo>
+                  <a:pt x="12192000" y="1754021"/>
+                </a:lnTo>
+                <a:lnTo>
+                  <a:pt x="11957522" y="1797923"/>
+                </a:lnTo>
+                <a:lnTo>
+                  <a:pt x="11679973" y="1847667"/>
+                </a:lnTo>
+                <a:lnTo>
+                  <a:pt x="11401197" y="1896360"/>
+                </a:lnTo>
+                <a:lnTo>
+                  <a:pt x="11121192" y="1938046"/>
+                </a:lnTo>
+                <a:lnTo>
+                  <a:pt x="10842416" y="1980083"/>
+                </a:lnTo>
+                <a:lnTo>
+                  <a:pt x="10562411" y="2019318"/>
+                </a:lnTo>
+                <a:lnTo>
+                  <a:pt x="10286091" y="2052947"/>
+                </a:lnTo>
+                <a:lnTo>
+                  <a:pt x="10006086" y="2084825"/>
+                </a:lnTo>
+                <a:lnTo>
+                  <a:pt x="9727310" y="2113901"/>
+                </a:lnTo>
+                <a:lnTo>
+                  <a:pt x="9453445" y="2139123"/>
+                </a:lnTo>
+                <a:lnTo>
+                  <a:pt x="9175897" y="2164345"/>
+                </a:lnTo>
+                <a:lnTo>
+                  <a:pt x="8902033" y="2185364"/>
+                </a:lnTo>
+                <a:lnTo>
+                  <a:pt x="8628169" y="2201828"/>
+                </a:lnTo>
+                <a:lnTo>
+                  <a:pt x="8355533" y="2218994"/>
+                </a:lnTo>
+                <a:lnTo>
+                  <a:pt x="8085353" y="2233356"/>
+                </a:lnTo>
+                <a:lnTo>
+                  <a:pt x="7817629" y="2243515"/>
+                </a:lnTo>
+                <a:lnTo>
+                  <a:pt x="7549905" y="2252273"/>
+                </a:lnTo>
+                <a:lnTo>
+                  <a:pt x="7284638" y="2260680"/>
+                </a:lnTo>
+                <a:lnTo>
+                  <a:pt x="7023055" y="2264534"/>
+                </a:lnTo>
+                <a:lnTo>
+                  <a:pt x="6761472" y="2268737"/>
+                </a:lnTo>
+                <a:lnTo>
+                  <a:pt x="6503573" y="2270839"/>
+                </a:lnTo>
+                <a:lnTo>
+                  <a:pt x="6248130" y="2268737"/>
+                </a:lnTo>
+                <a:lnTo>
+                  <a:pt x="5995144" y="2268737"/>
+                </a:lnTo>
+                <a:lnTo>
+                  <a:pt x="5744613" y="2264534"/>
+                </a:lnTo>
+                <a:lnTo>
+                  <a:pt x="5498995" y="2258228"/>
+                </a:lnTo>
+                <a:lnTo>
+                  <a:pt x="5255834" y="2252273"/>
+                </a:lnTo>
+                <a:lnTo>
+                  <a:pt x="5017584" y="2245617"/>
+                </a:lnTo>
+                <a:lnTo>
+                  <a:pt x="4780562" y="2235458"/>
+                </a:lnTo>
+                <a:lnTo>
+                  <a:pt x="4547227" y="2224598"/>
+                </a:lnTo>
+                <a:lnTo>
+                  <a:pt x="4318800" y="2214790"/>
+                </a:lnTo>
+                <a:lnTo>
+                  <a:pt x="3873004" y="2187115"/>
+                </a:lnTo>
+                <a:lnTo>
+                  <a:pt x="3445628" y="2157690"/>
+                </a:lnTo>
+                <a:lnTo>
+                  <a:pt x="3035446" y="2126862"/>
+                </a:lnTo>
+                <a:lnTo>
+                  <a:pt x="2647370" y="2092883"/>
+                </a:lnTo>
+                <a:lnTo>
+                  <a:pt x="2276487" y="2057501"/>
+                </a:lnTo>
+                <a:lnTo>
+                  <a:pt x="1932621" y="2019318"/>
+                </a:lnTo>
+                <a:lnTo>
+                  <a:pt x="1609634" y="1981835"/>
+                </a:lnTo>
+                <a:lnTo>
+                  <a:pt x="1312435" y="1944352"/>
+                </a:lnTo>
+                <a:lnTo>
+                  <a:pt x="1039799" y="1908971"/>
+                </a:lnTo>
+                <a:lnTo>
+                  <a:pt x="797865" y="1875341"/>
+                </a:lnTo>
+                <a:lnTo>
+                  <a:pt x="579265" y="1843463"/>
+                </a:lnTo>
+                <a:lnTo>
+                  <a:pt x="395052" y="1816840"/>
+                </a:lnTo>
+                <a:lnTo>
+                  <a:pt x="240312" y="1791617"/>
+                </a:lnTo>
+                <a:lnTo>
+                  <a:pt x="27853" y="1755536"/>
+                </a:lnTo>
+                <a:lnTo>
+                  <a:pt x="0" y="1750823"/>
+                </a:lnTo>
+                <a:lnTo>
+                  <a:pt x="0" y="744793"/>
+                </a:lnTo>
+                <a:lnTo>
+                  <a:pt x="0" y="519830"/>
+                </a:lnTo>
+                <a:lnTo>
+                  <a:pt x="0" y="471948"/>
+                </a:lnTo>
+                <a:lnTo>
+                  <a:pt x="0" y="213719"/>
+                </a:lnTo>
+                <a:close/>
+              </a:path>
+            </a:pathLst>
+          </a:custGeom>
+          <a:solidFill>
+            <a:schemeClr val="tx2"/>
+          </a:solidFill>
+          <a:ln w="44450">
+            <a:noFill/>
+          </a:ln>
+          <a:effectLst/>
+        </p:spPr>
+        <p:style>
+          <a:lnRef idx="2">
+            <a:schemeClr val="accent1">
+              <a:shade val="50000"/>
+            </a:schemeClr>
+          </a:lnRef>
+          <a:fillRef idx="1003">
+            <a:schemeClr val="dk2"/>
+          </a:fillRef>
+          <a:effectRef idx="0">
+            <a:schemeClr val="accent1"/>
+          </a:effectRef>
+          <a:fontRef idx="minor">
+            <a:schemeClr val="lt1"/>
+          </a:fontRef>
+        </p:style>
+        <p:txBody>
+          <a:bodyPr wrap="square" rtlCol="0" anchor="ctr">
+            <a:noAutofit/>
+          </a:bodyPr>
+          <a:lstStyle/>
+          <a:p>
+            <a:pPr algn="ctr"/>
+            <a:endParaRPr lang="en-US"/>
+          </a:p>
+        </p:txBody>
+      </p:sp>
+      <p:pic>
+        <p:nvPicPr>
+          <p:cNvPr id="12" name="Picture 11">
+            <a:extLst>
+              <a:ext uri="{FF2B5EF4-FFF2-40B4-BE49-F238E27FC236}">
+                <a16:creationId xmlns:a16="http://schemas.microsoft.com/office/drawing/2014/main" id="{630672AA-3111-CF5C-48F7-8F145ABA21E5}"/>
+              </a:ext>
+              <a:ext uri="{C183D7F6-B498-43B3-948B-1728B52AA6E4}">
+                <adec:decorative xmlns:adec="http://schemas.microsoft.com/office/drawing/2017/decorative" val="1"/>
+              </a:ext>
+            </a:extLst>
+          </p:cNvPr>
+          <p:cNvPicPr>
+            <a:picLocks noGrp="1" noRot="1" noChangeAspect="1" noMove="1" noResize="1" noEditPoints="1" noAdjustHandles="1" noChangeArrowheads="1" noChangeShapeType="1" noCrop="1"/>
+          </p:cNvPicPr>
+          <p:nvPr>
+            <p:extLst>
+              <p:ext uri="{386F3935-93C4-4BCD-93E2-E3B085C9AB24}">
+                <p16:designElem xmlns:p16="http://schemas.microsoft.com/office/powerpoint/2015/main" val="1"/>
+              </p:ext>
+            </p:extLst>
+          </p:nvPr>
+        </p:nvPicPr>
+        <p:blipFill rotWithShape="1">
+          <a:blip r:embed="rId2">
+            <a:extLst>
+              <a:ext uri="{28A0092B-C50C-407E-A947-70E740481C1C}">
+                <a14:useLocalDpi xmlns:a14="http://schemas.microsoft.com/office/drawing/2010/main" val="0"/>
+              </a:ext>
+            </a:extLst>
+          </a:blip>
+          <a:srcRect l="25900" b="63148"/>
+          <a:stretch/>
+        </p:blipFill>
+        <p:spPr>
+          <a:xfrm>
+            <a:off x="4071257" y="1"/>
+            <a:ext cx="8117568" cy="2270839"/>
+          </a:xfrm>
+          <a:custGeom>
+            <a:avLst/>
+            <a:gdLst>
+              <a:gd name="connsiteX0" fmla="*/ 0 w 8117568"/>
+              <a:gd name="connsiteY0" fmla="*/ 0 h 2270839"/>
+              <a:gd name="connsiteX1" fmla="*/ 8117568 w 8117568"/>
+              <a:gd name="connsiteY1" fmla="*/ 0 h 2270839"/>
+              <a:gd name="connsiteX2" fmla="*/ 8117568 w 8117568"/>
+              <a:gd name="connsiteY2" fmla="*/ 1754616 h 2270839"/>
+              <a:gd name="connsiteX3" fmla="*/ 7886265 w 8117568"/>
+              <a:gd name="connsiteY3" fmla="*/ 1797923 h 2270839"/>
+              <a:gd name="connsiteX4" fmla="*/ 7608716 w 8117568"/>
+              <a:gd name="connsiteY4" fmla="*/ 1847667 h 2270839"/>
+              <a:gd name="connsiteX5" fmla="*/ 7329940 w 8117568"/>
+              <a:gd name="connsiteY5" fmla="*/ 1896360 h 2270839"/>
+              <a:gd name="connsiteX6" fmla="*/ 7049935 w 8117568"/>
+              <a:gd name="connsiteY6" fmla="*/ 1938046 h 2270839"/>
+              <a:gd name="connsiteX7" fmla="*/ 6771159 w 8117568"/>
+              <a:gd name="connsiteY7" fmla="*/ 1980083 h 2270839"/>
+              <a:gd name="connsiteX8" fmla="*/ 6491154 w 8117568"/>
+              <a:gd name="connsiteY8" fmla="*/ 2019318 h 2270839"/>
+              <a:gd name="connsiteX9" fmla="*/ 6214834 w 8117568"/>
+              <a:gd name="connsiteY9" fmla="*/ 2052947 h 2270839"/>
+              <a:gd name="connsiteX10" fmla="*/ 5934829 w 8117568"/>
+              <a:gd name="connsiteY10" fmla="*/ 2084825 h 2270839"/>
+              <a:gd name="connsiteX11" fmla="*/ 5656053 w 8117568"/>
+              <a:gd name="connsiteY11" fmla="*/ 2113901 h 2270839"/>
+              <a:gd name="connsiteX12" fmla="*/ 5382188 w 8117568"/>
+              <a:gd name="connsiteY12" fmla="*/ 2139123 h 2270839"/>
+              <a:gd name="connsiteX13" fmla="*/ 5104640 w 8117568"/>
+              <a:gd name="connsiteY13" fmla="*/ 2164345 h 2270839"/>
+              <a:gd name="connsiteX14" fmla="*/ 4830776 w 8117568"/>
+              <a:gd name="connsiteY14" fmla="*/ 2185364 h 2270839"/>
+              <a:gd name="connsiteX15" fmla="*/ 4556912 w 8117568"/>
+              <a:gd name="connsiteY15" fmla="*/ 2201828 h 2270839"/>
+              <a:gd name="connsiteX16" fmla="*/ 4284276 w 8117568"/>
+              <a:gd name="connsiteY16" fmla="*/ 2218994 h 2270839"/>
+              <a:gd name="connsiteX17" fmla="*/ 4014096 w 8117568"/>
+              <a:gd name="connsiteY17" fmla="*/ 2233356 h 2270839"/>
+              <a:gd name="connsiteX18" fmla="*/ 3746372 w 8117568"/>
+              <a:gd name="connsiteY18" fmla="*/ 2243515 h 2270839"/>
+              <a:gd name="connsiteX19" fmla="*/ 3478648 w 8117568"/>
+              <a:gd name="connsiteY19" fmla="*/ 2252273 h 2270839"/>
+              <a:gd name="connsiteX20" fmla="*/ 3213381 w 8117568"/>
+              <a:gd name="connsiteY20" fmla="*/ 2260680 h 2270839"/>
+              <a:gd name="connsiteX21" fmla="*/ 2951798 w 8117568"/>
+              <a:gd name="connsiteY21" fmla="*/ 2264534 h 2270839"/>
+              <a:gd name="connsiteX22" fmla="*/ 2690215 w 8117568"/>
+              <a:gd name="connsiteY22" fmla="*/ 2268737 h 2270839"/>
+              <a:gd name="connsiteX23" fmla="*/ 2432316 w 8117568"/>
+              <a:gd name="connsiteY23" fmla="*/ 2270839 h 2270839"/>
+              <a:gd name="connsiteX24" fmla="*/ 2176873 w 8117568"/>
+              <a:gd name="connsiteY24" fmla="*/ 2268737 h 2270839"/>
+              <a:gd name="connsiteX25" fmla="*/ 1923887 w 8117568"/>
+              <a:gd name="connsiteY25" fmla="*/ 2268737 h 2270839"/>
+              <a:gd name="connsiteX26" fmla="*/ 1673356 w 8117568"/>
+              <a:gd name="connsiteY26" fmla="*/ 2264534 h 2270839"/>
+              <a:gd name="connsiteX27" fmla="*/ 1427738 w 8117568"/>
+              <a:gd name="connsiteY27" fmla="*/ 2258228 h 2270839"/>
+              <a:gd name="connsiteX28" fmla="*/ 1184577 w 8117568"/>
+              <a:gd name="connsiteY28" fmla="*/ 2252273 h 2270839"/>
+              <a:gd name="connsiteX29" fmla="*/ 946327 w 8117568"/>
+              <a:gd name="connsiteY29" fmla="*/ 2245617 h 2270839"/>
+              <a:gd name="connsiteX30" fmla="*/ 709305 w 8117568"/>
+              <a:gd name="connsiteY30" fmla="*/ 2235458 h 2270839"/>
+              <a:gd name="connsiteX31" fmla="*/ 475970 w 8117568"/>
+              <a:gd name="connsiteY31" fmla="*/ 2224598 h 2270839"/>
+              <a:gd name="connsiteX32" fmla="*/ 247543 w 8117568"/>
+              <a:gd name="connsiteY32" fmla="*/ 2214790 h 2270839"/>
+              <a:gd name="connsiteX33" fmla="*/ 0 w 8117568"/>
+              <a:gd name="connsiteY33" fmla="*/ 2199423 h 2270839"/>
+            </a:gdLst>
+            <a:ahLst/>
+            <a:cxnLst>
+              <a:cxn ang="0">
+                <a:pos x="connsiteX0" y="connsiteY0"/>
+              </a:cxn>
+              <a:cxn ang="0">
+                <a:pos x="connsiteX1" y="connsiteY1"/>
+              </a:cxn>
+              <a:cxn ang="0">
+                <a:pos x="connsiteX2" y="connsiteY2"/>
+              </a:cxn>
+              <a:cxn ang="0">
+                <a:pos x="connsiteX3" y="connsiteY3"/>
+              </a:cxn>
+              <a:cxn ang="0">
+                <a:pos x="connsiteX4" y="connsiteY4"/>
+              </a:cxn>
+              <a:cxn ang="0">
+                <a:pos x="connsiteX5" y="connsiteY5"/>
+              </a:cxn>
+              <a:cxn ang="0">
+                <a:pos x="connsiteX6" y="connsiteY6"/>
+              </a:cxn>
+              <a:cxn ang="0">
+                <a:pos x="connsiteX7" y="connsiteY7"/>
+              </a:cxn>
+              <a:cxn ang="0">
+                <a:pos x="connsiteX8" y="connsiteY8"/>
+              </a:cxn>
+              <a:cxn ang="0">
+                <a:pos x="connsiteX9" y="connsiteY9"/>
+              </a:cxn>
+              <a:cxn ang="0">
+                <a:pos x="connsiteX10" y="connsiteY10"/>
+              </a:cxn>
+              <a:cxn ang="0">
+                <a:pos x="connsiteX11" y="connsiteY11"/>
+              </a:cxn>
+              <a:cxn ang="0">
+                <a:pos x="connsiteX12" y="connsiteY12"/>
+              </a:cxn>
+              <a:cxn ang="0">
+                <a:pos x="connsiteX13" y="connsiteY13"/>
+              </a:cxn>
+              <a:cxn ang="0">
+                <a:pos x="connsiteX14" y="connsiteY14"/>
+              </a:cxn>
+              <a:cxn ang="0">
+                <a:pos x="connsiteX15" y="connsiteY15"/>
+              </a:cxn>
+              <a:cxn ang="0">
+                <a:pos x="connsiteX16" y="connsiteY16"/>
+              </a:cxn>
+              <a:cxn ang="0">
+                <a:pos x="connsiteX17" y="connsiteY17"/>
+              </a:cxn>
+              <a:cxn ang="0">
+                <a:pos x="connsiteX18" y="connsiteY18"/>
+              </a:cxn>
+              <a:cxn ang="0">
+                <a:pos x="connsiteX19" y="connsiteY19"/>
+              </a:cxn>
+              <a:cxn ang="0">
+                <a:pos x="connsiteX20" y="connsiteY20"/>
+              </a:cxn>
+              <a:cxn ang="0">
+                <a:pos x="connsiteX21" y="connsiteY21"/>
+              </a:cxn>
+              <a:cxn ang="0">
+                <a:pos x="connsiteX22" y="connsiteY22"/>
+              </a:cxn>
+              <a:cxn ang="0">
+                <a:pos x="connsiteX23" y="connsiteY23"/>
+              </a:cxn>
+              <a:cxn ang="0">
+                <a:pos x="connsiteX24" y="connsiteY24"/>
+              </a:cxn>
+              <a:cxn ang="0">
+                <a:pos x="connsiteX25" y="connsiteY25"/>
+              </a:cxn>
+              <a:cxn ang="0">
+                <a:pos x="connsiteX26" y="connsiteY26"/>
+              </a:cxn>
+              <a:cxn ang="0">
+                <a:pos x="connsiteX27" y="connsiteY27"/>
+              </a:cxn>
+              <a:cxn ang="0">
+                <a:pos x="connsiteX28" y="connsiteY28"/>
+              </a:cxn>
+              <a:cxn ang="0">
+                <a:pos x="connsiteX29" y="connsiteY29"/>
+              </a:cxn>
+              <a:cxn ang="0">
+                <a:pos x="connsiteX30" y="connsiteY30"/>
+              </a:cxn>
+              <a:cxn ang="0">
+                <a:pos x="connsiteX31" y="connsiteY31"/>
+              </a:cxn>
+              <a:cxn ang="0">
+                <a:pos x="connsiteX32" y="connsiteY32"/>
+              </a:cxn>
+              <a:cxn ang="0">
+                <a:pos x="connsiteX33" y="connsiteY33"/>
+              </a:cxn>
+            </a:cxnLst>
+            <a:rect l="l" t="t" r="r" b="b"/>
+            <a:pathLst>
+              <a:path w="8117568" h="2270839">
+                <a:moveTo>
+                  <a:pt x="0" y="0"/>
+                </a:moveTo>
+                <a:lnTo>
+                  <a:pt x="8117568" y="0"/>
+                </a:lnTo>
+                <a:lnTo>
+                  <a:pt x="8117568" y="1754616"/>
+                </a:lnTo>
+                <a:lnTo>
+                  <a:pt x="7886265" y="1797923"/>
+                </a:lnTo>
+                <a:lnTo>
+                  <a:pt x="7608716" y="1847667"/>
+                </a:lnTo>
+                <a:lnTo>
+                  <a:pt x="7329940" y="1896360"/>
+                </a:lnTo>
+                <a:lnTo>
+                  <a:pt x="7049935" y="1938046"/>
+                </a:lnTo>
+                <a:lnTo>
+                  <a:pt x="6771159" y="1980083"/>
+                </a:lnTo>
+                <a:lnTo>
+                  <a:pt x="6491154" y="2019318"/>
+                </a:lnTo>
+                <a:lnTo>
+                  <a:pt x="6214834" y="2052947"/>
+                </a:lnTo>
+                <a:lnTo>
+                  <a:pt x="5934829" y="2084825"/>
+                </a:lnTo>
+                <a:lnTo>
+                  <a:pt x="5656053" y="2113901"/>
+                </a:lnTo>
+                <a:lnTo>
+                  <a:pt x="5382188" y="2139123"/>
+                </a:lnTo>
+                <a:lnTo>
+                  <a:pt x="5104640" y="2164345"/>
+                </a:lnTo>
+                <a:lnTo>
+                  <a:pt x="4830776" y="2185364"/>
+                </a:lnTo>
+                <a:lnTo>
+                  <a:pt x="4556912" y="2201828"/>
+                </a:lnTo>
+                <a:lnTo>
+                  <a:pt x="4284276" y="2218994"/>
+                </a:lnTo>
+                <a:lnTo>
+                  <a:pt x="4014096" y="2233356"/>
+                </a:lnTo>
+                <a:lnTo>
+                  <a:pt x="3746372" y="2243515"/>
+                </a:lnTo>
+                <a:lnTo>
+                  <a:pt x="3478648" y="2252273"/>
+                </a:lnTo>
+                <a:lnTo>
+                  <a:pt x="3213381" y="2260680"/>
+                </a:lnTo>
+                <a:lnTo>
+                  <a:pt x="2951798" y="2264534"/>
+                </a:lnTo>
+                <a:lnTo>
+                  <a:pt x="2690215" y="2268737"/>
+                </a:lnTo>
+                <a:lnTo>
+                  <a:pt x="2432316" y="2270839"/>
+                </a:lnTo>
+                <a:lnTo>
+                  <a:pt x="2176873" y="2268737"/>
+                </a:lnTo>
+                <a:lnTo>
+                  <a:pt x="1923887" y="2268737"/>
+                </a:lnTo>
+                <a:lnTo>
+                  <a:pt x="1673356" y="2264534"/>
+                </a:lnTo>
+                <a:lnTo>
+                  <a:pt x="1427738" y="2258228"/>
+                </a:lnTo>
+                <a:lnTo>
+                  <a:pt x="1184577" y="2252273"/>
+                </a:lnTo>
+                <a:lnTo>
+                  <a:pt x="946327" y="2245617"/>
+                </a:lnTo>
+                <a:lnTo>
+                  <a:pt x="709305" y="2235458"/>
+                </a:lnTo>
+                <a:lnTo>
+                  <a:pt x="475970" y="2224598"/>
+                </a:lnTo>
+                <a:lnTo>
+                  <a:pt x="247543" y="2214790"/>
+                </a:lnTo>
+                <a:lnTo>
+                  <a:pt x="0" y="2199423"/>
+                </a:lnTo>
+                <a:close/>
+              </a:path>
+            </a:pathLst>
+          </a:custGeom>
+        </p:spPr>
+      </p:pic>
+      <p:sp>
+        <p:nvSpPr>
+          <p:cNvPr id="2" name="Title 1">
+            <a:extLst>
+              <a:ext uri="{FF2B5EF4-FFF2-40B4-BE49-F238E27FC236}">
+                <a16:creationId xmlns:a16="http://schemas.microsoft.com/office/drawing/2014/main" id="{674CE8CA-2AB0-935B-A4D6-567C36B30575}"/>
+              </a:ext>
+            </a:extLst>
+          </p:cNvPr>
+          <p:cNvSpPr>
+            <a:spLocks noGrp="1"/>
+          </p:cNvSpPr>
+          <p:nvPr>
+            <p:ph type="title"/>
+          </p:nvPr>
+        </p:nvSpPr>
+        <p:spPr>
+          <a:xfrm>
+            <a:off x="1030288" y="609600"/>
+            <a:ext cx="10131425" cy="1110343"/>
+          </a:xfrm>
+        </p:spPr>
+        <p:txBody>
+          <a:bodyPr>
+            <a:normAutofit/>
+          </a:bodyPr>
+          <a:lstStyle/>
+          <a:p>
+            <a:pPr algn="ctr"/>
+            <a:r>
+              <a:rPr lang="en-US" dirty="0">
+                <a:solidFill>
+                  <a:schemeClr val="bg1"/>
+                </a:solidFill>
+              </a:rPr>
+              <a:t>Conclusions and the Future</a:t>
+            </a:r>
+          </a:p>
+        </p:txBody>
+      </p:sp>
+      <p:sp>
+        <p:nvSpPr>
+          <p:cNvPr id="3" name="Content Placeholder 2">
+            <a:extLst>
+              <a:ext uri="{FF2B5EF4-FFF2-40B4-BE49-F238E27FC236}">
+                <a16:creationId xmlns:a16="http://schemas.microsoft.com/office/drawing/2014/main" id="{55BCD8E3-E3F6-765E-373E-6DB10DD6CE2C}"/>
+              </a:ext>
+            </a:extLst>
+          </p:cNvPr>
+          <p:cNvSpPr>
+            <a:spLocks noGrp="1"/>
+          </p:cNvSpPr>
+          <p:nvPr>
+            <p:ph idx="1"/>
+          </p:nvPr>
+        </p:nvSpPr>
+        <p:spPr>
+          <a:xfrm>
+            <a:off x="685802" y="2357197"/>
+            <a:ext cx="3510296" cy="4328083"/>
+          </a:xfrm>
+        </p:spPr>
+        <p:txBody>
+          <a:bodyPr>
+            <a:normAutofit/>
+          </a:bodyPr>
+          <a:lstStyle/>
+          <a:p>
+            <a:r>
+              <a:rPr lang="en-US" dirty="0"/>
+              <a:t>16 Meteorites which met the 2 Criteria were identified from the database.</a:t>
+            </a:r>
+          </a:p>
+          <a:p>
+            <a:r>
+              <a:rPr lang="en-US" dirty="0"/>
+              <a:t>The next step is to compare the meteorites by investigating thunderstorm occurrences in the days surrounding the fall, and not just the overall yearly averages.</a:t>
+            </a:r>
+          </a:p>
+          <a:p>
+            <a:r>
+              <a:rPr lang="en-US" dirty="0"/>
+              <a:t>A weighting function will be used to prioritize thunderstorms closer to the landing date, creating an ordered list of the candidates.</a:t>
+            </a:r>
+          </a:p>
+        </p:txBody>
+      </p:sp>
+      <p:pic>
+        <p:nvPicPr>
+          <p:cNvPr id="6" name="Picture 5">
+            <a:extLst>
+              <a:ext uri="{FF2B5EF4-FFF2-40B4-BE49-F238E27FC236}">
+                <a16:creationId xmlns:a16="http://schemas.microsoft.com/office/drawing/2014/main" id="{B43780B8-9ABC-D724-9BD3-B9F60C7C16DB}"/>
+              </a:ext>
+            </a:extLst>
+          </p:cNvPr>
+          <p:cNvPicPr>
+            <a:picLocks noChangeAspect="1"/>
+          </p:cNvPicPr>
+          <p:nvPr/>
+        </p:nvPicPr>
+        <p:blipFill>
+          <a:blip r:embed="rId3"/>
+          <a:stretch>
+            <a:fillRect/>
+          </a:stretch>
+        </p:blipFill>
+        <p:spPr>
+          <a:xfrm>
+            <a:off x="5059680" y="2011680"/>
+            <a:ext cx="6667500" cy="4457700"/>
+          </a:xfrm>
+          <a:prstGeom prst="rect">
+            <a:avLst/>
+          </a:prstGeom>
+        </p:spPr>
+      </p:pic>
+    </p:spTree>
+    <p:extLst>
+      <p:ext uri="{BB962C8B-B14F-4D97-AF65-F5344CB8AC3E}">
+        <p14:creationId xmlns:p14="http://schemas.microsoft.com/office/powerpoint/2010/main" val="1353324587"/>
+      </p:ext>
+    </p:extLst>
+  </p:cSld>
+  <p:clrMapOvr>
+    <a:overrideClrMapping bg1="lt1" tx1="dk1" bg2="lt2" tx2="dk2" accent1="accent1" accent2="accent2" accent3="accent3" accent4="accent4" accent5="accent5" accent6="accent6" hlink="hlink" folHlink="folHlink"/>
+  </p:clrMapOvr>
+</p:sld>
+</file>
+
 <file path=ppt/slides/slide2.xml><?xml version="1.0" encoding="utf-8"?>
 <p:sld xmlns:a="http://schemas.openxmlformats.org/drawingml/2006/main" xmlns:r="http://schemas.openxmlformats.org/officeDocument/2006/relationships" xmlns:p="http://schemas.openxmlformats.org/presentationml/2006/main">
   <p:cSld>
@@ -11756,8 +13313,8 @@
         </p:nvSpPr>
         <p:spPr>
           <a:xfrm>
-            <a:off x="685801" y="2592572"/>
-            <a:ext cx="6672590" cy="4092708"/>
+            <a:off x="685801" y="2329542"/>
+            <a:ext cx="6672590" cy="4355738"/>
           </a:xfrm>
         </p:spPr>
         <p:txBody>
@@ -11768,27 +13325,27 @@
           <a:p>
             <a:r>
               <a:rPr lang="en-US" dirty="0"/>
-              <a:t>Hypothesis: Mjolnir (Thor’s Hammer) fell on earth and was covered up as a normal meteorite landing. Since Thor is the god of thunder, his hammer’s arrival would be accompanied with thunderstorms.</a:t>
+              <a:t>Project Prompt: Mjolnir (Thor’s Hammer) fell on earth and was “covered up” as a normal meteorite landing. Since Thor is the god of thunder, his hammer’s arrival would be accompanied by thunderstorms.</a:t>
             </a:r>
           </a:p>
           <a:p>
             <a:r>
               <a:rPr lang="en-US" dirty="0"/>
-              <a:t>Goal: Find weather stations in range of as many meteorite landings as possible and determine if there were more thunderstorms than normal around the time when the meteorite landed.</a:t>
+              <a:t>Goal: Find weather stations in range of meteorite landings and determine if there were more thunderstorms than normal around the time when the meteorite landed.</a:t>
             </a:r>
           </a:p>
           <a:p>
             <a:pPr lvl="1"/>
             <a:r>
               <a:rPr lang="en-US" dirty="0"/>
-              <a:t>Selection Criteria 1: The number of thunderstorms in the year the meteorite landed is 10 or more above the average</a:t>
+              <a:t>Selection Criteria 1: There are 10 or more thunderstorms above the 10 year average in the year the meteorite landed</a:t>
             </a:r>
           </a:p>
           <a:p>
             <a:pPr lvl="1"/>
             <a:r>
               <a:rPr lang="en-US" dirty="0"/>
-              <a:t>Selection Criteria 2: The number of thunderstorms in the year the meteorite landed is over 50% more than the average</a:t>
+              <a:t>Selection Criteria 2: The number of thunderstorms in the year the meteorite landed is over 50% more than the 10 year average</a:t>
             </a:r>
           </a:p>
           <a:p>
@@ -11798,6 +13355,7 @@
             </a:r>
           </a:p>
           <a:p>
+            <a:pPr lvl="1"/>
             <a:r>
               <a:rPr lang="en-US" altLang="en-US" dirty="0">
                 <a:solidFill>
@@ -11808,6 +13366,7 @@
             </a:r>
           </a:p>
           <a:p>
+            <a:pPr lvl="1"/>
             <a:r>
               <a:rPr lang="en-US" altLang="en-US" dirty="0">
                 <a:solidFill>
@@ -12891,6 +14450,150 @@
           </a:graphicData>
         </a:graphic>
       </p:graphicFrame>
+      <p:sp>
+        <p:nvSpPr>
+          <p:cNvPr id="3" name="TextBox 2">
+            <a:extLst>
+              <a:ext uri="{FF2B5EF4-FFF2-40B4-BE49-F238E27FC236}">
+                <a16:creationId xmlns:a16="http://schemas.microsoft.com/office/drawing/2014/main" id="{DA74F699-FDC6-F555-0A5F-B6A7A01B698C}"/>
+              </a:ext>
+            </a:extLst>
+          </p:cNvPr>
+          <p:cNvSpPr txBox="1"/>
+          <p:nvPr/>
+        </p:nvSpPr>
+        <p:spPr>
+          <a:xfrm>
+            <a:off x="565029" y="4992012"/>
+            <a:ext cx="2195423" cy="369332"/>
+          </a:xfrm>
+          <a:prstGeom prst="rect">
+            <a:avLst/>
+          </a:prstGeom>
+          <a:noFill/>
+        </p:spPr>
+        <p:txBody>
+          <a:bodyPr wrap="square" rtlCol="0">
+            <a:spAutoFit/>
+          </a:bodyPr>
+          <a:lstStyle/>
+          <a:p>
+            <a:r>
+              <a:rPr lang="en-US" dirty="0" err="1"/>
+              <a:t>Weather_Data.ipynb</a:t>
+            </a:r>
+            <a:endParaRPr lang="en-US" dirty="0"/>
+          </a:p>
+        </p:txBody>
+      </p:sp>
+      <p:sp>
+        <p:nvSpPr>
+          <p:cNvPr id="5" name="TextBox 4">
+            <a:extLst>
+              <a:ext uri="{FF2B5EF4-FFF2-40B4-BE49-F238E27FC236}">
+                <a16:creationId xmlns:a16="http://schemas.microsoft.com/office/drawing/2014/main" id="{295C7ECA-A571-5FE1-4F82-7E4701FDBB78}"/>
+              </a:ext>
+            </a:extLst>
+          </p:cNvPr>
+          <p:cNvSpPr txBox="1"/>
+          <p:nvPr/>
+        </p:nvSpPr>
+        <p:spPr>
+          <a:xfrm>
+            <a:off x="2713036" y="4992014"/>
+            <a:ext cx="3260605" cy="369330"/>
+          </a:xfrm>
+          <a:prstGeom prst="rect">
+            <a:avLst/>
+          </a:prstGeom>
+          <a:noFill/>
+        </p:spPr>
+        <p:txBody>
+          <a:bodyPr wrap="square" rtlCol="0">
+            <a:spAutoFit/>
+          </a:bodyPr>
+          <a:lstStyle/>
+          <a:p>
+            <a:r>
+              <a:rPr lang="en-US" dirty="0" err="1"/>
+              <a:t>Thunder_data_per_station.ipynb</a:t>
+            </a:r>
+            <a:endParaRPr lang="en-US" dirty="0"/>
+          </a:p>
+        </p:txBody>
+      </p:sp>
+      <p:sp>
+        <p:nvSpPr>
+          <p:cNvPr id="6" name="TextBox 5">
+            <a:extLst>
+              <a:ext uri="{FF2B5EF4-FFF2-40B4-BE49-F238E27FC236}">
+                <a16:creationId xmlns:a16="http://schemas.microsoft.com/office/drawing/2014/main" id="{C0ADCD60-5CE3-2C6B-C5ED-CCDB0E7C858E}"/>
+              </a:ext>
+            </a:extLst>
+          </p:cNvPr>
+          <p:cNvSpPr txBox="1"/>
+          <p:nvPr/>
+        </p:nvSpPr>
+        <p:spPr>
+          <a:xfrm>
+            <a:off x="6339245" y="4992012"/>
+            <a:ext cx="1661632" cy="369330"/>
+          </a:xfrm>
+          <a:prstGeom prst="rect">
+            <a:avLst/>
+          </a:prstGeom>
+          <a:noFill/>
+        </p:spPr>
+        <p:txBody>
+          <a:bodyPr wrap="square" rtlCol="0">
+            <a:spAutoFit/>
+          </a:bodyPr>
+          <a:lstStyle/>
+          <a:p>
+            <a:r>
+              <a:rPr lang="en-US" dirty="0" err="1"/>
+              <a:t>Mjolnir.ipynb</a:t>
+            </a:r>
+            <a:endParaRPr lang="en-US" dirty="0"/>
+          </a:p>
+        </p:txBody>
+      </p:sp>
+      <p:sp>
+        <p:nvSpPr>
+          <p:cNvPr id="7" name="TextBox 6">
+            <a:extLst>
+              <a:ext uri="{FF2B5EF4-FFF2-40B4-BE49-F238E27FC236}">
+                <a16:creationId xmlns:a16="http://schemas.microsoft.com/office/drawing/2014/main" id="{5F1D113F-A3D4-5388-F4D0-F9AA479A76E3}"/>
+              </a:ext>
+            </a:extLst>
+          </p:cNvPr>
+          <p:cNvSpPr txBox="1"/>
+          <p:nvPr/>
+        </p:nvSpPr>
+        <p:spPr>
+          <a:xfrm>
+            <a:off x="8592208" y="4993671"/>
+            <a:ext cx="2345788" cy="367671"/>
+          </a:xfrm>
+          <a:prstGeom prst="rect">
+            <a:avLst/>
+          </a:prstGeom>
+          <a:noFill/>
+        </p:spPr>
+        <p:txBody>
+          <a:bodyPr wrap="square" rtlCol="0">
+            <a:spAutoFit/>
+          </a:bodyPr>
+          <a:lstStyle/>
+          <a:p>
+            <a:r>
+              <a:rPr lang="en-US" dirty="0" err="1"/>
+              <a:t>Meteorite_Plots.ipynb</a:t>
+            </a:r>
+            <a:endParaRPr lang="en-US" dirty="0"/>
+          </a:p>
+        </p:txBody>
+      </p:sp>
     </p:spTree>
     <p:extLst>
       <p:ext uri="{BB962C8B-B14F-4D97-AF65-F5344CB8AC3E}">
@@ -13106,6 +14809,1138 @@
 </file>
 
 <file path=ppt/slides/slide5.xml><?xml version="1.0" encoding="utf-8"?>
+<p:sld xmlns:a="http://schemas.openxmlformats.org/drawingml/2006/main" xmlns:r="http://schemas.openxmlformats.org/officeDocument/2006/relationships" xmlns:p="http://schemas.openxmlformats.org/presentationml/2006/main">
+  <p:cSld>
+    <p:bg>
+      <p:bgPr>
+        <a:solidFill>
+          <a:schemeClr val="bg2"/>
+        </a:solidFill>
+        <a:effectLst/>
+      </p:bgPr>
+    </p:bg>
+    <p:spTree>
+      <p:nvGrpSpPr>
+        <p:cNvPr id="1" name="">
+          <a:extLst>
+            <a:ext uri="{FF2B5EF4-FFF2-40B4-BE49-F238E27FC236}">
+              <a16:creationId xmlns:a16="http://schemas.microsoft.com/office/drawing/2014/main" id="{F64CD98D-3A68-BB47-AECA-C0F9F88D57FA}"/>
+            </a:ext>
+          </a:extLst>
+        </p:cNvPr>
+        <p:cNvGrpSpPr/>
+        <p:nvPr/>
+      </p:nvGrpSpPr>
+      <p:grpSpPr>
+        <a:xfrm>
+          <a:off x="0" y="0"/>
+          <a:ext cx="0" cy="0"/>
+          <a:chOff x="0" y="0"/>
+          <a:chExt cx="0" cy="0"/>
+        </a:xfrm>
+      </p:grpSpPr>
+      <p:sp useBgFill="1">
+        <p:nvSpPr>
+          <p:cNvPr id="8" name="Rectangle 7">
+            <a:extLst>
+              <a:ext uri="{FF2B5EF4-FFF2-40B4-BE49-F238E27FC236}">
+                <a16:creationId xmlns:a16="http://schemas.microsoft.com/office/drawing/2014/main" id="{802CB714-7272-7C42-B080-8D4008AA146E}"/>
+              </a:ext>
+              <a:ext uri="{C183D7F6-B498-43B3-948B-1728B52AA6E4}">
+                <adec:decorative xmlns:adec="http://schemas.microsoft.com/office/drawing/2017/decorative" val="1"/>
+              </a:ext>
+            </a:extLst>
+          </p:cNvPr>
+          <p:cNvSpPr>
+            <a:spLocks noGrp="1" noRot="1" noChangeAspect="1" noMove="1" noResize="1" noEditPoints="1" noAdjustHandles="1" noChangeArrowheads="1" noChangeShapeType="1" noTextEdit="1"/>
+          </p:cNvSpPr>
+          <p:nvPr>
+            <p:extLst>
+              <p:ext uri="{386F3935-93C4-4BCD-93E2-E3B085C9AB24}">
+                <p16:designElem xmlns:p16="http://schemas.microsoft.com/office/powerpoint/2015/main" val="1"/>
+              </p:ext>
+            </p:extLst>
+          </p:nvPr>
+        </p:nvSpPr>
+        <p:spPr>
+          <a:xfrm>
+            <a:off x="0" y="0"/>
+            <a:ext cx="12192000" cy="6858000"/>
+          </a:xfrm>
+          <a:prstGeom prst="rect">
+            <a:avLst/>
+          </a:prstGeom>
+          <a:ln>
+            <a:noFill/>
+          </a:ln>
+        </p:spPr>
+        <p:style>
+          <a:lnRef idx="2">
+            <a:schemeClr val="accent1">
+              <a:shade val="50000"/>
+            </a:schemeClr>
+          </a:lnRef>
+          <a:fillRef idx="1">
+            <a:schemeClr val="accent1"/>
+          </a:fillRef>
+          <a:effectRef idx="0">
+            <a:schemeClr val="accent1"/>
+          </a:effectRef>
+          <a:fontRef idx="minor">
+            <a:schemeClr val="lt1"/>
+          </a:fontRef>
+        </p:style>
+        <p:txBody>
+          <a:bodyPr rtlCol="0" anchor="ctr"/>
+          <a:lstStyle/>
+          <a:p>
+            <a:pPr algn="ctr"/>
+            <a:endParaRPr lang="en-US"/>
+          </a:p>
+        </p:txBody>
+      </p:sp>
+      <p:sp>
+        <p:nvSpPr>
+          <p:cNvPr id="10" name="Freeform: Shape 9">
+            <a:extLst>
+              <a:ext uri="{FF2B5EF4-FFF2-40B4-BE49-F238E27FC236}">
+                <a16:creationId xmlns:a16="http://schemas.microsoft.com/office/drawing/2014/main" id="{837E64CB-6D75-1048-90F3-4AF26B02CABD}"/>
+              </a:ext>
+              <a:ext uri="{C183D7F6-B498-43B3-948B-1728B52AA6E4}">
+                <adec:decorative xmlns:adec="http://schemas.microsoft.com/office/drawing/2017/decorative" val="1"/>
+              </a:ext>
+            </a:extLst>
+          </p:cNvPr>
+          <p:cNvSpPr>
+            <a:spLocks noGrp="1" noRot="1" noChangeAspect="1" noMove="1" noResize="1" noEditPoints="1" noAdjustHandles="1" noChangeArrowheads="1" noChangeShapeType="1" noTextEdit="1"/>
+          </p:cNvSpPr>
+          <p:nvPr>
+            <p:extLst>
+              <p:ext uri="{386F3935-93C4-4BCD-93E2-E3B085C9AB24}">
+                <p16:designElem xmlns:p16="http://schemas.microsoft.com/office/powerpoint/2015/main" val="1"/>
+              </p:ext>
+            </p:extLst>
+          </p:nvPr>
+        </p:nvSpPr>
+        <p:spPr>
+          <a:xfrm>
+            <a:off x="0" y="0"/>
+            <a:ext cx="12192000" cy="2270839"/>
+          </a:xfrm>
+          <a:custGeom>
+            <a:avLst/>
+            <a:gdLst>
+              <a:gd name="connsiteX0" fmla="*/ 0 w 12192000"/>
+              <a:gd name="connsiteY0" fmla="*/ 0 h 2270839"/>
+              <a:gd name="connsiteX1" fmla="*/ 12192000 w 12192000"/>
+              <a:gd name="connsiteY1" fmla="*/ 0 h 2270839"/>
+              <a:gd name="connsiteX2" fmla="*/ 12192000 w 12192000"/>
+              <a:gd name="connsiteY2" fmla="*/ 213719 h 2270839"/>
+              <a:gd name="connsiteX3" fmla="*/ 12192000 w 12192000"/>
+              <a:gd name="connsiteY3" fmla="*/ 471948 h 2270839"/>
+              <a:gd name="connsiteX4" fmla="*/ 12192000 w 12192000"/>
+              <a:gd name="connsiteY4" fmla="*/ 519830 h 2270839"/>
+              <a:gd name="connsiteX5" fmla="*/ 12192000 w 12192000"/>
+              <a:gd name="connsiteY5" fmla="*/ 744793 h 2270839"/>
+              <a:gd name="connsiteX6" fmla="*/ 12192000 w 12192000"/>
+              <a:gd name="connsiteY6" fmla="*/ 1754021 h 2270839"/>
+              <a:gd name="connsiteX7" fmla="*/ 11957522 w 12192000"/>
+              <a:gd name="connsiteY7" fmla="*/ 1797923 h 2270839"/>
+              <a:gd name="connsiteX8" fmla="*/ 11679973 w 12192000"/>
+              <a:gd name="connsiteY8" fmla="*/ 1847667 h 2270839"/>
+              <a:gd name="connsiteX9" fmla="*/ 11401197 w 12192000"/>
+              <a:gd name="connsiteY9" fmla="*/ 1896360 h 2270839"/>
+              <a:gd name="connsiteX10" fmla="*/ 11121192 w 12192000"/>
+              <a:gd name="connsiteY10" fmla="*/ 1938046 h 2270839"/>
+              <a:gd name="connsiteX11" fmla="*/ 10842416 w 12192000"/>
+              <a:gd name="connsiteY11" fmla="*/ 1980083 h 2270839"/>
+              <a:gd name="connsiteX12" fmla="*/ 10562411 w 12192000"/>
+              <a:gd name="connsiteY12" fmla="*/ 2019318 h 2270839"/>
+              <a:gd name="connsiteX13" fmla="*/ 10286091 w 12192000"/>
+              <a:gd name="connsiteY13" fmla="*/ 2052947 h 2270839"/>
+              <a:gd name="connsiteX14" fmla="*/ 10006086 w 12192000"/>
+              <a:gd name="connsiteY14" fmla="*/ 2084825 h 2270839"/>
+              <a:gd name="connsiteX15" fmla="*/ 9727310 w 12192000"/>
+              <a:gd name="connsiteY15" fmla="*/ 2113901 h 2270839"/>
+              <a:gd name="connsiteX16" fmla="*/ 9453445 w 12192000"/>
+              <a:gd name="connsiteY16" fmla="*/ 2139123 h 2270839"/>
+              <a:gd name="connsiteX17" fmla="*/ 9175897 w 12192000"/>
+              <a:gd name="connsiteY17" fmla="*/ 2164345 h 2270839"/>
+              <a:gd name="connsiteX18" fmla="*/ 8902033 w 12192000"/>
+              <a:gd name="connsiteY18" fmla="*/ 2185364 h 2270839"/>
+              <a:gd name="connsiteX19" fmla="*/ 8628169 w 12192000"/>
+              <a:gd name="connsiteY19" fmla="*/ 2201828 h 2270839"/>
+              <a:gd name="connsiteX20" fmla="*/ 8355533 w 12192000"/>
+              <a:gd name="connsiteY20" fmla="*/ 2218994 h 2270839"/>
+              <a:gd name="connsiteX21" fmla="*/ 8085353 w 12192000"/>
+              <a:gd name="connsiteY21" fmla="*/ 2233356 h 2270839"/>
+              <a:gd name="connsiteX22" fmla="*/ 7817629 w 12192000"/>
+              <a:gd name="connsiteY22" fmla="*/ 2243515 h 2270839"/>
+              <a:gd name="connsiteX23" fmla="*/ 7549905 w 12192000"/>
+              <a:gd name="connsiteY23" fmla="*/ 2252273 h 2270839"/>
+              <a:gd name="connsiteX24" fmla="*/ 7284638 w 12192000"/>
+              <a:gd name="connsiteY24" fmla="*/ 2260680 h 2270839"/>
+              <a:gd name="connsiteX25" fmla="*/ 7023055 w 12192000"/>
+              <a:gd name="connsiteY25" fmla="*/ 2264534 h 2270839"/>
+              <a:gd name="connsiteX26" fmla="*/ 6761472 w 12192000"/>
+              <a:gd name="connsiteY26" fmla="*/ 2268737 h 2270839"/>
+              <a:gd name="connsiteX27" fmla="*/ 6503573 w 12192000"/>
+              <a:gd name="connsiteY27" fmla="*/ 2270839 h 2270839"/>
+              <a:gd name="connsiteX28" fmla="*/ 6248130 w 12192000"/>
+              <a:gd name="connsiteY28" fmla="*/ 2268737 h 2270839"/>
+              <a:gd name="connsiteX29" fmla="*/ 5995144 w 12192000"/>
+              <a:gd name="connsiteY29" fmla="*/ 2268737 h 2270839"/>
+              <a:gd name="connsiteX30" fmla="*/ 5744613 w 12192000"/>
+              <a:gd name="connsiteY30" fmla="*/ 2264534 h 2270839"/>
+              <a:gd name="connsiteX31" fmla="*/ 5498995 w 12192000"/>
+              <a:gd name="connsiteY31" fmla="*/ 2258228 h 2270839"/>
+              <a:gd name="connsiteX32" fmla="*/ 5255834 w 12192000"/>
+              <a:gd name="connsiteY32" fmla="*/ 2252273 h 2270839"/>
+              <a:gd name="connsiteX33" fmla="*/ 5017584 w 12192000"/>
+              <a:gd name="connsiteY33" fmla="*/ 2245617 h 2270839"/>
+              <a:gd name="connsiteX34" fmla="*/ 4780562 w 12192000"/>
+              <a:gd name="connsiteY34" fmla="*/ 2235458 h 2270839"/>
+              <a:gd name="connsiteX35" fmla="*/ 4547227 w 12192000"/>
+              <a:gd name="connsiteY35" fmla="*/ 2224598 h 2270839"/>
+              <a:gd name="connsiteX36" fmla="*/ 4318800 w 12192000"/>
+              <a:gd name="connsiteY36" fmla="*/ 2214790 h 2270839"/>
+              <a:gd name="connsiteX37" fmla="*/ 3873004 w 12192000"/>
+              <a:gd name="connsiteY37" fmla="*/ 2187115 h 2270839"/>
+              <a:gd name="connsiteX38" fmla="*/ 3445628 w 12192000"/>
+              <a:gd name="connsiteY38" fmla="*/ 2157690 h 2270839"/>
+              <a:gd name="connsiteX39" fmla="*/ 3035446 w 12192000"/>
+              <a:gd name="connsiteY39" fmla="*/ 2126862 h 2270839"/>
+              <a:gd name="connsiteX40" fmla="*/ 2647370 w 12192000"/>
+              <a:gd name="connsiteY40" fmla="*/ 2092883 h 2270839"/>
+              <a:gd name="connsiteX41" fmla="*/ 2276487 w 12192000"/>
+              <a:gd name="connsiteY41" fmla="*/ 2057501 h 2270839"/>
+              <a:gd name="connsiteX42" fmla="*/ 1932621 w 12192000"/>
+              <a:gd name="connsiteY42" fmla="*/ 2019318 h 2270839"/>
+              <a:gd name="connsiteX43" fmla="*/ 1609634 w 12192000"/>
+              <a:gd name="connsiteY43" fmla="*/ 1981835 h 2270839"/>
+              <a:gd name="connsiteX44" fmla="*/ 1312435 w 12192000"/>
+              <a:gd name="connsiteY44" fmla="*/ 1944352 h 2270839"/>
+              <a:gd name="connsiteX45" fmla="*/ 1039799 w 12192000"/>
+              <a:gd name="connsiteY45" fmla="*/ 1908971 h 2270839"/>
+              <a:gd name="connsiteX46" fmla="*/ 797865 w 12192000"/>
+              <a:gd name="connsiteY46" fmla="*/ 1875341 h 2270839"/>
+              <a:gd name="connsiteX47" fmla="*/ 579265 w 12192000"/>
+              <a:gd name="connsiteY47" fmla="*/ 1843463 h 2270839"/>
+              <a:gd name="connsiteX48" fmla="*/ 395052 w 12192000"/>
+              <a:gd name="connsiteY48" fmla="*/ 1816840 h 2270839"/>
+              <a:gd name="connsiteX49" fmla="*/ 240312 w 12192000"/>
+              <a:gd name="connsiteY49" fmla="*/ 1791617 h 2270839"/>
+              <a:gd name="connsiteX50" fmla="*/ 27853 w 12192000"/>
+              <a:gd name="connsiteY50" fmla="*/ 1755536 h 2270839"/>
+              <a:gd name="connsiteX51" fmla="*/ 0 w 12192000"/>
+              <a:gd name="connsiteY51" fmla="*/ 1750823 h 2270839"/>
+              <a:gd name="connsiteX52" fmla="*/ 0 w 12192000"/>
+              <a:gd name="connsiteY52" fmla="*/ 744793 h 2270839"/>
+              <a:gd name="connsiteX53" fmla="*/ 0 w 12192000"/>
+              <a:gd name="connsiteY53" fmla="*/ 519830 h 2270839"/>
+              <a:gd name="connsiteX54" fmla="*/ 0 w 12192000"/>
+              <a:gd name="connsiteY54" fmla="*/ 471948 h 2270839"/>
+              <a:gd name="connsiteX55" fmla="*/ 0 w 12192000"/>
+              <a:gd name="connsiteY55" fmla="*/ 213719 h 2270839"/>
+            </a:gdLst>
+            <a:ahLst/>
+            <a:cxnLst>
+              <a:cxn ang="0">
+                <a:pos x="connsiteX0" y="connsiteY0"/>
+              </a:cxn>
+              <a:cxn ang="0">
+                <a:pos x="connsiteX1" y="connsiteY1"/>
+              </a:cxn>
+              <a:cxn ang="0">
+                <a:pos x="connsiteX2" y="connsiteY2"/>
+              </a:cxn>
+              <a:cxn ang="0">
+                <a:pos x="connsiteX3" y="connsiteY3"/>
+              </a:cxn>
+              <a:cxn ang="0">
+                <a:pos x="connsiteX4" y="connsiteY4"/>
+              </a:cxn>
+              <a:cxn ang="0">
+                <a:pos x="connsiteX5" y="connsiteY5"/>
+              </a:cxn>
+              <a:cxn ang="0">
+                <a:pos x="connsiteX6" y="connsiteY6"/>
+              </a:cxn>
+              <a:cxn ang="0">
+                <a:pos x="connsiteX7" y="connsiteY7"/>
+              </a:cxn>
+              <a:cxn ang="0">
+                <a:pos x="connsiteX8" y="connsiteY8"/>
+              </a:cxn>
+              <a:cxn ang="0">
+                <a:pos x="connsiteX9" y="connsiteY9"/>
+              </a:cxn>
+              <a:cxn ang="0">
+                <a:pos x="connsiteX10" y="connsiteY10"/>
+              </a:cxn>
+              <a:cxn ang="0">
+                <a:pos x="connsiteX11" y="connsiteY11"/>
+              </a:cxn>
+              <a:cxn ang="0">
+                <a:pos x="connsiteX12" y="connsiteY12"/>
+              </a:cxn>
+              <a:cxn ang="0">
+                <a:pos x="connsiteX13" y="connsiteY13"/>
+              </a:cxn>
+              <a:cxn ang="0">
+                <a:pos x="connsiteX14" y="connsiteY14"/>
+              </a:cxn>
+              <a:cxn ang="0">
+                <a:pos x="connsiteX15" y="connsiteY15"/>
+              </a:cxn>
+              <a:cxn ang="0">
+                <a:pos x="connsiteX16" y="connsiteY16"/>
+              </a:cxn>
+              <a:cxn ang="0">
+                <a:pos x="connsiteX17" y="connsiteY17"/>
+              </a:cxn>
+              <a:cxn ang="0">
+                <a:pos x="connsiteX18" y="connsiteY18"/>
+              </a:cxn>
+              <a:cxn ang="0">
+                <a:pos x="connsiteX19" y="connsiteY19"/>
+              </a:cxn>
+              <a:cxn ang="0">
+                <a:pos x="connsiteX20" y="connsiteY20"/>
+              </a:cxn>
+              <a:cxn ang="0">
+                <a:pos x="connsiteX21" y="connsiteY21"/>
+              </a:cxn>
+              <a:cxn ang="0">
+                <a:pos x="connsiteX22" y="connsiteY22"/>
+              </a:cxn>
+              <a:cxn ang="0">
+                <a:pos x="connsiteX23" y="connsiteY23"/>
+              </a:cxn>
+              <a:cxn ang="0">
+                <a:pos x="connsiteX24" y="connsiteY24"/>
+              </a:cxn>
+              <a:cxn ang="0">
+                <a:pos x="connsiteX25" y="connsiteY25"/>
+              </a:cxn>
+              <a:cxn ang="0">
+                <a:pos x="connsiteX26" y="connsiteY26"/>
+              </a:cxn>
+              <a:cxn ang="0">
+                <a:pos x="connsiteX27" y="connsiteY27"/>
+              </a:cxn>
+              <a:cxn ang="0">
+                <a:pos x="connsiteX28" y="connsiteY28"/>
+              </a:cxn>
+              <a:cxn ang="0">
+                <a:pos x="connsiteX29" y="connsiteY29"/>
+              </a:cxn>
+              <a:cxn ang="0">
+                <a:pos x="connsiteX30" y="connsiteY30"/>
+              </a:cxn>
+              <a:cxn ang="0">
+                <a:pos x="connsiteX31" y="connsiteY31"/>
+              </a:cxn>
+              <a:cxn ang="0">
+                <a:pos x="connsiteX32" y="connsiteY32"/>
+              </a:cxn>
+              <a:cxn ang="0">
+                <a:pos x="connsiteX33" y="connsiteY33"/>
+              </a:cxn>
+              <a:cxn ang="0">
+                <a:pos x="connsiteX34" y="connsiteY34"/>
+              </a:cxn>
+              <a:cxn ang="0">
+                <a:pos x="connsiteX35" y="connsiteY35"/>
+              </a:cxn>
+              <a:cxn ang="0">
+                <a:pos x="connsiteX36" y="connsiteY36"/>
+              </a:cxn>
+              <a:cxn ang="0">
+                <a:pos x="connsiteX37" y="connsiteY37"/>
+              </a:cxn>
+              <a:cxn ang="0">
+                <a:pos x="connsiteX38" y="connsiteY38"/>
+              </a:cxn>
+              <a:cxn ang="0">
+                <a:pos x="connsiteX39" y="connsiteY39"/>
+              </a:cxn>
+              <a:cxn ang="0">
+                <a:pos x="connsiteX40" y="connsiteY40"/>
+              </a:cxn>
+              <a:cxn ang="0">
+                <a:pos x="connsiteX41" y="connsiteY41"/>
+              </a:cxn>
+              <a:cxn ang="0">
+                <a:pos x="connsiteX42" y="connsiteY42"/>
+              </a:cxn>
+              <a:cxn ang="0">
+                <a:pos x="connsiteX43" y="connsiteY43"/>
+              </a:cxn>
+              <a:cxn ang="0">
+                <a:pos x="connsiteX44" y="connsiteY44"/>
+              </a:cxn>
+              <a:cxn ang="0">
+                <a:pos x="connsiteX45" y="connsiteY45"/>
+              </a:cxn>
+              <a:cxn ang="0">
+                <a:pos x="connsiteX46" y="connsiteY46"/>
+              </a:cxn>
+              <a:cxn ang="0">
+                <a:pos x="connsiteX47" y="connsiteY47"/>
+              </a:cxn>
+              <a:cxn ang="0">
+                <a:pos x="connsiteX48" y="connsiteY48"/>
+              </a:cxn>
+              <a:cxn ang="0">
+                <a:pos x="connsiteX49" y="connsiteY49"/>
+              </a:cxn>
+              <a:cxn ang="0">
+                <a:pos x="connsiteX50" y="connsiteY50"/>
+              </a:cxn>
+              <a:cxn ang="0">
+                <a:pos x="connsiteX51" y="connsiteY51"/>
+              </a:cxn>
+              <a:cxn ang="0">
+                <a:pos x="connsiteX52" y="connsiteY52"/>
+              </a:cxn>
+              <a:cxn ang="0">
+                <a:pos x="connsiteX53" y="connsiteY53"/>
+              </a:cxn>
+              <a:cxn ang="0">
+                <a:pos x="connsiteX54" y="connsiteY54"/>
+              </a:cxn>
+              <a:cxn ang="0">
+                <a:pos x="connsiteX55" y="connsiteY55"/>
+              </a:cxn>
+            </a:cxnLst>
+            <a:rect l="l" t="t" r="r" b="b"/>
+            <a:pathLst>
+              <a:path w="12192000" h="2270839">
+                <a:moveTo>
+                  <a:pt x="0" y="0"/>
+                </a:moveTo>
+                <a:lnTo>
+                  <a:pt x="12192000" y="0"/>
+                </a:lnTo>
+                <a:lnTo>
+                  <a:pt x="12192000" y="213719"/>
+                </a:lnTo>
+                <a:lnTo>
+                  <a:pt x="12192000" y="471948"/>
+                </a:lnTo>
+                <a:lnTo>
+                  <a:pt x="12192000" y="519830"/>
+                </a:lnTo>
+                <a:lnTo>
+                  <a:pt x="12192000" y="744793"/>
+                </a:lnTo>
+                <a:lnTo>
+                  <a:pt x="12192000" y="1754021"/>
+                </a:lnTo>
+                <a:lnTo>
+                  <a:pt x="11957522" y="1797923"/>
+                </a:lnTo>
+                <a:lnTo>
+                  <a:pt x="11679973" y="1847667"/>
+                </a:lnTo>
+                <a:lnTo>
+                  <a:pt x="11401197" y="1896360"/>
+                </a:lnTo>
+                <a:lnTo>
+                  <a:pt x="11121192" y="1938046"/>
+                </a:lnTo>
+                <a:lnTo>
+                  <a:pt x="10842416" y="1980083"/>
+                </a:lnTo>
+                <a:lnTo>
+                  <a:pt x="10562411" y="2019318"/>
+                </a:lnTo>
+                <a:lnTo>
+                  <a:pt x="10286091" y="2052947"/>
+                </a:lnTo>
+                <a:lnTo>
+                  <a:pt x="10006086" y="2084825"/>
+                </a:lnTo>
+                <a:lnTo>
+                  <a:pt x="9727310" y="2113901"/>
+                </a:lnTo>
+                <a:lnTo>
+                  <a:pt x="9453445" y="2139123"/>
+                </a:lnTo>
+                <a:lnTo>
+                  <a:pt x="9175897" y="2164345"/>
+                </a:lnTo>
+                <a:lnTo>
+                  <a:pt x="8902033" y="2185364"/>
+                </a:lnTo>
+                <a:lnTo>
+                  <a:pt x="8628169" y="2201828"/>
+                </a:lnTo>
+                <a:lnTo>
+                  <a:pt x="8355533" y="2218994"/>
+                </a:lnTo>
+                <a:lnTo>
+                  <a:pt x="8085353" y="2233356"/>
+                </a:lnTo>
+                <a:lnTo>
+                  <a:pt x="7817629" y="2243515"/>
+                </a:lnTo>
+                <a:lnTo>
+                  <a:pt x="7549905" y="2252273"/>
+                </a:lnTo>
+                <a:lnTo>
+                  <a:pt x="7284638" y="2260680"/>
+                </a:lnTo>
+                <a:lnTo>
+                  <a:pt x="7023055" y="2264534"/>
+                </a:lnTo>
+                <a:lnTo>
+                  <a:pt x="6761472" y="2268737"/>
+                </a:lnTo>
+                <a:lnTo>
+                  <a:pt x="6503573" y="2270839"/>
+                </a:lnTo>
+                <a:lnTo>
+                  <a:pt x="6248130" y="2268737"/>
+                </a:lnTo>
+                <a:lnTo>
+                  <a:pt x="5995144" y="2268737"/>
+                </a:lnTo>
+                <a:lnTo>
+                  <a:pt x="5744613" y="2264534"/>
+                </a:lnTo>
+                <a:lnTo>
+                  <a:pt x="5498995" y="2258228"/>
+                </a:lnTo>
+                <a:lnTo>
+                  <a:pt x="5255834" y="2252273"/>
+                </a:lnTo>
+                <a:lnTo>
+                  <a:pt x="5017584" y="2245617"/>
+                </a:lnTo>
+                <a:lnTo>
+                  <a:pt x="4780562" y="2235458"/>
+                </a:lnTo>
+                <a:lnTo>
+                  <a:pt x="4547227" y="2224598"/>
+                </a:lnTo>
+                <a:lnTo>
+                  <a:pt x="4318800" y="2214790"/>
+                </a:lnTo>
+                <a:lnTo>
+                  <a:pt x="3873004" y="2187115"/>
+                </a:lnTo>
+                <a:lnTo>
+                  <a:pt x="3445628" y="2157690"/>
+                </a:lnTo>
+                <a:lnTo>
+                  <a:pt x="3035446" y="2126862"/>
+                </a:lnTo>
+                <a:lnTo>
+                  <a:pt x="2647370" y="2092883"/>
+                </a:lnTo>
+                <a:lnTo>
+                  <a:pt x="2276487" y="2057501"/>
+                </a:lnTo>
+                <a:lnTo>
+                  <a:pt x="1932621" y="2019318"/>
+                </a:lnTo>
+                <a:lnTo>
+                  <a:pt x="1609634" y="1981835"/>
+                </a:lnTo>
+                <a:lnTo>
+                  <a:pt x="1312435" y="1944352"/>
+                </a:lnTo>
+                <a:lnTo>
+                  <a:pt x="1039799" y="1908971"/>
+                </a:lnTo>
+                <a:lnTo>
+                  <a:pt x="797865" y="1875341"/>
+                </a:lnTo>
+                <a:lnTo>
+                  <a:pt x="579265" y="1843463"/>
+                </a:lnTo>
+                <a:lnTo>
+                  <a:pt x="395052" y="1816840"/>
+                </a:lnTo>
+                <a:lnTo>
+                  <a:pt x="240312" y="1791617"/>
+                </a:lnTo>
+                <a:lnTo>
+                  <a:pt x="27853" y="1755536"/>
+                </a:lnTo>
+                <a:lnTo>
+                  <a:pt x="0" y="1750823"/>
+                </a:lnTo>
+                <a:lnTo>
+                  <a:pt x="0" y="744793"/>
+                </a:lnTo>
+                <a:lnTo>
+                  <a:pt x="0" y="519830"/>
+                </a:lnTo>
+                <a:lnTo>
+                  <a:pt x="0" y="471948"/>
+                </a:lnTo>
+                <a:lnTo>
+                  <a:pt x="0" y="213719"/>
+                </a:lnTo>
+                <a:close/>
+              </a:path>
+            </a:pathLst>
+          </a:custGeom>
+          <a:solidFill>
+            <a:schemeClr val="tx2"/>
+          </a:solidFill>
+          <a:ln w="44450">
+            <a:noFill/>
+          </a:ln>
+          <a:effectLst/>
+        </p:spPr>
+        <p:style>
+          <a:lnRef idx="2">
+            <a:schemeClr val="accent1">
+              <a:shade val="50000"/>
+            </a:schemeClr>
+          </a:lnRef>
+          <a:fillRef idx="1003">
+            <a:schemeClr val="dk2"/>
+          </a:fillRef>
+          <a:effectRef idx="0">
+            <a:schemeClr val="accent1"/>
+          </a:effectRef>
+          <a:fontRef idx="minor">
+            <a:schemeClr val="lt1"/>
+          </a:fontRef>
+        </p:style>
+        <p:txBody>
+          <a:bodyPr wrap="square" rtlCol="0" anchor="ctr">
+            <a:noAutofit/>
+          </a:bodyPr>
+          <a:lstStyle/>
+          <a:p>
+            <a:pPr algn="ctr"/>
+            <a:endParaRPr lang="en-US"/>
+          </a:p>
+        </p:txBody>
+      </p:sp>
+      <p:pic>
+        <p:nvPicPr>
+          <p:cNvPr id="12" name="Picture 11">
+            <a:extLst>
+              <a:ext uri="{FF2B5EF4-FFF2-40B4-BE49-F238E27FC236}">
+                <a16:creationId xmlns:a16="http://schemas.microsoft.com/office/drawing/2014/main" id="{FB2E83FB-E973-01A7-947B-437E4E4E20F0}"/>
+              </a:ext>
+              <a:ext uri="{C183D7F6-B498-43B3-948B-1728B52AA6E4}">
+                <adec:decorative xmlns:adec="http://schemas.microsoft.com/office/drawing/2017/decorative" val="1"/>
+              </a:ext>
+            </a:extLst>
+          </p:cNvPr>
+          <p:cNvPicPr>
+            <a:picLocks noGrp="1" noRot="1" noChangeAspect="1" noMove="1" noResize="1" noEditPoints="1" noAdjustHandles="1" noChangeArrowheads="1" noChangeShapeType="1" noCrop="1"/>
+          </p:cNvPicPr>
+          <p:nvPr>
+            <p:extLst>
+              <p:ext uri="{386F3935-93C4-4BCD-93E2-E3B085C9AB24}">
+                <p16:designElem xmlns:p16="http://schemas.microsoft.com/office/powerpoint/2015/main" val="1"/>
+              </p:ext>
+            </p:extLst>
+          </p:nvPr>
+        </p:nvPicPr>
+        <p:blipFill rotWithShape="1">
+          <a:blip r:embed="rId2">
+            <a:extLst>
+              <a:ext uri="{28A0092B-C50C-407E-A947-70E740481C1C}">
+                <a14:useLocalDpi xmlns:a14="http://schemas.microsoft.com/office/drawing/2010/main" val="0"/>
+              </a:ext>
+            </a:extLst>
+          </a:blip>
+          <a:srcRect l="25900" b="63148"/>
+          <a:stretch/>
+        </p:blipFill>
+        <p:spPr>
+          <a:xfrm>
+            <a:off x="4071257" y="1"/>
+            <a:ext cx="8117568" cy="2270839"/>
+          </a:xfrm>
+          <a:custGeom>
+            <a:avLst/>
+            <a:gdLst>
+              <a:gd name="connsiteX0" fmla="*/ 0 w 8117568"/>
+              <a:gd name="connsiteY0" fmla="*/ 0 h 2270839"/>
+              <a:gd name="connsiteX1" fmla="*/ 8117568 w 8117568"/>
+              <a:gd name="connsiteY1" fmla="*/ 0 h 2270839"/>
+              <a:gd name="connsiteX2" fmla="*/ 8117568 w 8117568"/>
+              <a:gd name="connsiteY2" fmla="*/ 1754616 h 2270839"/>
+              <a:gd name="connsiteX3" fmla="*/ 7886265 w 8117568"/>
+              <a:gd name="connsiteY3" fmla="*/ 1797923 h 2270839"/>
+              <a:gd name="connsiteX4" fmla="*/ 7608716 w 8117568"/>
+              <a:gd name="connsiteY4" fmla="*/ 1847667 h 2270839"/>
+              <a:gd name="connsiteX5" fmla="*/ 7329940 w 8117568"/>
+              <a:gd name="connsiteY5" fmla="*/ 1896360 h 2270839"/>
+              <a:gd name="connsiteX6" fmla="*/ 7049935 w 8117568"/>
+              <a:gd name="connsiteY6" fmla="*/ 1938046 h 2270839"/>
+              <a:gd name="connsiteX7" fmla="*/ 6771159 w 8117568"/>
+              <a:gd name="connsiteY7" fmla="*/ 1980083 h 2270839"/>
+              <a:gd name="connsiteX8" fmla="*/ 6491154 w 8117568"/>
+              <a:gd name="connsiteY8" fmla="*/ 2019318 h 2270839"/>
+              <a:gd name="connsiteX9" fmla="*/ 6214834 w 8117568"/>
+              <a:gd name="connsiteY9" fmla="*/ 2052947 h 2270839"/>
+              <a:gd name="connsiteX10" fmla="*/ 5934829 w 8117568"/>
+              <a:gd name="connsiteY10" fmla="*/ 2084825 h 2270839"/>
+              <a:gd name="connsiteX11" fmla="*/ 5656053 w 8117568"/>
+              <a:gd name="connsiteY11" fmla="*/ 2113901 h 2270839"/>
+              <a:gd name="connsiteX12" fmla="*/ 5382188 w 8117568"/>
+              <a:gd name="connsiteY12" fmla="*/ 2139123 h 2270839"/>
+              <a:gd name="connsiteX13" fmla="*/ 5104640 w 8117568"/>
+              <a:gd name="connsiteY13" fmla="*/ 2164345 h 2270839"/>
+              <a:gd name="connsiteX14" fmla="*/ 4830776 w 8117568"/>
+              <a:gd name="connsiteY14" fmla="*/ 2185364 h 2270839"/>
+              <a:gd name="connsiteX15" fmla="*/ 4556912 w 8117568"/>
+              <a:gd name="connsiteY15" fmla="*/ 2201828 h 2270839"/>
+              <a:gd name="connsiteX16" fmla="*/ 4284276 w 8117568"/>
+              <a:gd name="connsiteY16" fmla="*/ 2218994 h 2270839"/>
+              <a:gd name="connsiteX17" fmla="*/ 4014096 w 8117568"/>
+              <a:gd name="connsiteY17" fmla="*/ 2233356 h 2270839"/>
+              <a:gd name="connsiteX18" fmla="*/ 3746372 w 8117568"/>
+              <a:gd name="connsiteY18" fmla="*/ 2243515 h 2270839"/>
+              <a:gd name="connsiteX19" fmla="*/ 3478648 w 8117568"/>
+              <a:gd name="connsiteY19" fmla="*/ 2252273 h 2270839"/>
+              <a:gd name="connsiteX20" fmla="*/ 3213381 w 8117568"/>
+              <a:gd name="connsiteY20" fmla="*/ 2260680 h 2270839"/>
+              <a:gd name="connsiteX21" fmla="*/ 2951798 w 8117568"/>
+              <a:gd name="connsiteY21" fmla="*/ 2264534 h 2270839"/>
+              <a:gd name="connsiteX22" fmla="*/ 2690215 w 8117568"/>
+              <a:gd name="connsiteY22" fmla="*/ 2268737 h 2270839"/>
+              <a:gd name="connsiteX23" fmla="*/ 2432316 w 8117568"/>
+              <a:gd name="connsiteY23" fmla="*/ 2270839 h 2270839"/>
+              <a:gd name="connsiteX24" fmla="*/ 2176873 w 8117568"/>
+              <a:gd name="connsiteY24" fmla="*/ 2268737 h 2270839"/>
+              <a:gd name="connsiteX25" fmla="*/ 1923887 w 8117568"/>
+              <a:gd name="connsiteY25" fmla="*/ 2268737 h 2270839"/>
+              <a:gd name="connsiteX26" fmla="*/ 1673356 w 8117568"/>
+              <a:gd name="connsiteY26" fmla="*/ 2264534 h 2270839"/>
+              <a:gd name="connsiteX27" fmla="*/ 1427738 w 8117568"/>
+              <a:gd name="connsiteY27" fmla="*/ 2258228 h 2270839"/>
+              <a:gd name="connsiteX28" fmla="*/ 1184577 w 8117568"/>
+              <a:gd name="connsiteY28" fmla="*/ 2252273 h 2270839"/>
+              <a:gd name="connsiteX29" fmla="*/ 946327 w 8117568"/>
+              <a:gd name="connsiteY29" fmla="*/ 2245617 h 2270839"/>
+              <a:gd name="connsiteX30" fmla="*/ 709305 w 8117568"/>
+              <a:gd name="connsiteY30" fmla="*/ 2235458 h 2270839"/>
+              <a:gd name="connsiteX31" fmla="*/ 475970 w 8117568"/>
+              <a:gd name="connsiteY31" fmla="*/ 2224598 h 2270839"/>
+              <a:gd name="connsiteX32" fmla="*/ 247543 w 8117568"/>
+              <a:gd name="connsiteY32" fmla="*/ 2214790 h 2270839"/>
+              <a:gd name="connsiteX33" fmla="*/ 0 w 8117568"/>
+              <a:gd name="connsiteY33" fmla="*/ 2199423 h 2270839"/>
+            </a:gdLst>
+            <a:ahLst/>
+            <a:cxnLst>
+              <a:cxn ang="0">
+                <a:pos x="connsiteX0" y="connsiteY0"/>
+              </a:cxn>
+              <a:cxn ang="0">
+                <a:pos x="connsiteX1" y="connsiteY1"/>
+              </a:cxn>
+              <a:cxn ang="0">
+                <a:pos x="connsiteX2" y="connsiteY2"/>
+              </a:cxn>
+              <a:cxn ang="0">
+                <a:pos x="connsiteX3" y="connsiteY3"/>
+              </a:cxn>
+              <a:cxn ang="0">
+                <a:pos x="connsiteX4" y="connsiteY4"/>
+              </a:cxn>
+              <a:cxn ang="0">
+                <a:pos x="connsiteX5" y="connsiteY5"/>
+              </a:cxn>
+              <a:cxn ang="0">
+                <a:pos x="connsiteX6" y="connsiteY6"/>
+              </a:cxn>
+              <a:cxn ang="0">
+                <a:pos x="connsiteX7" y="connsiteY7"/>
+              </a:cxn>
+              <a:cxn ang="0">
+                <a:pos x="connsiteX8" y="connsiteY8"/>
+              </a:cxn>
+              <a:cxn ang="0">
+                <a:pos x="connsiteX9" y="connsiteY9"/>
+              </a:cxn>
+              <a:cxn ang="0">
+                <a:pos x="connsiteX10" y="connsiteY10"/>
+              </a:cxn>
+              <a:cxn ang="0">
+                <a:pos x="connsiteX11" y="connsiteY11"/>
+              </a:cxn>
+              <a:cxn ang="0">
+                <a:pos x="connsiteX12" y="connsiteY12"/>
+              </a:cxn>
+              <a:cxn ang="0">
+                <a:pos x="connsiteX13" y="connsiteY13"/>
+              </a:cxn>
+              <a:cxn ang="0">
+                <a:pos x="connsiteX14" y="connsiteY14"/>
+              </a:cxn>
+              <a:cxn ang="0">
+                <a:pos x="connsiteX15" y="connsiteY15"/>
+              </a:cxn>
+              <a:cxn ang="0">
+                <a:pos x="connsiteX16" y="connsiteY16"/>
+              </a:cxn>
+              <a:cxn ang="0">
+                <a:pos x="connsiteX17" y="connsiteY17"/>
+              </a:cxn>
+              <a:cxn ang="0">
+                <a:pos x="connsiteX18" y="connsiteY18"/>
+              </a:cxn>
+              <a:cxn ang="0">
+                <a:pos x="connsiteX19" y="connsiteY19"/>
+              </a:cxn>
+              <a:cxn ang="0">
+                <a:pos x="connsiteX20" y="connsiteY20"/>
+              </a:cxn>
+              <a:cxn ang="0">
+                <a:pos x="connsiteX21" y="connsiteY21"/>
+              </a:cxn>
+              <a:cxn ang="0">
+                <a:pos x="connsiteX22" y="connsiteY22"/>
+              </a:cxn>
+              <a:cxn ang="0">
+                <a:pos x="connsiteX23" y="connsiteY23"/>
+              </a:cxn>
+              <a:cxn ang="0">
+                <a:pos x="connsiteX24" y="connsiteY24"/>
+              </a:cxn>
+              <a:cxn ang="0">
+                <a:pos x="connsiteX25" y="connsiteY25"/>
+              </a:cxn>
+              <a:cxn ang="0">
+                <a:pos x="connsiteX26" y="connsiteY26"/>
+              </a:cxn>
+              <a:cxn ang="0">
+                <a:pos x="connsiteX27" y="connsiteY27"/>
+              </a:cxn>
+              <a:cxn ang="0">
+                <a:pos x="connsiteX28" y="connsiteY28"/>
+              </a:cxn>
+              <a:cxn ang="0">
+                <a:pos x="connsiteX29" y="connsiteY29"/>
+              </a:cxn>
+              <a:cxn ang="0">
+                <a:pos x="connsiteX30" y="connsiteY30"/>
+              </a:cxn>
+              <a:cxn ang="0">
+                <a:pos x="connsiteX31" y="connsiteY31"/>
+              </a:cxn>
+              <a:cxn ang="0">
+                <a:pos x="connsiteX32" y="connsiteY32"/>
+              </a:cxn>
+              <a:cxn ang="0">
+                <a:pos x="connsiteX33" y="connsiteY33"/>
+              </a:cxn>
+            </a:cxnLst>
+            <a:rect l="l" t="t" r="r" b="b"/>
+            <a:pathLst>
+              <a:path w="8117568" h="2270839">
+                <a:moveTo>
+                  <a:pt x="0" y="0"/>
+                </a:moveTo>
+                <a:lnTo>
+                  <a:pt x="8117568" y="0"/>
+                </a:lnTo>
+                <a:lnTo>
+                  <a:pt x="8117568" y="1754616"/>
+                </a:lnTo>
+                <a:lnTo>
+                  <a:pt x="7886265" y="1797923"/>
+                </a:lnTo>
+                <a:lnTo>
+                  <a:pt x="7608716" y="1847667"/>
+                </a:lnTo>
+                <a:lnTo>
+                  <a:pt x="7329940" y="1896360"/>
+                </a:lnTo>
+                <a:lnTo>
+                  <a:pt x="7049935" y="1938046"/>
+                </a:lnTo>
+                <a:lnTo>
+                  <a:pt x="6771159" y="1980083"/>
+                </a:lnTo>
+                <a:lnTo>
+                  <a:pt x="6491154" y="2019318"/>
+                </a:lnTo>
+                <a:lnTo>
+                  <a:pt x="6214834" y="2052947"/>
+                </a:lnTo>
+                <a:lnTo>
+                  <a:pt x="5934829" y="2084825"/>
+                </a:lnTo>
+                <a:lnTo>
+                  <a:pt x="5656053" y="2113901"/>
+                </a:lnTo>
+                <a:lnTo>
+                  <a:pt x="5382188" y="2139123"/>
+                </a:lnTo>
+                <a:lnTo>
+                  <a:pt x="5104640" y="2164345"/>
+                </a:lnTo>
+                <a:lnTo>
+                  <a:pt x="4830776" y="2185364"/>
+                </a:lnTo>
+                <a:lnTo>
+                  <a:pt x="4556912" y="2201828"/>
+                </a:lnTo>
+                <a:lnTo>
+                  <a:pt x="4284276" y="2218994"/>
+                </a:lnTo>
+                <a:lnTo>
+                  <a:pt x="4014096" y="2233356"/>
+                </a:lnTo>
+                <a:lnTo>
+                  <a:pt x="3746372" y="2243515"/>
+                </a:lnTo>
+                <a:lnTo>
+                  <a:pt x="3478648" y="2252273"/>
+                </a:lnTo>
+                <a:lnTo>
+                  <a:pt x="3213381" y="2260680"/>
+                </a:lnTo>
+                <a:lnTo>
+                  <a:pt x="2951798" y="2264534"/>
+                </a:lnTo>
+                <a:lnTo>
+                  <a:pt x="2690215" y="2268737"/>
+                </a:lnTo>
+                <a:lnTo>
+                  <a:pt x="2432316" y="2270839"/>
+                </a:lnTo>
+                <a:lnTo>
+                  <a:pt x="2176873" y="2268737"/>
+                </a:lnTo>
+                <a:lnTo>
+                  <a:pt x="1923887" y="2268737"/>
+                </a:lnTo>
+                <a:lnTo>
+                  <a:pt x="1673356" y="2264534"/>
+                </a:lnTo>
+                <a:lnTo>
+                  <a:pt x="1427738" y="2258228"/>
+                </a:lnTo>
+                <a:lnTo>
+                  <a:pt x="1184577" y="2252273"/>
+                </a:lnTo>
+                <a:lnTo>
+                  <a:pt x="946327" y="2245617"/>
+                </a:lnTo>
+                <a:lnTo>
+                  <a:pt x="709305" y="2235458"/>
+                </a:lnTo>
+                <a:lnTo>
+                  <a:pt x="475970" y="2224598"/>
+                </a:lnTo>
+                <a:lnTo>
+                  <a:pt x="247543" y="2214790"/>
+                </a:lnTo>
+                <a:lnTo>
+                  <a:pt x="0" y="2199423"/>
+                </a:lnTo>
+                <a:close/>
+              </a:path>
+            </a:pathLst>
+          </a:custGeom>
+        </p:spPr>
+      </p:pic>
+      <p:sp>
+        <p:nvSpPr>
+          <p:cNvPr id="2" name="Title 1">
+            <a:extLst>
+              <a:ext uri="{FF2B5EF4-FFF2-40B4-BE49-F238E27FC236}">
+                <a16:creationId xmlns:a16="http://schemas.microsoft.com/office/drawing/2014/main" id="{DAF0ABD0-9507-EE8A-BD29-A1FB8BA75C34}"/>
+              </a:ext>
+            </a:extLst>
+          </p:cNvPr>
+          <p:cNvSpPr>
+            <a:spLocks noGrp="1"/>
+          </p:cNvSpPr>
+          <p:nvPr>
+            <p:ph type="title"/>
+          </p:nvPr>
+        </p:nvSpPr>
+        <p:spPr>
+          <a:xfrm>
+            <a:off x="1030288" y="609600"/>
+            <a:ext cx="10131425" cy="1110343"/>
+          </a:xfrm>
+        </p:spPr>
+        <p:txBody>
+          <a:bodyPr>
+            <a:normAutofit/>
+          </a:bodyPr>
+          <a:lstStyle/>
+          <a:p>
+            <a:pPr algn="ctr"/>
+            <a:r>
+              <a:rPr lang="en-US" dirty="0">
+                <a:solidFill>
+                  <a:schemeClr val="bg1"/>
+                </a:solidFill>
+              </a:rPr>
+              <a:t>Thunderstorm Analysis of Weather Stations</a:t>
+            </a:r>
+          </a:p>
+        </p:txBody>
+      </p:sp>
+      <p:sp>
+        <p:nvSpPr>
+          <p:cNvPr id="3" name="Content Placeholder 2">
+            <a:extLst>
+              <a:ext uri="{FF2B5EF4-FFF2-40B4-BE49-F238E27FC236}">
+                <a16:creationId xmlns:a16="http://schemas.microsoft.com/office/drawing/2014/main" id="{A6D3616A-72AE-E977-2A46-0EE3A31C0652}"/>
+              </a:ext>
+            </a:extLst>
+          </p:cNvPr>
+          <p:cNvSpPr>
+            <a:spLocks noGrp="1"/>
+          </p:cNvSpPr>
+          <p:nvPr>
+            <p:ph idx="1"/>
+          </p:nvPr>
+        </p:nvSpPr>
+        <p:spPr>
+          <a:xfrm>
+            <a:off x="685801" y="3637278"/>
+            <a:ext cx="10475912" cy="3048001"/>
+          </a:xfrm>
+        </p:spPr>
+        <p:txBody>
+          <a:bodyPr>
+            <a:normAutofit/>
+          </a:bodyPr>
+          <a:lstStyle/>
+          <a:p>
+            <a:r>
+              <a:rPr lang="en-US" dirty="0"/>
+              <a:t>Each weather station reports a variety of meteorological data in the database, but we are interested only in one data point</a:t>
+            </a:r>
+          </a:p>
+          <a:p>
+            <a:r>
+              <a:rPr lang="en-US" dirty="0"/>
+              <a:t>FRSHTT stands for “Fog, Rain, Snow, Hail, Thunder, Tornado</a:t>
+            </a:r>
+            <a:r>
+              <a:rPr lang="en-US"/>
+              <a:t>”, where </a:t>
+            </a:r>
+            <a:r>
+              <a:rPr lang="en-US" dirty="0"/>
+              <a:t>each digit in the integer corresponding to a Boolean “1” or “0” for appearance that day</a:t>
+            </a:r>
+          </a:p>
+          <a:p>
+            <a:r>
+              <a:rPr lang="en-US" dirty="0"/>
+              <a:t>We look at the tens place of this integer to identify if thunderstorms happened that day</a:t>
+            </a:r>
+          </a:p>
+          <a:p>
+            <a:r>
+              <a:rPr lang="en-US" dirty="0"/>
+              <a:t>Across a year of data, this becomes a total occurrences of thunderstorms that year, which can be averaged across a 10 year timeframe to find outliers in yearly thunderstorm occurrence</a:t>
+            </a:r>
+          </a:p>
+        </p:txBody>
+      </p:sp>
+      <p:pic>
+        <p:nvPicPr>
+          <p:cNvPr id="4" name="Content Placeholder 18">
+            <a:extLst>
+              <a:ext uri="{FF2B5EF4-FFF2-40B4-BE49-F238E27FC236}">
+                <a16:creationId xmlns:a16="http://schemas.microsoft.com/office/drawing/2014/main" id="{2AA67520-8264-A413-3903-82A8A61314FD}"/>
+              </a:ext>
+            </a:extLst>
+          </p:cNvPr>
+          <p:cNvPicPr>
+            <a:picLocks noChangeAspect="1"/>
+          </p:cNvPicPr>
+          <p:nvPr/>
+        </p:nvPicPr>
+        <p:blipFill>
+          <a:blip r:embed="rId3"/>
+          <a:srcRect b="78909"/>
+          <a:stretch>
+            <a:fillRect/>
+          </a:stretch>
+        </p:blipFill>
+        <p:spPr>
+          <a:xfrm>
+            <a:off x="2450564" y="2270839"/>
+            <a:ext cx="7284521" cy="1378371"/>
+          </a:xfrm>
+          <a:prstGeom prst="rect">
+            <a:avLst/>
+          </a:prstGeom>
+        </p:spPr>
+      </p:pic>
+      <p:cxnSp>
+        <p:nvCxnSpPr>
+          <p:cNvPr id="7" name="Straight Arrow Connector 6">
+            <a:extLst>
+              <a:ext uri="{FF2B5EF4-FFF2-40B4-BE49-F238E27FC236}">
+                <a16:creationId xmlns:a16="http://schemas.microsoft.com/office/drawing/2014/main" id="{E03ED068-BAA2-F520-5B5B-FDD727A4D7AA}"/>
+              </a:ext>
+            </a:extLst>
+          </p:cNvPr>
+          <p:cNvCxnSpPr>
+            <a:cxnSpLocks/>
+          </p:cNvCxnSpPr>
+          <p:nvPr/>
+        </p:nvCxnSpPr>
+        <p:spPr>
+          <a:xfrm flipH="1">
+            <a:off x="9479280" y="2418080"/>
+            <a:ext cx="447040" cy="619760"/>
+          </a:xfrm>
+          <a:prstGeom prst="straightConnector1">
+            <a:avLst/>
+          </a:prstGeom>
+          <a:ln w="57150">
+            <a:solidFill>
+              <a:srgbClr val="FF0000"/>
+            </a:solidFill>
+            <a:tailEnd type="triangle"/>
+          </a:ln>
+        </p:spPr>
+        <p:style>
+          <a:lnRef idx="1">
+            <a:schemeClr val="accent1"/>
+          </a:lnRef>
+          <a:fillRef idx="0">
+            <a:schemeClr val="accent1"/>
+          </a:fillRef>
+          <a:effectRef idx="0">
+            <a:schemeClr val="accent1"/>
+          </a:effectRef>
+          <a:fontRef idx="minor">
+            <a:schemeClr val="tx1"/>
+          </a:fontRef>
+        </p:style>
+      </p:cxnSp>
+    </p:spTree>
+    <p:extLst>
+      <p:ext uri="{BB962C8B-B14F-4D97-AF65-F5344CB8AC3E}">
+        <p14:creationId xmlns:p14="http://schemas.microsoft.com/office/powerpoint/2010/main" val="126246168"/>
+      </p:ext>
+    </p:extLst>
+  </p:cSld>
+  <p:clrMapOvr>
+    <a:overrideClrMapping bg1="lt1" tx1="dk1" bg2="lt2" tx2="dk2" accent1="accent1" accent2="accent2" accent3="accent3" accent4="accent4" accent5="accent5" accent6="accent6" hlink="hlink" folHlink="folHlink"/>
+  </p:clrMapOvr>
+</p:sld>
+</file>
+
+<file path=ppt/slides/slide6.xml><?xml version="1.0" encoding="utf-8"?>
 <p:sld xmlns:a="http://schemas.openxmlformats.org/drawingml/2006/main" xmlns:r="http://schemas.openxmlformats.org/officeDocument/2006/relationships" xmlns:p="http://schemas.openxmlformats.org/presentationml/2006/main">
   <p:cSld>
     <p:bg>
@@ -14112,11 +16947,49 @@
         </p:blipFill>
         <p:spPr>
           <a:xfrm>
-            <a:off x="845389" y="1513307"/>
-            <a:ext cx="9812246" cy="4906124"/>
+            <a:off x="1493622" y="1462507"/>
+            <a:ext cx="9204755" cy="4602378"/>
           </a:xfrm>
         </p:spPr>
       </p:pic>
+      <p:sp>
+        <p:nvSpPr>
+          <p:cNvPr id="3" name="TextBox 2">
+            <a:extLst>
+              <a:ext uri="{FF2B5EF4-FFF2-40B4-BE49-F238E27FC236}">
+                <a16:creationId xmlns:a16="http://schemas.microsoft.com/office/drawing/2014/main" id="{6D512EF8-AEFA-0F10-6765-37897951434B}"/>
+              </a:ext>
+            </a:extLst>
+          </p:cNvPr>
+          <p:cNvSpPr txBox="1"/>
+          <p:nvPr/>
+        </p:nvSpPr>
+        <p:spPr>
+          <a:xfrm>
+            <a:off x="812800" y="6248400"/>
+            <a:ext cx="10566400" cy="646331"/>
+          </a:xfrm>
+          <a:prstGeom prst="rect">
+            <a:avLst/>
+          </a:prstGeom>
+          <a:noFill/>
+        </p:spPr>
+        <p:txBody>
+          <a:bodyPr wrap="square" rtlCol="0">
+            <a:spAutoFit/>
+          </a:bodyPr>
+          <a:lstStyle/>
+          <a:p>
+            <a:r>
+              <a:rPr lang="en-US" dirty="0"/>
+              <a:t>The total number of weather stations and complete weather data becomes much more complete around 1973</a:t>
+            </a:r>
+          </a:p>
+          <a:p>
+            <a:endParaRPr lang="en-US" dirty="0"/>
+          </a:p>
+        </p:txBody>
+      </p:sp>
     </p:spTree>
     <p:extLst>
       <p:ext uri="{BB962C8B-B14F-4D97-AF65-F5344CB8AC3E}">
@@ -14130,7 +17003,7 @@
 </p:sld>
 </file>
 
-<file path=ppt/slides/slide6.xml><?xml version="1.0" encoding="utf-8"?>
+<file path=ppt/slides/slide7.xml><?xml version="1.0" encoding="utf-8"?>
 <p:sld xmlns:a="http://schemas.openxmlformats.org/drawingml/2006/main" xmlns:r="http://schemas.openxmlformats.org/officeDocument/2006/relationships" xmlns:p="http://schemas.openxmlformats.org/presentationml/2006/main">
   <p:cSld>
     <p:bg>
@@ -14143,7 +17016,13 @@
     </p:bg>
     <p:spTree>
       <p:nvGrpSpPr>
-        <p:cNvPr id="1" name=""/>
+        <p:cNvPr id="1" name="">
+          <a:extLst>
+            <a:ext uri="{FF2B5EF4-FFF2-40B4-BE49-F238E27FC236}">
+              <a16:creationId xmlns:a16="http://schemas.microsoft.com/office/drawing/2014/main" id="{769D491B-213D-697D-DDB8-1B8E534B94C1}"/>
+            </a:ext>
+          </a:extLst>
+        </p:cNvPr>
         <p:cNvGrpSpPr/>
         <p:nvPr/>
       </p:nvGrpSpPr>
@@ -14160,7 +17039,7 @@
           <p:cNvPr id="8" name="Rectangle 7">
             <a:extLst>
               <a:ext uri="{FF2B5EF4-FFF2-40B4-BE49-F238E27FC236}">
-                <a16:creationId xmlns:a16="http://schemas.microsoft.com/office/drawing/2014/main" id="{E1EB41F2-E181-4D4D-9131-A30F6B0AE596}"/>
+                <a16:creationId xmlns:a16="http://schemas.microsoft.com/office/drawing/2014/main" id="{D44F1221-BF45-CC99-621E-C82DDF70AFFB}"/>
               </a:ext>
               <a:ext uri="{C183D7F6-B498-43B3-948B-1728B52AA6E4}">
                 <adec:decorative xmlns:adec="http://schemas.microsoft.com/office/drawing/2017/decorative" val="1"/>
@@ -14220,7 +17099,7 @@
           <p:cNvPr id="10" name="Freeform: Shape 9">
             <a:extLst>
               <a:ext uri="{FF2B5EF4-FFF2-40B4-BE49-F238E27FC236}">
-                <a16:creationId xmlns:a16="http://schemas.microsoft.com/office/drawing/2014/main" id="{3D63CC92-C517-4C71-9222-4579252CD62E}"/>
+                <a16:creationId xmlns:a16="http://schemas.microsoft.com/office/drawing/2014/main" id="{B09B6567-37EA-6972-DF26-EE5EDA566E77}"/>
               </a:ext>
               <a:ext uri="{C183D7F6-B498-43B3-948B-1728B52AA6E4}">
                 <adec:decorative xmlns:adec="http://schemas.microsoft.com/office/drawing/2017/decorative" val="1"/>
@@ -14745,7 +17624,7 @@
           <p:cNvPr id="12" name="Picture 11">
             <a:extLst>
               <a:ext uri="{FF2B5EF4-FFF2-40B4-BE49-F238E27FC236}">
-                <a16:creationId xmlns:a16="http://schemas.microsoft.com/office/drawing/2014/main" id="{40A39FDC-39F4-4CB7-873B-8D786EC02516}"/>
+                <a16:creationId xmlns:a16="http://schemas.microsoft.com/office/drawing/2014/main" id="{02462EE7-ED3E-DACF-25AF-5D0D66931C0A}"/>
               </a:ext>
               <a:ext uri="{C183D7F6-B498-43B3-948B-1728B52AA6E4}">
                 <adec:decorative xmlns:adec="http://schemas.microsoft.com/office/drawing/2017/decorative" val="1"/>
@@ -15072,7 +17951,7 @@
           <p:cNvPr id="2" name="Title 1">
             <a:extLst>
               <a:ext uri="{FF2B5EF4-FFF2-40B4-BE49-F238E27FC236}">
-                <a16:creationId xmlns:a16="http://schemas.microsoft.com/office/drawing/2014/main" id="{2C583EF9-DDC4-D022-FB80-A043108B259D}"/>
+                <a16:creationId xmlns:a16="http://schemas.microsoft.com/office/drawing/2014/main" id="{2A9E5544-C59C-BB80-FC8A-D20DEF7A0F63}"/>
               </a:ext>
             </a:extLst>
           </p:cNvPr>
@@ -15097,19 +17976,1244 @@
           <a:p>
             <a:pPr algn="ctr"/>
             <a:r>
-              <a:rPr lang="en-US">
+              <a:rPr lang="en-US" dirty="0">
                 <a:solidFill>
                   <a:schemeClr val="bg1"/>
                 </a:solidFill>
               </a:rPr>
-              <a:t>Meteorites per year</a:t>
+              <a:t>Weather Station Selection Criteria</a:t>
+            </a:r>
+          </a:p>
+        </p:txBody>
+      </p:sp>
+      <p:sp>
+        <p:nvSpPr>
+          <p:cNvPr id="3" name="Content Placeholder 2">
+            <a:extLst>
+              <a:ext uri="{FF2B5EF4-FFF2-40B4-BE49-F238E27FC236}">
+                <a16:creationId xmlns:a16="http://schemas.microsoft.com/office/drawing/2014/main" id="{061B102A-76E3-00CD-C16F-40830DCFB7AA}"/>
+              </a:ext>
+            </a:extLst>
+          </p:cNvPr>
+          <p:cNvSpPr>
+            <a:spLocks noGrp="1"/>
+          </p:cNvSpPr>
+          <p:nvPr>
+            <p:ph idx="1"/>
+          </p:nvPr>
+        </p:nvSpPr>
+        <p:spPr>
+          <a:xfrm>
+            <a:off x="685801" y="2592572"/>
+            <a:ext cx="4597399" cy="4092708"/>
+          </a:xfrm>
+        </p:spPr>
+        <p:txBody>
+          <a:bodyPr>
+            <a:normAutofit/>
+          </a:bodyPr>
+          <a:lstStyle/>
+          <a:p>
+            <a:r>
+              <a:rPr lang="en-US" dirty="0"/>
+              <a:t>Thunder has a range of around 10 miles (</a:t>
+            </a:r>
+            <a:r>
+              <a:rPr lang="en-US" dirty="0">
+                <a:hlinkClick r:id="rId3"/>
+              </a:rPr>
+              <a:t>https://www.noaa.gov/jetstream/lightning/sound-of-thunder</a:t>
+            </a:r>
+            <a:r>
+              <a:rPr lang="en-US" dirty="0"/>
+              <a:t>)</a:t>
+            </a:r>
+          </a:p>
+          <a:p>
+            <a:r>
+              <a:rPr lang="en-US" dirty="0"/>
+              <a:t>A bounding box of 10 miles is created around each meteorite landing  based on the Haversine Algorithm.</a:t>
+            </a:r>
+          </a:p>
+          <a:p>
+            <a:r>
+              <a:rPr lang="en-US" dirty="0"/>
+              <a:t>The number of thunderstorms for the meteorite landing is a </a:t>
+            </a:r>
+            <a:r>
+              <a:rPr lang="en-US" i="1" dirty="0"/>
+              <a:t>Union</a:t>
+            </a:r>
+            <a:r>
+              <a:rPr lang="en-US" dirty="0"/>
+              <a:t> of the thunderstorm data for all stations in range.</a:t>
+            </a:r>
+          </a:p>
+          <a:p>
+            <a:pPr lvl="1"/>
+            <a:r>
+              <a:rPr lang="en-US" dirty="0"/>
+              <a:t>A more stringent approach would use the </a:t>
+            </a:r>
+            <a:r>
+              <a:rPr lang="en-US" i="1" dirty="0"/>
+              <a:t>Intersection</a:t>
+            </a:r>
+            <a:r>
+              <a:rPr lang="en-US" dirty="0"/>
+              <a:t> of the thunderstorm data. This may become a future change to the analysis method.</a:t>
             </a:r>
           </a:p>
         </p:txBody>
       </p:sp>
       <p:pic>
         <p:nvPicPr>
-          <p:cNvPr id="5" name="Content Placeholder 4" descr="A graph of a number of atomic number&#10;&#10;AI-generated content may be incorrect.">
+          <p:cNvPr id="5" name="Picture 4">
+            <a:extLst>
+              <a:ext uri="{FF2B5EF4-FFF2-40B4-BE49-F238E27FC236}">
+                <a16:creationId xmlns:a16="http://schemas.microsoft.com/office/drawing/2014/main" id="{ACB4FEDD-B9C8-8BA5-C9AB-8019F26D8DCF}"/>
+              </a:ext>
+            </a:extLst>
+          </p:cNvPr>
+          <p:cNvPicPr>
+            <a:picLocks noChangeAspect="1"/>
+          </p:cNvPicPr>
+          <p:nvPr/>
+        </p:nvPicPr>
+        <p:blipFill>
+          <a:blip r:embed="rId4"/>
+          <a:stretch>
+            <a:fillRect/>
+          </a:stretch>
+        </p:blipFill>
+        <p:spPr>
+          <a:xfrm>
+            <a:off x="5474832" y="1407693"/>
+            <a:ext cx="6525536" cy="5277587"/>
+          </a:xfrm>
+          <a:prstGeom prst="rect">
+            <a:avLst/>
+          </a:prstGeom>
+        </p:spPr>
+      </p:pic>
+      <p:sp>
+        <p:nvSpPr>
+          <p:cNvPr id="6" name="TextBox 5">
+            <a:extLst>
+              <a:ext uri="{FF2B5EF4-FFF2-40B4-BE49-F238E27FC236}">
+                <a16:creationId xmlns:a16="http://schemas.microsoft.com/office/drawing/2014/main" id="{C0972A1E-637E-3891-1E57-DF87F10109FE}"/>
+              </a:ext>
+            </a:extLst>
+          </p:cNvPr>
+          <p:cNvSpPr txBox="1"/>
+          <p:nvPr/>
+        </p:nvSpPr>
+        <p:spPr>
+          <a:xfrm>
+            <a:off x="6226672" y="6377503"/>
+            <a:ext cx="6525536" cy="307777"/>
+          </a:xfrm>
+          <a:prstGeom prst="rect">
+            <a:avLst/>
+          </a:prstGeom>
+          <a:noFill/>
+        </p:spPr>
+        <p:txBody>
+          <a:bodyPr wrap="square" rtlCol="0">
+            <a:spAutoFit/>
+          </a:bodyPr>
+          <a:lstStyle/>
+          <a:p>
+            <a:r>
+              <a:rPr lang="en-US" sz="1400" dirty="0"/>
+              <a:t>Example of the “</a:t>
+            </a:r>
+            <a:r>
+              <a:rPr lang="en-US" sz="1400" dirty="0" err="1"/>
+              <a:t>Thuathe</a:t>
+            </a:r>
+            <a:r>
+              <a:rPr lang="en-US" sz="1400" dirty="0"/>
+              <a:t>” meteorite bounding box with two stations in range</a:t>
+            </a:r>
+            <a:endParaRPr lang="en-US" dirty="0"/>
+          </a:p>
+        </p:txBody>
+      </p:sp>
+    </p:spTree>
+    <p:extLst>
+      <p:ext uri="{BB962C8B-B14F-4D97-AF65-F5344CB8AC3E}">
+        <p14:creationId xmlns:p14="http://schemas.microsoft.com/office/powerpoint/2010/main" val="1836900225"/>
+      </p:ext>
+    </p:extLst>
+  </p:cSld>
+  <p:clrMapOvr>
+    <a:overrideClrMapping bg1="lt1" tx1="dk1" bg2="lt2" tx2="dk2" accent1="accent1" accent2="accent2" accent3="accent3" accent4="accent4" accent5="accent5" accent6="accent6" hlink="hlink" folHlink="folHlink"/>
+  </p:clrMapOvr>
+</p:sld>
+</file>
+
+<file path=ppt/slides/slide8.xml><?xml version="1.0" encoding="utf-8"?>
+<p:sld xmlns:a="http://schemas.openxmlformats.org/drawingml/2006/main" xmlns:r="http://schemas.openxmlformats.org/officeDocument/2006/relationships" xmlns:p="http://schemas.openxmlformats.org/presentationml/2006/main">
+  <p:cSld>
+    <p:bg>
+      <p:bgPr>
+        <a:solidFill>
+          <a:schemeClr val="bg2"/>
+        </a:solidFill>
+        <a:effectLst/>
+      </p:bgPr>
+    </p:bg>
+    <p:spTree>
+      <p:nvGrpSpPr>
+        <p:cNvPr id="1" name="">
+          <a:extLst>
+            <a:ext uri="{FF2B5EF4-FFF2-40B4-BE49-F238E27FC236}">
+              <a16:creationId xmlns:a16="http://schemas.microsoft.com/office/drawing/2014/main" id="{22531BB0-D002-98E2-198A-F9AC4DCB439B}"/>
+            </a:ext>
+          </a:extLst>
+        </p:cNvPr>
+        <p:cNvGrpSpPr/>
+        <p:nvPr/>
+      </p:nvGrpSpPr>
+      <p:grpSpPr>
+        <a:xfrm>
+          <a:off x="0" y="0"/>
+          <a:ext cx="0" cy="0"/>
+          <a:chOff x="0" y="0"/>
+          <a:chExt cx="0" cy="0"/>
+        </a:xfrm>
+      </p:grpSpPr>
+      <p:sp useBgFill="1">
+        <p:nvSpPr>
+          <p:cNvPr id="8" name="Rectangle 7">
+            <a:extLst>
+              <a:ext uri="{FF2B5EF4-FFF2-40B4-BE49-F238E27FC236}">
+                <a16:creationId xmlns:a16="http://schemas.microsoft.com/office/drawing/2014/main" id="{6DC3D4A1-BC3A-1801-C6EE-0104FEE158C0}"/>
+              </a:ext>
+              <a:ext uri="{C183D7F6-B498-43B3-948B-1728B52AA6E4}">
+                <adec:decorative xmlns:adec="http://schemas.microsoft.com/office/drawing/2017/decorative" val="1"/>
+              </a:ext>
+            </a:extLst>
+          </p:cNvPr>
+          <p:cNvSpPr>
+            <a:spLocks noGrp="1" noRot="1" noChangeAspect="1" noMove="1" noResize="1" noEditPoints="1" noAdjustHandles="1" noChangeArrowheads="1" noChangeShapeType="1" noTextEdit="1"/>
+          </p:cNvSpPr>
+          <p:nvPr>
+            <p:extLst>
+              <p:ext uri="{386F3935-93C4-4BCD-93E2-E3B085C9AB24}">
+                <p16:designElem xmlns:p16="http://schemas.microsoft.com/office/powerpoint/2015/main" val="1"/>
+              </p:ext>
+            </p:extLst>
+          </p:nvPr>
+        </p:nvSpPr>
+        <p:spPr>
+          <a:xfrm>
+            <a:off x="0" y="0"/>
+            <a:ext cx="12192000" cy="6858000"/>
+          </a:xfrm>
+          <a:prstGeom prst="rect">
+            <a:avLst/>
+          </a:prstGeom>
+          <a:ln>
+            <a:noFill/>
+          </a:ln>
+        </p:spPr>
+        <p:style>
+          <a:lnRef idx="2">
+            <a:schemeClr val="accent1">
+              <a:shade val="50000"/>
+            </a:schemeClr>
+          </a:lnRef>
+          <a:fillRef idx="1">
+            <a:schemeClr val="accent1"/>
+          </a:fillRef>
+          <a:effectRef idx="0">
+            <a:schemeClr val="accent1"/>
+          </a:effectRef>
+          <a:fontRef idx="minor">
+            <a:schemeClr val="lt1"/>
+          </a:fontRef>
+        </p:style>
+        <p:txBody>
+          <a:bodyPr rtlCol="0" anchor="ctr"/>
+          <a:lstStyle/>
+          <a:p>
+            <a:pPr algn="ctr"/>
+            <a:endParaRPr lang="en-US"/>
+          </a:p>
+        </p:txBody>
+      </p:sp>
+      <p:sp>
+        <p:nvSpPr>
+          <p:cNvPr id="10" name="Freeform: Shape 9">
+            <a:extLst>
+              <a:ext uri="{FF2B5EF4-FFF2-40B4-BE49-F238E27FC236}">
+                <a16:creationId xmlns:a16="http://schemas.microsoft.com/office/drawing/2014/main" id="{FB848A5C-ADCC-C4CC-0055-E3D518BD4D04}"/>
+              </a:ext>
+              <a:ext uri="{C183D7F6-B498-43B3-948B-1728B52AA6E4}">
+                <adec:decorative xmlns:adec="http://schemas.microsoft.com/office/drawing/2017/decorative" val="1"/>
+              </a:ext>
+            </a:extLst>
+          </p:cNvPr>
+          <p:cNvSpPr>
+            <a:spLocks noGrp="1" noRot="1" noChangeAspect="1" noMove="1" noResize="1" noEditPoints="1" noAdjustHandles="1" noChangeArrowheads="1" noChangeShapeType="1" noTextEdit="1"/>
+          </p:cNvSpPr>
+          <p:nvPr>
+            <p:extLst>
+              <p:ext uri="{386F3935-93C4-4BCD-93E2-E3B085C9AB24}">
+                <p16:designElem xmlns:p16="http://schemas.microsoft.com/office/powerpoint/2015/main" val="1"/>
+              </p:ext>
+            </p:extLst>
+          </p:nvPr>
+        </p:nvSpPr>
+        <p:spPr>
+          <a:xfrm>
+            <a:off x="0" y="0"/>
+            <a:ext cx="12192000" cy="2270839"/>
+          </a:xfrm>
+          <a:custGeom>
+            <a:avLst/>
+            <a:gdLst>
+              <a:gd name="connsiteX0" fmla="*/ 0 w 12192000"/>
+              <a:gd name="connsiteY0" fmla="*/ 0 h 2270839"/>
+              <a:gd name="connsiteX1" fmla="*/ 12192000 w 12192000"/>
+              <a:gd name="connsiteY1" fmla="*/ 0 h 2270839"/>
+              <a:gd name="connsiteX2" fmla="*/ 12192000 w 12192000"/>
+              <a:gd name="connsiteY2" fmla="*/ 213719 h 2270839"/>
+              <a:gd name="connsiteX3" fmla="*/ 12192000 w 12192000"/>
+              <a:gd name="connsiteY3" fmla="*/ 471948 h 2270839"/>
+              <a:gd name="connsiteX4" fmla="*/ 12192000 w 12192000"/>
+              <a:gd name="connsiteY4" fmla="*/ 519830 h 2270839"/>
+              <a:gd name="connsiteX5" fmla="*/ 12192000 w 12192000"/>
+              <a:gd name="connsiteY5" fmla="*/ 744793 h 2270839"/>
+              <a:gd name="connsiteX6" fmla="*/ 12192000 w 12192000"/>
+              <a:gd name="connsiteY6" fmla="*/ 1754021 h 2270839"/>
+              <a:gd name="connsiteX7" fmla="*/ 11957522 w 12192000"/>
+              <a:gd name="connsiteY7" fmla="*/ 1797923 h 2270839"/>
+              <a:gd name="connsiteX8" fmla="*/ 11679973 w 12192000"/>
+              <a:gd name="connsiteY8" fmla="*/ 1847667 h 2270839"/>
+              <a:gd name="connsiteX9" fmla="*/ 11401197 w 12192000"/>
+              <a:gd name="connsiteY9" fmla="*/ 1896360 h 2270839"/>
+              <a:gd name="connsiteX10" fmla="*/ 11121192 w 12192000"/>
+              <a:gd name="connsiteY10" fmla="*/ 1938046 h 2270839"/>
+              <a:gd name="connsiteX11" fmla="*/ 10842416 w 12192000"/>
+              <a:gd name="connsiteY11" fmla="*/ 1980083 h 2270839"/>
+              <a:gd name="connsiteX12" fmla="*/ 10562411 w 12192000"/>
+              <a:gd name="connsiteY12" fmla="*/ 2019318 h 2270839"/>
+              <a:gd name="connsiteX13" fmla="*/ 10286091 w 12192000"/>
+              <a:gd name="connsiteY13" fmla="*/ 2052947 h 2270839"/>
+              <a:gd name="connsiteX14" fmla="*/ 10006086 w 12192000"/>
+              <a:gd name="connsiteY14" fmla="*/ 2084825 h 2270839"/>
+              <a:gd name="connsiteX15" fmla="*/ 9727310 w 12192000"/>
+              <a:gd name="connsiteY15" fmla="*/ 2113901 h 2270839"/>
+              <a:gd name="connsiteX16" fmla="*/ 9453445 w 12192000"/>
+              <a:gd name="connsiteY16" fmla="*/ 2139123 h 2270839"/>
+              <a:gd name="connsiteX17" fmla="*/ 9175897 w 12192000"/>
+              <a:gd name="connsiteY17" fmla="*/ 2164345 h 2270839"/>
+              <a:gd name="connsiteX18" fmla="*/ 8902033 w 12192000"/>
+              <a:gd name="connsiteY18" fmla="*/ 2185364 h 2270839"/>
+              <a:gd name="connsiteX19" fmla="*/ 8628169 w 12192000"/>
+              <a:gd name="connsiteY19" fmla="*/ 2201828 h 2270839"/>
+              <a:gd name="connsiteX20" fmla="*/ 8355533 w 12192000"/>
+              <a:gd name="connsiteY20" fmla="*/ 2218994 h 2270839"/>
+              <a:gd name="connsiteX21" fmla="*/ 8085353 w 12192000"/>
+              <a:gd name="connsiteY21" fmla="*/ 2233356 h 2270839"/>
+              <a:gd name="connsiteX22" fmla="*/ 7817629 w 12192000"/>
+              <a:gd name="connsiteY22" fmla="*/ 2243515 h 2270839"/>
+              <a:gd name="connsiteX23" fmla="*/ 7549905 w 12192000"/>
+              <a:gd name="connsiteY23" fmla="*/ 2252273 h 2270839"/>
+              <a:gd name="connsiteX24" fmla="*/ 7284638 w 12192000"/>
+              <a:gd name="connsiteY24" fmla="*/ 2260680 h 2270839"/>
+              <a:gd name="connsiteX25" fmla="*/ 7023055 w 12192000"/>
+              <a:gd name="connsiteY25" fmla="*/ 2264534 h 2270839"/>
+              <a:gd name="connsiteX26" fmla="*/ 6761472 w 12192000"/>
+              <a:gd name="connsiteY26" fmla="*/ 2268737 h 2270839"/>
+              <a:gd name="connsiteX27" fmla="*/ 6503573 w 12192000"/>
+              <a:gd name="connsiteY27" fmla="*/ 2270839 h 2270839"/>
+              <a:gd name="connsiteX28" fmla="*/ 6248130 w 12192000"/>
+              <a:gd name="connsiteY28" fmla="*/ 2268737 h 2270839"/>
+              <a:gd name="connsiteX29" fmla="*/ 5995144 w 12192000"/>
+              <a:gd name="connsiteY29" fmla="*/ 2268737 h 2270839"/>
+              <a:gd name="connsiteX30" fmla="*/ 5744613 w 12192000"/>
+              <a:gd name="connsiteY30" fmla="*/ 2264534 h 2270839"/>
+              <a:gd name="connsiteX31" fmla="*/ 5498995 w 12192000"/>
+              <a:gd name="connsiteY31" fmla="*/ 2258228 h 2270839"/>
+              <a:gd name="connsiteX32" fmla="*/ 5255834 w 12192000"/>
+              <a:gd name="connsiteY32" fmla="*/ 2252273 h 2270839"/>
+              <a:gd name="connsiteX33" fmla="*/ 5017584 w 12192000"/>
+              <a:gd name="connsiteY33" fmla="*/ 2245617 h 2270839"/>
+              <a:gd name="connsiteX34" fmla="*/ 4780562 w 12192000"/>
+              <a:gd name="connsiteY34" fmla="*/ 2235458 h 2270839"/>
+              <a:gd name="connsiteX35" fmla="*/ 4547227 w 12192000"/>
+              <a:gd name="connsiteY35" fmla="*/ 2224598 h 2270839"/>
+              <a:gd name="connsiteX36" fmla="*/ 4318800 w 12192000"/>
+              <a:gd name="connsiteY36" fmla="*/ 2214790 h 2270839"/>
+              <a:gd name="connsiteX37" fmla="*/ 3873004 w 12192000"/>
+              <a:gd name="connsiteY37" fmla="*/ 2187115 h 2270839"/>
+              <a:gd name="connsiteX38" fmla="*/ 3445628 w 12192000"/>
+              <a:gd name="connsiteY38" fmla="*/ 2157690 h 2270839"/>
+              <a:gd name="connsiteX39" fmla="*/ 3035446 w 12192000"/>
+              <a:gd name="connsiteY39" fmla="*/ 2126862 h 2270839"/>
+              <a:gd name="connsiteX40" fmla="*/ 2647370 w 12192000"/>
+              <a:gd name="connsiteY40" fmla="*/ 2092883 h 2270839"/>
+              <a:gd name="connsiteX41" fmla="*/ 2276487 w 12192000"/>
+              <a:gd name="connsiteY41" fmla="*/ 2057501 h 2270839"/>
+              <a:gd name="connsiteX42" fmla="*/ 1932621 w 12192000"/>
+              <a:gd name="connsiteY42" fmla="*/ 2019318 h 2270839"/>
+              <a:gd name="connsiteX43" fmla="*/ 1609634 w 12192000"/>
+              <a:gd name="connsiteY43" fmla="*/ 1981835 h 2270839"/>
+              <a:gd name="connsiteX44" fmla="*/ 1312435 w 12192000"/>
+              <a:gd name="connsiteY44" fmla="*/ 1944352 h 2270839"/>
+              <a:gd name="connsiteX45" fmla="*/ 1039799 w 12192000"/>
+              <a:gd name="connsiteY45" fmla="*/ 1908971 h 2270839"/>
+              <a:gd name="connsiteX46" fmla="*/ 797865 w 12192000"/>
+              <a:gd name="connsiteY46" fmla="*/ 1875341 h 2270839"/>
+              <a:gd name="connsiteX47" fmla="*/ 579265 w 12192000"/>
+              <a:gd name="connsiteY47" fmla="*/ 1843463 h 2270839"/>
+              <a:gd name="connsiteX48" fmla="*/ 395052 w 12192000"/>
+              <a:gd name="connsiteY48" fmla="*/ 1816840 h 2270839"/>
+              <a:gd name="connsiteX49" fmla="*/ 240312 w 12192000"/>
+              <a:gd name="connsiteY49" fmla="*/ 1791617 h 2270839"/>
+              <a:gd name="connsiteX50" fmla="*/ 27853 w 12192000"/>
+              <a:gd name="connsiteY50" fmla="*/ 1755536 h 2270839"/>
+              <a:gd name="connsiteX51" fmla="*/ 0 w 12192000"/>
+              <a:gd name="connsiteY51" fmla="*/ 1750823 h 2270839"/>
+              <a:gd name="connsiteX52" fmla="*/ 0 w 12192000"/>
+              <a:gd name="connsiteY52" fmla="*/ 744793 h 2270839"/>
+              <a:gd name="connsiteX53" fmla="*/ 0 w 12192000"/>
+              <a:gd name="connsiteY53" fmla="*/ 519830 h 2270839"/>
+              <a:gd name="connsiteX54" fmla="*/ 0 w 12192000"/>
+              <a:gd name="connsiteY54" fmla="*/ 471948 h 2270839"/>
+              <a:gd name="connsiteX55" fmla="*/ 0 w 12192000"/>
+              <a:gd name="connsiteY55" fmla="*/ 213719 h 2270839"/>
+            </a:gdLst>
+            <a:ahLst/>
+            <a:cxnLst>
+              <a:cxn ang="0">
+                <a:pos x="connsiteX0" y="connsiteY0"/>
+              </a:cxn>
+              <a:cxn ang="0">
+                <a:pos x="connsiteX1" y="connsiteY1"/>
+              </a:cxn>
+              <a:cxn ang="0">
+                <a:pos x="connsiteX2" y="connsiteY2"/>
+              </a:cxn>
+              <a:cxn ang="0">
+                <a:pos x="connsiteX3" y="connsiteY3"/>
+              </a:cxn>
+              <a:cxn ang="0">
+                <a:pos x="connsiteX4" y="connsiteY4"/>
+              </a:cxn>
+              <a:cxn ang="0">
+                <a:pos x="connsiteX5" y="connsiteY5"/>
+              </a:cxn>
+              <a:cxn ang="0">
+                <a:pos x="connsiteX6" y="connsiteY6"/>
+              </a:cxn>
+              <a:cxn ang="0">
+                <a:pos x="connsiteX7" y="connsiteY7"/>
+              </a:cxn>
+              <a:cxn ang="0">
+                <a:pos x="connsiteX8" y="connsiteY8"/>
+              </a:cxn>
+              <a:cxn ang="0">
+                <a:pos x="connsiteX9" y="connsiteY9"/>
+              </a:cxn>
+              <a:cxn ang="0">
+                <a:pos x="connsiteX10" y="connsiteY10"/>
+              </a:cxn>
+              <a:cxn ang="0">
+                <a:pos x="connsiteX11" y="connsiteY11"/>
+              </a:cxn>
+              <a:cxn ang="0">
+                <a:pos x="connsiteX12" y="connsiteY12"/>
+              </a:cxn>
+              <a:cxn ang="0">
+                <a:pos x="connsiteX13" y="connsiteY13"/>
+              </a:cxn>
+              <a:cxn ang="0">
+                <a:pos x="connsiteX14" y="connsiteY14"/>
+              </a:cxn>
+              <a:cxn ang="0">
+                <a:pos x="connsiteX15" y="connsiteY15"/>
+              </a:cxn>
+              <a:cxn ang="0">
+                <a:pos x="connsiteX16" y="connsiteY16"/>
+              </a:cxn>
+              <a:cxn ang="0">
+                <a:pos x="connsiteX17" y="connsiteY17"/>
+              </a:cxn>
+              <a:cxn ang="0">
+                <a:pos x="connsiteX18" y="connsiteY18"/>
+              </a:cxn>
+              <a:cxn ang="0">
+                <a:pos x="connsiteX19" y="connsiteY19"/>
+              </a:cxn>
+              <a:cxn ang="0">
+                <a:pos x="connsiteX20" y="connsiteY20"/>
+              </a:cxn>
+              <a:cxn ang="0">
+                <a:pos x="connsiteX21" y="connsiteY21"/>
+              </a:cxn>
+              <a:cxn ang="0">
+                <a:pos x="connsiteX22" y="connsiteY22"/>
+              </a:cxn>
+              <a:cxn ang="0">
+                <a:pos x="connsiteX23" y="connsiteY23"/>
+              </a:cxn>
+              <a:cxn ang="0">
+                <a:pos x="connsiteX24" y="connsiteY24"/>
+              </a:cxn>
+              <a:cxn ang="0">
+                <a:pos x="connsiteX25" y="connsiteY25"/>
+              </a:cxn>
+              <a:cxn ang="0">
+                <a:pos x="connsiteX26" y="connsiteY26"/>
+              </a:cxn>
+              <a:cxn ang="0">
+                <a:pos x="connsiteX27" y="connsiteY27"/>
+              </a:cxn>
+              <a:cxn ang="0">
+                <a:pos x="connsiteX28" y="connsiteY28"/>
+              </a:cxn>
+              <a:cxn ang="0">
+                <a:pos x="connsiteX29" y="connsiteY29"/>
+              </a:cxn>
+              <a:cxn ang="0">
+                <a:pos x="connsiteX30" y="connsiteY30"/>
+              </a:cxn>
+              <a:cxn ang="0">
+                <a:pos x="connsiteX31" y="connsiteY31"/>
+              </a:cxn>
+              <a:cxn ang="0">
+                <a:pos x="connsiteX32" y="connsiteY32"/>
+              </a:cxn>
+              <a:cxn ang="0">
+                <a:pos x="connsiteX33" y="connsiteY33"/>
+              </a:cxn>
+              <a:cxn ang="0">
+                <a:pos x="connsiteX34" y="connsiteY34"/>
+              </a:cxn>
+              <a:cxn ang="0">
+                <a:pos x="connsiteX35" y="connsiteY35"/>
+              </a:cxn>
+              <a:cxn ang="0">
+                <a:pos x="connsiteX36" y="connsiteY36"/>
+              </a:cxn>
+              <a:cxn ang="0">
+                <a:pos x="connsiteX37" y="connsiteY37"/>
+              </a:cxn>
+              <a:cxn ang="0">
+                <a:pos x="connsiteX38" y="connsiteY38"/>
+              </a:cxn>
+              <a:cxn ang="0">
+                <a:pos x="connsiteX39" y="connsiteY39"/>
+              </a:cxn>
+              <a:cxn ang="0">
+                <a:pos x="connsiteX40" y="connsiteY40"/>
+              </a:cxn>
+              <a:cxn ang="0">
+                <a:pos x="connsiteX41" y="connsiteY41"/>
+              </a:cxn>
+              <a:cxn ang="0">
+                <a:pos x="connsiteX42" y="connsiteY42"/>
+              </a:cxn>
+              <a:cxn ang="0">
+                <a:pos x="connsiteX43" y="connsiteY43"/>
+              </a:cxn>
+              <a:cxn ang="0">
+                <a:pos x="connsiteX44" y="connsiteY44"/>
+              </a:cxn>
+              <a:cxn ang="0">
+                <a:pos x="connsiteX45" y="connsiteY45"/>
+              </a:cxn>
+              <a:cxn ang="0">
+                <a:pos x="connsiteX46" y="connsiteY46"/>
+              </a:cxn>
+              <a:cxn ang="0">
+                <a:pos x="connsiteX47" y="connsiteY47"/>
+              </a:cxn>
+              <a:cxn ang="0">
+                <a:pos x="connsiteX48" y="connsiteY48"/>
+              </a:cxn>
+              <a:cxn ang="0">
+                <a:pos x="connsiteX49" y="connsiteY49"/>
+              </a:cxn>
+              <a:cxn ang="0">
+                <a:pos x="connsiteX50" y="connsiteY50"/>
+              </a:cxn>
+              <a:cxn ang="0">
+                <a:pos x="connsiteX51" y="connsiteY51"/>
+              </a:cxn>
+              <a:cxn ang="0">
+                <a:pos x="connsiteX52" y="connsiteY52"/>
+              </a:cxn>
+              <a:cxn ang="0">
+                <a:pos x="connsiteX53" y="connsiteY53"/>
+              </a:cxn>
+              <a:cxn ang="0">
+                <a:pos x="connsiteX54" y="connsiteY54"/>
+              </a:cxn>
+              <a:cxn ang="0">
+                <a:pos x="connsiteX55" y="connsiteY55"/>
+              </a:cxn>
+            </a:cxnLst>
+            <a:rect l="l" t="t" r="r" b="b"/>
+            <a:pathLst>
+              <a:path w="12192000" h="2270839">
+                <a:moveTo>
+                  <a:pt x="0" y="0"/>
+                </a:moveTo>
+                <a:lnTo>
+                  <a:pt x="12192000" y="0"/>
+                </a:lnTo>
+                <a:lnTo>
+                  <a:pt x="12192000" y="213719"/>
+                </a:lnTo>
+                <a:lnTo>
+                  <a:pt x="12192000" y="471948"/>
+                </a:lnTo>
+                <a:lnTo>
+                  <a:pt x="12192000" y="519830"/>
+                </a:lnTo>
+                <a:lnTo>
+                  <a:pt x="12192000" y="744793"/>
+                </a:lnTo>
+                <a:lnTo>
+                  <a:pt x="12192000" y="1754021"/>
+                </a:lnTo>
+                <a:lnTo>
+                  <a:pt x="11957522" y="1797923"/>
+                </a:lnTo>
+                <a:lnTo>
+                  <a:pt x="11679973" y="1847667"/>
+                </a:lnTo>
+                <a:lnTo>
+                  <a:pt x="11401197" y="1896360"/>
+                </a:lnTo>
+                <a:lnTo>
+                  <a:pt x="11121192" y="1938046"/>
+                </a:lnTo>
+                <a:lnTo>
+                  <a:pt x="10842416" y="1980083"/>
+                </a:lnTo>
+                <a:lnTo>
+                  <a:pt x="10562411" y="2019318"/>
+                </a:lnTo>
+                <a:lnTo>
+                  <a:pt x="10286091" y="2052947"/>
+                </a:lnTo>
+                <a:lnTo>
+                  <a:pt x="10006086" y="2084825"/>
+                </a:lnTo>
+                <a:lnTo>
+                  <a:pt x="9727310" y="2113901"/>
+                </a:lnTo>
+                <a:lnTo>
+                  <a:pt x="9453445" y="2139123"/>
+                </a:lnTo>
+                <a:lnTo>
+                  <a:pt x="9175897" y="2164345"/>
+                </a:lnTo>
+                <a:lnTo>
+                  <a:pt x="8902033" y="2185364"/>
+                </a:lnTo>
+                <a:lnTo>
+                  <a:pt x="8628169" y="2201828"/>
+                </a:lnTo>
+                <a:lnTo>
+                  <a:pt x="8355533" y="2218994"/>
+                </a:lnTo>
+                <a:lnTo>
+                  <a:pt x="8085353" y="2233356"/>
+                </a:lnTo>
+                <a:lnTo>
+                  <a:pt x="7817629" y="2243515"/>
+                </a:lnTo>
+                <a:lnTo>
+                  <a:pt x="7549905" y="2252273"/>
+                </a:lnTo>
+                <a:lnTo>
+                  <a:pt x="7284638" y="2260680"/>
+                </a:lnTo>
+                <a:lnTo>
+                  <a:pt x="7023055" y="2264534"/>
+                </a:lnTo>
+                <a:lnTo>
+                  <a:pt x="6761472" y="2268737"/>
+                </a:lnTo>
+                <a:lnTo>
+                  <a:pt x="6503573" y="2270839"/>
+                </a:lnTo>
+                <a:lnTo>
+                  <a:pt x="6248130" y="2268737"/>
+                </a:lnTo>
+                <a:lnTo>
+                  <a:pt x="5995144" y="2268737"/>
+                </a:lnTo>
+                <a:lnTo>
+                  <a:pt x="5744613" y="2264534"/>
+                </a:lnTo>
+                <a:lnTo>
+                  <a:pt x="5498995" y="2258228"/>
+                </a:lnTo>
+                <a:lnTo>
+                  <a:pt x="5255834" y="2252273"/>
+                </a:lnTo>
+                <a:lnTo>
+                  <a:pt x="5017584" y="2245617"/>
+                </a:lnTo>
+                <a:lnTo>
+                  <a:pt x="4780562" y="2235458"/>
+                </a:lnTo>
+                <a:lnTo>
+                  <a:pt x="4547227" y="2224598"/>
+                </a:lnTo>
+                <a:lnTo>
+                  <a:pt x="4318800" y="2214790"/>
+                </a:lnTo>
+                <a:lnTo>
+                  <a:pt x="3873004" y="2187115"/>
+                </a:lnTo>
+                <a:lnTo>
+                  <a:pt x="3445628" y="2157690"/>
+                </a:lnTo>
+                <a:lnTo>
+                  <a:pt x="3035446" y="2126862"/>
+                </a:lnTo>
+                <a:lnTo>
+                  <a:pt x="2647370" y="2092883"/>
+                </a:lnTo>
+                <a:lnTo>
+                  <a:pt x="2276487" y="2057501"/>
+                </a:lnTo>
+                <a:lnTo>
+                  <a:pt x="1932621" y="2019318"/>
+                </a:lnTo>
+                <a:lnTo>
+                  <a:pt x="1609634" y="1981835"/>
+                </a:lnTo>
+                <a:lnTo>
+                  <a:pt x="1312435" y="1944352"/>
+                </a:lnTo>
+                <a:lnTo>
+                  <a:pt x="1039799" y="1908971"/>
+                </a:lnTo>
+                <a:lnTo>
+                  <a:pt x="797865" y="1875341"/>
+                </a:lnTo>
+                <a:lnTo>
+                  <a:pt x="579265" y="1843463"/>
+                </a:lnTo>
+                <a:lnTo>
+                  <a:pt x="395052" y="1816840"/>
+                </a:lnTo>
+                <a:lnTo>
+                  <a:pt x="240312" y="1791617"/>
+                </a:lnTo>
+                <a:lnTo>
+                  <a:pt x="27853" y="1755536"/>
+                </a:lnTo>
+                <a:lnTo>
+                  <a:pt x="0" y="1750823"/>
+                </a:lnTo>
+                <a:lnTo>
+                  <a:pt x="0" y="744793"/>
+                </a:lnTo>
+                <a:lnTo>
+                  <a:pt x="0" y="519830"/>
+                </a:lnTo>
+                <a:lnTo>
+                  <a:pt x="0" y="471948"/>
+                </a:lnTo>
+                <a:lnTo>
+                  <a:pt x="0" y="213719"/>
+                </a:lnTo>
+                <a:close/>
+              </a:path>
+            </a:pathLst>
+          </a:custGeom>
+          <a:solidFill>
+            <a:schemeClr val="tx2"/>
+          </a:solidFill>
+          <a:ln w="44450">
+            <a:noFill/>
+          </a:ln>
+          <a:effectLst/>
+        </p:spPr>
+        <p:style>
+          <a:lnRef idx="2">
+            <a:schemeClr val="accent1">
+              <a:shade val="50000"/>
+            </a:schemeClr>
+          </a:lnRef>
+          <a:fillRef idx="1003">
+            <a:schemeClr val="dk2"/>
+          </a:fillRef>
+          <a:effectRef idx="0">
+            <a:schemeClr val="accent1"/>
+          </a:effectRef>
+          <a:fontRef idx="minor">
+            <a:schemeClr val="lt1"/>
+          </a:fontRef>
+        </p:style>
+        <p:txBody>
+          <a:bodyPr wrap="square" rtlCol="0" anchor="ctr">
+            <a:noAutofit/>
+          </a:bodyPr>
+          <a:lstStyle/>
+          <a:p>
+            <a:pPr algn="ctr"/>
+            <a:endParaRPr lang="en-US"/>
+          </a:p>
+        </p:txBody>
+      </p:sp>
+      <p:pic>
+        <p:nvPicPr>
+          <p:cNvPr id="12" name="Picture 11">
+            <a:extLst>
+              <a:ext uri="{FF2B5EF4-FFF2-40B4-BE49-F238E27FC236}">
+                <a16:creationId xmlns:a16="http://schemas.microsoft.com/office/drawing/2014/main" id="{B91CCF40-8965-B22D-B64A-700D3CFA54D1}"/>
+              </a:ext>
+              <a:ext uri="{C183D7F6-B498-43B3-948B-1728B52AA6E4}">
+                <adec:decorative xmlns:adec="http://schemas.microsoft.com/office/drawing/2017/decorative" val="1"/>
+              </a:ext>
+            </a:extLst>
+          </p:cNvPr>
+          <p:cNvPicPr>
+            <a:picLocks noGrp="1" noRot="1" noChangeAspect="1" noMove="1" noResize="1" noEditPoints="1" noAdjustHandles="1" noChangeArrowheads="1" noChangeShapeType="1" noCrop="1"/>
+          </p:cNvPicPr>
+          <p:nvPr>
+            <p:extLst>
+              <p:ext uri="{386F3935-93C4-4BCD-93E2-E3B085C9AB24}">
+                <p16:designElem xmlns:p16="http://schemas.microsoft.com/office/powerpoint/2015/main" val="1"/>
+              </p:ext>
+            </p:extLst>
+          </p:nvPr>
+        </p:nvPicPr>
+        <p:blipFill rotWithShape="1">
+          <a:blip r:embed="rId2">
+            <a:extLst>
+              <a:ext uri="{28A0092B-C50C-407E-A947-70E740481C1C}">
+                <a14:useLocalDpi xmlns:a14="http://schemas.microsoft.com/office/drawing/2010/main" val="0"/>
+              </a:ext>
+            </a:extLst>
+          </a:blip>
+          <a:srcRect l="25900" b="63148"/>
+          <a:stretch/>
+        </p:blipFill>
+        <p:spPr>
+          <a:xfrm>
+            <a:off x="4071257" y="1"/>
+            <a:ext cx="8117568" cy="2270839"/>
+          </a:xfrm>
+          <a:custGeom>
+            <a:avLst/>
+            <a:gdLst>
+              <a:gd name="connsiteX0" fmla="*/ 0 w 8117568"/>
+              <a:gd name="connsiteY0" fmla="*/ 0 h 2270839"/>
+              <a:gd name="connsiteX1" fmla="*/ 8117568 w 8117568"/>
+              <a:gd name="connsiteY1" fmla="*/ 0 h 2270839"/>
+              <a:gd name="connsiteX2" fmla="*/ 8117568 w 8117568"/>
+              <a:gd name="connsiteY2" fmla="*/ 1754616 h 2270839"/>
+              <a:gd name="connsiteX3" fmla="*/ 7886265 w 8117568"/>
+              <a:gd name="connsiteY3" fmla="*/ 1797923 h 2270839"/>
+              <a:gd name="connsiteX4" fmla="*/ 7608716 w 8117568"/>
+              <a:gd name="connsiteY4" fmla="*/ 1847667 h 2270839"/>
+              <a:gd name="connsiteX5" fmla="*/ 7329940 w 8117568"/>
+              <a:gd name="connsiteY5" fmla="*/ 1896360 h 2270839"/>
+              <a:gd name="connsiteX6" fmla="*/ 7049935 w 8117568"/>
+              <a:gd name="connsiteY6" fmla="*/ 1938046 h 2270839"/>
+              <a:gd name="connsiteX7" fmla="*/ 6771159 w 8117568"/>
+              <a:gd name="connsiteY7" fmla="*/ 1980083 h 2270839"/>
+              <a:gd name="connsiteX8" fmla="*/ 6491154 w 8117568"/>
+              <a:gd name="connsiteY8" fmla="*/ 2019318 h 2270839"/>
+              <a:gd name="connsiteX9" fmla="*/ 6214834 w 8117568"/>
+              <a:gd name="connsiteY9" fmla="*/ 2052947 h 2270839"/>
+              <a:gd name="connsiteX10" fmla="*/ 5934829 w 8117568"/>
+              <a:gd name="connsiteY10" fmla="*/ 2084825 h 2270839"/>
+              <a:gd name="connsiteX11" fmla="*/ 5656053 w 8117568"/>
+              <a:gd name="connsiteY11" fmla="*/ 2113901 h 2270839"/>
+              <a:gd name="connsiteX12" fmla="*/ 5382188 w 8117568"/>
+              <a:gd name="connsiteY12" fmla="*/ 2139123 h 2270839"/>
+              <a:gd name="connsiteX13" fmla="*/ 5104640 w 8117568"/>
+              <a:gd name="connsiteY13" fmla="*/ 2164345 h 2270839"/>
+              <a:gd name="connsiteX14" fmla="*/ 4830776 w 8117568"/>
+              <a:gd name="connsiteY14" fmla="*/ 2185364 h 2270839"/>
+              <a:gd name="connsiteX15" fmla="*/ 4556912 w 8117568"/>
+              <a:gd name="connsiteY15" fmla="*/ 2201828 h 2270839"/>
+              <a:gd name="connsiteX16" fmla="*/ 4284276 w 8117568"/>
+              <a:gd name="connsiteY16" fmla="*/ 2218994 h 2270839"/>
+              <a:gd name="connsiteX17" fmla="*/ 4014096 w 8117568"/>
+              <a:gd name="connsiteY17" fmla="*/ 2233356 h 2270839"/>
+              <a:gd name="connsiteX18" fmla="*/ 3746372 w 8117568"/>
+              <a:gd name="connsiteY18" fmla="*/ 2243515 h 2270839"/>
+              <a:gd name="connsiteX19" fmla="*/ 3478648 w 8117568"/>
+              <a:gd name="connsiteY19" fmla="*/ 2252273 h 2270839"/>
+              <a:gd name="connsiteX20" fmla="*/ 3213381 w 8117568"/>
+              <a:gd name="connsiteY20" fmla="*/ 2260680 h 2270839"/>
+              <a:gd name="connsiteX21" fmla="*/ 2951798 w 8117568"/>
+              <a:gd name="connsiteY21" fmla="*/ 2264534 h 2270839"/>
+              <a:gd name="connsiteX22" fmla="*/ 2690215 w 8117568"/>
+              <a:gd name="connsiteY22" fmla="*/ 2268737 h 2270839"/>
+              <a:gd name="connsiteX23" fmla="*/ 2432316 w 8117568"/>
+              <a:gd name="connsiteY23" fmla="*/ 2270839 h 2270839"/>
+              <a:gd name="connsiteX24" fmla="*/ 2176873 w 8117568"/>
+              <a:gd name="connsiteY24" fmla="*/ 2268737 h 2270839"/>
+              <a:gd name="connsiteX25" fmla="*/ 1923887 w 8117568"/>
+              <a:gd name="connsiteY25" fmla="*/ 2268737 h 2270839"/>
+              <a:gd name="connsiteX26" fmla="*/ 1673356 w 8117568"/>
+              <a:gd name="connsiteY26" fmla="*/ 2264534 h 2270839"/>
+              <a:gd name="connsiteX27" fmla="*/ 1427738 w 8117568"/>
+              <a:gd name="connsiteY27" fmla="*/ 2258228 h 2270839"/>
+              <a:gd name="connsiteX28" fmla="*/ 1184577 w 8117568"/>
+              <a:gd name="connsiteY28" fmla="*/ 2252273 h 2270839"/>
+              <a:gd name="connsiteX29" fmla="*/ 946327 w 8117568"/>
+              <a:gd name="connsiteY29" fmla="*/ 2245617 h 2270839"/>
+              <a:gd name="connsiteX30" fmla="*/ 709305 w 8117568"/>
+              <a:gd name="connsiteY30" fmla="*/ 2235458 h 2270839"/>
+              <a:gd name="connsiteX31" fmla="*/ 475970 w 8117568"/>
+              <a:gd name="connsiteY31" fmla="*/ 2224598 h 2270839"/>
+              <a:gd name="connsiteX32" fmla="*/ 247543 w 8117568"/>
+              <a:gd name="connsiteY32" fmla="*/ 2214790 h 2270839"/>
+              <a:gd name="connsiteX33" fmla="*/ 0 w 8117568"/>
+              <a:gd name="connsiteY33" fmla="*/ 2199423 h 2270839"/>
+            </a:gdLst>
+            <a:ahLst/>
+            <a:cxnLst>
+              <a:cxn ang="0">
+                <a:pos x="connsiteX0" y="connsiteY0"/>
+              </a:cxn>
+              <a:cxn ang="0">
+                <a:pos x="connsiteX1" y="connsiteY1"/>
+              </a:cxn>
+              <a:cxn ang="0">
+                <a:pos x="connsiteX2" y="connsiteY2"/>
+              </a:cxn>
+              <a:cxn ang="0">
+                <a:pos x="connsiteX3" y="connsiteY3"/>
+              </a:cxn>
+              <a:cxn ang="0">
+                <a:pos x="connsiteX4" y="connsiteY4"/>
+              </a:cxn>
+              <a:cxn ang="0">
+                <a:pos x="connsiteX5" y="connsiteY5"/>
+              </a:cxn>
+              <a:cxn ang="0">
+                <a:pos x="connsiteX6" y="connsiteY6"/>
+              </a:cxn>
+              <a:cxn ang="0">
+                <a:pos x="connsiteX7" y="connsiteY7"/>
+              </a:cxn>
+              <a:cxn ang="0">
+                <a:pos x="connsiteX8" y="connsiteY8"/>
+              </a:cxn>
+              <a:cxn ang="0">
+                <a:pos x="connsiteX9" y="connsiteY9"/>
+              </a:cxn>
+              <a:cxn ang="0">
+                <a:pos x="connsiteX10" y="connsiteY10"/>
+              </a:cxn>
+              <a:cxn ang="0">
+                <a:pos x="connsiteX11" y="connsiteY11"/>
+              </a:cxn>
+              <a:cxn ang="0">
+                <a:pos x="connsiteX12" y="connsiteY12"/>
+              </a:cxn>
+              <a:cxn ang="0">
+                <a:pos x="connsiteX13" y="connsiteY13"/>
+              </a:cxn>
+              <a:cxn ang="0">
+                <a:pos x="connsiteX14" y="connsiteY14"/>
+              </a:cxn>
+              <a:cxn ang="0">
+                <a:pos x="connsiteX15" y="connsiteY15"/>
+              </a:cxn>
+              <a:cxn ang="0">
+                <a:pos x="connsiteX16" y="connsiteY16"/>
+              </a:cxn>
+              <a:cxn ang="0">
+                <a:pos x="connsiteX17" y="connsiteY17"/>
+              </a:cxn>
+              <a:cxn ang="0">
+                <a:pos x="connsiteX18" y="connsiteY18"/>
+              </a:cxn>
+              <a:cxn ang="0">
+                <a:pos x="connsiteX19" y="connsiteY19"/>
+              </a:cxn>
+              <a:cxn ang="0">
+                <a:pos x="connsiteX20" y="connsiteY20"/>
+              </a:cxn>
+              <a:cxn ang="0">
+                <a:pos x="connsiteX21" y="connsiteY21"/>
+              </a:cxn>
+              <a:cxn ang="0">
+                <a:pos x="connsiteX22" y="connsiteY22"/>
+              </a:cxn>
+              <a:cxn ang="0">
+                <a:pos x="connsiteX23" y="connsiteY23"/>
+              </a:cxn>
+              <a:cxn ang="0">
+                <a:pos x="connsiteX24" y="connsiteY24"/>
+              </a:cxn>
+              <a:cxn ang="0">
+                <a:pos x="connsiteX25" y="connsiteY25"/>
+              </a:cxn>
+              <a:cxn ang="0">
+                <a:pos x="connsiteX26" y="connsiteY26"/>
+              </a:cxn>
+              <a:cxn ang="0">
+                <a:pos x="connsiteX27" y="connsiteY27"/>
+              </a:cxn>
+              <a:cxn ang="0">
+                <a:pos x="connsiteX28" y="connsiteY28"/>
+              </a:cxn>
+              <a:cxn ang="0">
+                <a:pos x="connsiteX29" y="connsiteY29"/>
+              </a:cxn>
+              <a:cxn ang="0">
+                <a:pos x="connsiteX30" y="connsiteY30"/>
+              </a:cxn>
+              <a:cxn ang="0">
+                <a:pos x="connsiteX31" y="connsiteY31"/>
+              </a:cxn>
+              <a:cxn ang="0">
+                <a:pos x="connsiteX32" y="connsiteY32"/>
+              </a:cxn>
+              <a:cxn ang="0">
+                <a:pos x="connsiteX33" y="connsiteY33"/>
+              </a:cxn>
+            </a:cxnLst>
+            <a:rect l="l" t="t" r="r" b="b"/>
+            <a:pathLst>
+              <a:path w="8117568" h="2270839">
+                <a:moveTo>
+                  <a:pt x="0" y="0"/>
+                </a:moveTo>
+                <a:lnTo>
+                  <a:pt x="8117568" y="0"/>
+                </a:lnTo>
+                <a:lnTo>
+                  <a:pt x="8117568" y="1754616"/>
+                </a:lnTo>
+                <a:lnTo>
+                  <a:pt x="7886265" y="1797923"/>
+                </a:lnTo>
+                <a:lnTo>
+                  <a:pt x="7608716" y="1847667"/>
+                </a:lnTo>
+                <a:lnTo>
+                  <a:pt x="7329940" y="1896360"/>
+                </a:lnTo>
+                <a:lnTo>
+                  <a:pt x="7049935" y="1938046"/>
+                </a:lnTo>
+                <a:lnTo>
+                  <a:pt x="6771159" y="1980083"/>
+                </a:lnTo>
+                <a:lnTo>
+                  <a:pt x="6491154" y="2019318"/>
+                </a:lnTo>
+                <a:lnTo>
+                  <a:pt x="6214834" y="2052947"/>
+                </a:lnTo>
+                <a:lnTo>
+                  <a:pt x="5934829" y="2084825"/>
+                </a:lnTo>
+                <a:lnTo>
+                  <a:pt x="5656053" y="2113901"/>
+                </a:lnTo>
+                <a:lnTo>
+                  <a:pt x="5382188" y="2139123"/>
+                </a:lnTo>
+                <a:lnTo>
+                  <a:pt x="5104640" y="2164345"/>
+                </a:lnTo>
+                <a:lnTo>
+                  <a:pt x="4830776" y="2185364"/>
+                </a:lnTo>
+                <a:lnTo>
+                  <a:pt x="4556912" y="2201828"/>
+                </a:lnTo>
+                <a:lnTo>
+                  <a:pt x="4284276" y="2218994"/>
+                </a:lnTo>
+                <a:lnTo>
+                  <a:pt x="4014096" y="2233356"/>
+                </a:lnTo>
+                <a:lnTo>
+                  <a:pt x="3746372" y="2243515"/>
+                </a:lnTo>
+                <a:lnTo>
+                  <a:pt x="3478648" y="2252273"/>
+                </a:lnTo>
+                <a:lnTo>
+                  <a:pt x="3213381" y="2260680"/>
+                </a:lnTo>
+                <a:lnTo>
+                  <a:pt x="2951798" y="2264534"/>
+                </a:lnTo>
+                <a:lnTo>
+                  <a:pt x="2690215" y="2268737"/>
+                </a:lnTo>
+                <a:lnTo>
+                  <a:pt x="2432316" y="2270839"/>
+                </a:lnTo>
+                <a:lnTo>
+                  <a:pt x="2176873" y="2268737"/>
+                </a:lnTo>
+                <a:lnTo>
+                  <a:pt x="1923887" y="2268737"/>
+                </a:lnTo>
+                <a:lnTo>
+                  <a:pt x="1673356" y="2264534"/>
+                </a:lnTo>
+                <a:lnTo>
+                  <a:pt x="1427738" y="2258228"/>
+                </a:lnTo>
+                <a:lnTo>
+                  <a:pt x="1184577" y="2252273"/>
+                </a:lnTo>
+                <a:lnTo>
+                  <a:pt x="946327" y="2245617"/>
+                </a:lnTo>
+                <a:lnTo>
+                  <a:pt x="709305" y="2235458"/>
+                </a:lnTo>
+                <a:lnTo>
+                  <a:pt x="475970" y="2224598"/>
+                </a:lnTo>
+                <a:lnTo>
+                  <a:pt x="247543" y="2214790"/>
+                </a:lnTo>
+                <a:lnTo>
+                  <a:pt x="0" y="2199423"/>
+                </a:lnTo>
+                <a:close/>
+              </a:path>
+            </a:pathLst>
+          </a:custGeom>
+        </p:spPr>
+      </p:pic>
+      <p:sp>
+        <p:nvSpPr>
+          <p:cNvPr id="2" name="Title 1">
+            <a:extLst>
+              <a:ext uri="{FF2B5EF4-FFF2-40B4-BE49-F238E27FC236}">
+                <a16:creationId xmlns:a16="http://schemas.microsoft.com/office/drawing/2014/main" id="{AB02C960-1F8D-2041-68B9-D2382D1556EC}"/>
+              </a:ext>
+            </a:extLst>
+          </p:cNvPr>
+          <p:cNvSpPr>
+            <a:spLocks noGrp="1"/>
+          </p:cNvSpPr>
+          <p:nvPr>
+            <p:ph type="title"/>
+          </p:nvPr>
+        </p:nvSpPr>
+        <p:spPr>
+          <a:xfrm>
+            <a:off x="1030288" y="609600"/>
+            <a:ext cx="10131425" cy="1110343"/>
+          </a:xfrm>
+        </p:spPr>
+        <p:txBody>
+          <a:bodyPr>
+            <a:normAutofit/>
+          </a:bodyPr>
+          <a:lstStyle/>
+          <a:p>
+            <a:pPr algn="ctr"/>
+            <a:r>
+              <a:rPr lang="en-US" dirty="0">
+                <a:solidFill>
+                  <a:schemeClr val="bg1"/>
+                </a:solidFill>
+              </a:rPr>
+              <a:t>Found vs Fell meteorites</a:t>
+            </a:r>
+          </a:p>
+        </p:txBody>
+      </p:sp>
+      <p:sp>
+        <p:nvSpPr>
+          <p:cNvPr id="3" name="Content Placeholder 2">
+            <a:extLst>
+              <a:ext uri="{FF2B5EF4-FFF2-40B4-BE49-F238E27FC236}">
+                <a16:creationId xmlns:a16="http://schemas.microsoft.com/office/drawing/2014/main" id="{6C47CF8A-BCF2-120C-E1DD-FCE6C91295A3}"/>
+              </a:ext>
+            </a:extLst>
+          </p:cNvPr>
+          <p:cNvSpPr>
+            <a:spLocks noGrp="1"/>
+          </p:cNvSpPr>
+          <p:nvPr>
+            <p:ph idx="1"/>
+          </p:nvPr>
+        </p:nvSpPr>
+        <p:spPr>
+          <a:xfrm>
+            <a:off x="685802" y="2357197"/>
+            <a:ext cx="3510296" cy="4328083"/>
+          </a:xfrm>
+        </p:spPr>
+        <p:txBody>
+          <a:bodyPr>
+            <a:normAutofit fontScale="85000" lnSpcReduction="10000"/>
+          </a:bodyPr>
+          <a:lstStyle/>
+          <a:p>
+            <a:r>
+              <a:rPr lang="en-US" dirty="0"/>
+              <a:t>Fell Meteorites have been observed to have fallen.</a:t>
+            </a:r>
+          </a:p>
+          <a:p>
+            <a:pPr lvl="1"/>
+            <a:r>
+              <a:rPr lang="en-US" dirty="0"/>
+              <a:t>Meteorite rock associated with the witnessed fall event have been found</a:t>
+            </a:r>
+          </a:p>
+          <a:p>
+            <a:pPr lvl="1"/>
+            <a:r>
+              <a:rPr lang="en-US" dirty="0"/>
+              <a:t>Can be associated with a specific date when the fall </a:t>
+            </a:r>
+            <a:r>
+              <a:rPr lang="en-US" dirty="0" err="1"/>
+              <a:t>occured</a:t>
+            </a:r>
+            <a:endParaRPr lang="en-US" dirty="0"/>
+          </a:p>
+          <a:p>
+            <a:r>
+              <a:rPr lang="en-US" dirty="0"/>
+              <a:t>Found Meteorites are those that have been identified as extraterrestrial rock but are not associated with a known fall event.</a:t>
+            </a:r>
+          </a:p>
+          <a:p>
+            <a:r>
+              <a:rPr lang="en-US" dirty="0"/>
+              <a:t>Many more finds than falls exist in the database, but falls are much more useful with respect to this analysis.</a:t>
+            </a:r>
+          </a:p>
+          <a:p>
+            <a:r>
+              <a:rPr lang="en-US" dirty="0">
+                <a:hlinkClick r:id="rId3"/>
+              </a:rPr>
+              <a:t>https://www.lpi.usra.edu/meteor/docs/falls-finds.pdf</a:t>
+            </a:r>
+            <a:endParaRPr lang="en-US" dirty="0"/>
+          </a:p>
+        </p:txBody>
+      </p:sp>
+      <p:pic>
+        <p:nvPicPr>
+          <p:cNvPr id="4" name="Content Placeholder 4" descr="A graph of a number of atomic number&#10;&#10;AI-generated content may be incorrect.">
             <a:extLst>
               <a:ext uri="{FF2B5EF4-FFF2-40B4-BE49-F238E27FC236}">
                 <a16:creationId xmlns:a16="http://schemas.microsoft.com/office/drawing/2014/main" id="{F3CC48D4-0946-A3C2-BA3E-0E082AE59A85}"/>
@@ -15117,14 +19221,12 @@
             </a:extLst>
           </p:cNvPr>
           <p:cNvPicPr>
-            <a:picLocks noGrp="1" noChangeAspect="1"/>
+            <a:picLocks noChangeAspect="1"/>
           </p:cNvPicPr>
-          <p:nvPr>
-            <p:ph idx="1"/>
-          </p:nvPr>
+          <p:nvPr/>
         </p:nvPicPr>
         <p:blipFill>
-          <a:blip r:embed="rId3">
+          <a:blip r:embed="rId4">
             <a:extLst>
               <a:ext uri="{28A0092B-C50C-407E-A947-70E740481C1C}">
                 <a14:useLocalDpi xmlns:a14="http://schemas.microsoft.com/office/drawing/2010/main" val="0"/>
@@ -15137,15 +19239,18 @@
         </p:blipFill>
         <p:spPr>
           <a:xfrm>
-            <a:off x="817922" y="1552755"/>
-            <a:ext cx="10556156" cy="5278078"/>
+            <a:off x="4196097" y="2357198"/>
+            <a:ext cx="7867888" cy="3933944"/>
           </a:xfrm>
+          <a:prstGeom prst="rect">
+            <a:avLst/>
+          </a:prstGeom>
         </p:spPr>
       </p:pic>
     </p:spTree>
     <p:extLst>
       <p:ext uri="{BB962C8B-B14F-4D97-AF65-F5344CB8AC3E}">
-        <p14:creationId xmlns:p14="http://schemas.microsoft.com/office/powerpoint/2010/main" val="1700194541"/>
+        <p14:creationId xmlns:p14="http://schemas.microsoft.com/office/powerpoint/2010/main" val="59254839"/>
       </p:ext>
     </p:extLst>
   </p:cSld>
@@ -15155,7 +19260,7 @@
 </p:sld>
 </file>
 
-<file path=ppt/slides/slide7.xml><?xml version="1.0" encoding="utf-8"?>
+<file path=ppt/slides/slide9.xml><?xml version="1.0" encoding="utf-8"?>
 <p:sld xmlns:a="http://schemas.openxmlformats.org/drawingml/2006/main" xmlns:r="http://schemas.openxmlformats.org/officeDocument/2006/relationships" xmlns:p="http://schemas.openxmlformats.org/presentationml/2006/main">
   <p:cSld>
     <p:bg>
@@ -15744,7 +19849,7 @@
       </p:sp>
       <p:pic>
         <p:nvPicPr>
-          <p:cNvPr id="16" name="Content Placeholder 15" descr="A graph of different colored bars&#10;&#10;AI-generated content may be incorrect.">
+          <p:cNvPr id="5" name="Content Placeholder 15" descr="A graph of different colored bars&#10;&#10;AI-generated content may be incorrect.">
             <a:extLst>
               <a:ext uri="{FF2B5EF4-FFF2-40B4-BE49-F238E27FC236}">
                 <a16:creationId xmlns:a16="http://schemas.microsoft.com/office/drawing/2014/main" id="{07BE12F0-D246-0672-651A-288EDD720CEE}"/>
@@ -15772,9 +19877,12 @@
         </p:blipFill>
         <p:spPr>
           <a:xfrm>
-            <a:off x="86736" y="154031"/>
-            <a:ext cx="8440784" cy="6330588"/>
+            <a:off x="198262" y="295002"/>
+            <a:ext cx="8214218" cy="6160664"/>
           </a:xfrm>
+          <a:prstGeom prst="rect">
+            <a:avLst/>
+          </a:prstGeom>
         </p:spPr>
       </p:pic>
     </p:spTree>
@@ -15786,134 +19894,6 @@
   </p:cSld>
   <p:clrMapOvr>
     <a:overrideClrMapping bg1="lt1" tx1="dk1" bg2="lt2" tx2="dk2" accent1="accent1" accent2="accent2" accent3="accent3" accent4="accent4" accent5="accent5" accent6="accent6" hlink="hlink" folHlink="folHlink"/>
-  </p:clrMapOvr>
-</p:sld>
-</file>
-
-<file path=ppt/slides/slide8.xml><?xml version="1.0" encoding="utf-8"?>
-<p:sld xmlns:a="http://schemas.openxmlformats.org/drawingml/2006/main" xmlns:r="http://schemas.openxmlformats.org/officeDocument/2006/relationships" xmlns:p="http://schemas.openxmlformats.org/presentationml/2006/main">
-  <p:cSld>
-    <p:spTree>
-      <p:nvGrpSpPr>
-        <p:cNvPr id="1" name=""/>
-        <p:cNvGrpSpPr/>
-        <p:nvPr/>
-      </p:nvGrpSpPr>
-      <p:grpSpPr>
-        <a:xfrm>
-          <a:off x="0" y="0"/>
-          <a:ext cx="0" cy="0"/>
-          <a:chOff x="0" y="0"/>
-          <a:chExt cx="0" cy="0"/>
-        </a:xfrm>
-      </p:grpSpPr>
-      <p:sp>
-        <p:nvSpPr>
-          <p:cNvPr id="2" name="Title 1">
-            <a:extLst>
-              <a:ext uri="{FF2B5EF4-FFF2-40B4-BE49-F238E27FC236}">
-                <a16:creationId xmlns:a16="http://schemas.microsoft.com/office/drawing/2014/main" id="{9375814D-7DB3-6DDD-B456-A716BD5DE6EC}"/>
-              </a:ext>
-            </a:extLst>
-          </p:cNvPr>
-          <p:cNvSpPr>
-            <a:spLocks noGrp="1"/>
-          </p:cNvSpPr>
-          <p:nvPr>
-            <p:ph type="title"/>
-          </p:nvPr>
-        </p:nvSpPr>
-        <p:spPr/>
-        <p:txBody>
-          <a:bodyPr/>
-          <a:lstStyle/>
-          <a:p>
-            <a:r>
-              <a:rPr lang="en-US" dirty="0"/>
-              <a:t>Interactive Map</a:t>
-            </a:r>
-          </a:p>
-        </p:txBody>
-      </p:sp>
-      <p:graphicFrame>
-        <p:nvGraphicFramePr>
-          <p:cNvPr id="8" name="Content Placeholder 7">
-            <a:extLst>
-              <a:ext uri="{FF2B5EF4-FFF2-40B4-BE49-F238E27FC236}">
-                <a16:creationId xmlns:a16="http://schemas.microsoft.com/office/drawing/2014/main" id="{25A9274E-9FEC-EBCA-3855-54B1D262D654}"/>
-              </a:ext>
-            </a:extLst>
-          </p:cNvPr>
-          <p:cNvGraphicFramePr>
-            <a:graphicFrameLocks noGrp="1" noChangeAspect="1"/>
-          </p:cNvGraphicFramePr>
-          <p:nvPr>
-            <p:ph idx="1"/>
-            <p:extLst>
-              <p:ext uri="{D42A27DB-BD31-4B8C-83A1-F6EECF244321}">
-                <p14:modId xmlns:p14="http://schemas.microsoft.com/office/powerpoint/2010/main" val="835755214"/>
-              </p:ext>
-            </p:extLst>
-          </p:nvPr>
-        </p:nvGraphicFramePr>
-        <p:xfrm>
-          <a:off x="5020627" y="3232400"/>
-          <a:ext cx="2150746" cy="892560"/>
-        </p:xfrm>
-        <a:graphic>
-          <a:graphicData uri="http://schemas.openxmlformats.org/presentationml/2006/ole">
-            <mc:AlternateContent xmlns:mc="http://schemas.openxmlformats.org/markup-compatibility/2006">
-              <mc:Choice xmlns:v="urn:schemas-microsoft-com:vml" Requires="v">
-                <p:oleObj name="Packager Shell Object" showAsIcon="1" r:id="rId2" imgW="1270099" imgH="526962" progId="Package">
-                  <p:embed/>
-                </p:oleObj>
-              </mc:Choice>
-              <mc:Fallback>
-                <p:oleObj name="Packager Shell Object" showAsIcon="1" r:id="rId2" imgW="1270099" imgH="526962" progId="Package">
-                  <p:embed/>
-                  <p:pic>
-                    <p:nvPicPr>
-                      <p:cNvPr id="8" name="Content Placeholder 7">
-                        <a:extLst>
-                          <a:ext uri="{FF2B5EF4-FFF2-40B4-BE49-F238E27FC236}">
-                            <a16:creationId xmlns:a16="http://schemas.microsoft.com/office/drawing/2014/main" id="{25A9274E-9FEC-EBCA-3855-54B1D262D654}"/>
-                          </a:ext>
-                        </a:extLst>
-                      </p:cNvPr>
-                      <p:cNvPicPr/>
-                      <p:nvPr/>
-                    </p:nvPicPr>
-                    <p:blipFill>
-                      <a:blip r:embed="rId3"/>
-                      <a:stretch>
-                        <a:fillRect/>
-                      </a:stretch>
-                    </p:blipFill>
-                    <p:spPr>
-                      <a:xfrm>
-                        <a:off x="5020627" y="3232400"/>
-                        <a:ext cx="2150746" cy="892560"/>
-                      </a:xfrm>
-                      <a:prstGeom prst="rect">
-                        <a:avLst/>
-                      </a:prstGeom>
-                    </p:spPr>
-                  </p:pic>
-                </p:oleObj>
-              </mc:Fallback>
-            </mc:AlternateContent>
-          </a:graphicData>
-        </a:graphic>
-      </p:graphicFrame>
-    </p:spTree>
-    <p:extLst>
-      <p:ext uri="{BB962C8B-B14F-4D97-AF65-F5344CB8AC3E}">
-        <p14:creationId xmlns:p14="http://schemas.microsoft.com/office/powerpoint/2010/main" val="1364987764"/>
-      </p:ext>
-    </p:extLst>
-  </p:cSld>
-  <p:clrMapOvr>
-    <a:masterClrMapping/>
   </p:clrMapOvr>
 </p:sld>
 </file>

</xml_diff>

<commit_message>
replaced thunder analysis scripts with .py and a placeholder .py for average calculations; updates to presentation and README to reflect new scripts
</commit_message>
<xml_diff>
--- a/Mjolnir Group Presentation.pptx
+++ b/Mjolnir Group Presentation.pptx
@@ -3663,7 +3663,7 @@
           <a:p>
             <a:fld id="{846CE7D5-CF57-46EF-B807-FDD0502418D4}" type="datetimeFigureOut">
               <a:rPr lang="en-US" smtClean="0"/>
-              <a:t>9/12/2025</a:t>
+              <a:t>9/18/2025</a:t>
             </a:fld>
             <a:endParaRPr lang="en-US"/>
           </a:p>
@@ -3997,7 +3997,7 @@
           <a:p>
             <a:fld id="{846CE7D5-CF57-46EF-B807-FDD0502418D4}" type="datetimeFigureOut">
               <a:rPr lang="en-US" smtClean="0"/>
-              <a:t>9/12/2025</a:t>
+              <a:t>9/18/2025</a:t>
             </a:fld>
             <a:endParaRPr lang="en-US"/>
           </a:p>
@@ -4275,7 +4275,7 @@
           <a:p>
             <a:fld id="{846CE7D5-CF57-46EF-B807-FDD0502418D4}" type="datetimeFigureOut">
               <a:rPr lang="en-US" smtClean="0"/>
-              <a:t>9/12/2025</a:t>
+              <a:t>9/18/2025</a:t>
             </a:fld>
             <a:endParaRPr lang="en-US"/>
           </a:p>
@@ -4843,7 +4843,7 @@
           <a:p>
             <a:fld id="{846CE7D5-CF57-46EF-B807-FDD0502418D4}" type="datetimeFigureOut">
               <a:rPr lang="en-US" smtClean="0"/>
-              <a:t>9/12/2025</a:t>
+              <a:t>9/18/2025</a:t>
             </a:fld>
             <a:endParaRPr lang="en-US"/>
           </a:p>
@@ -5121,7 +5121,7 @@
           <a:p>
             <a:fld id="{846CE7D5-CF57-46EF-B807-FDD0502418D4}" type="datetimeFigureOut">
               <a:rPr lang="en-US" smtClean="0"/>
-              <a:t>9/12/2025</a:t>
+              <a:t>9/18/2025</a:t>
             </a:fld>
             <a:endParaRPr lang="en-US"/>
           </a:p>
@@ -5683,7 +5683,7 @@
           <a:p>
             <a:fld id="{846CE7D5-CF57-46EF-B807-FDD0502418D4}" type="datetimeFigureOut">
               <a:rPr lang="en-US" smtClean="0"/>
-              <a:t>9/12/2025</a:t>
+              <a:t>9/18/2025</a:t>
             </a:fld>
             <a:endParaRPr lang="en-US"/>
           </a:p>
@@ -6010,7 +6010,7 @@
           <a:p>
             <a:fld id="{846CE7D5-CF57-46EF-B807-FDD0502418D4}" type="datetimeFigureOut">
               <a:rPr lang="en-US" smtClean="0"/>
-              <a:t>9/12/2025</a:t>
+              <a:t>9/18/2025</a:t>
             </a:fld>
             <a:endParaRPr lang="en-US"/>
           </a:p>
@@ -6187,7 +6187,7 @@
           <a:p>
             <a:fld id="{846CE7D5-CF57-46EF-B807-FDD0502418D4}" type="datetimeFigureOut">
               <a:rPr lang="en-US" smtClean="0"/>
-              <a:t>9/12/2025</a:t>
+              <a:t>9/18/2025</a:t>
             </a:fld>
             <a:endParaRPr lang="en-US"/>
           </a:p>
@@ -6425,7 +6425,7 @@
           <a:p>
             <a:fld id="{846CE7D5-CF57-46EF-B807-FDD0502418D4}" type="datetimeFigureOut">
               <a:rPr lang="en-US" smtClean="0"/>
-              <a:t>9/12/2025</a:t>
+              <a:t>9/18/2025</a:t>
             </a:fld>
             <a:endParaRPr lang="en-US"/>
           </a:p>
@@ -6625,7 +6625,7 @@
           <a:p>
             <a:fld id="{846CE7D5-CF57-46EF-B807-FDD0502418D4}" type="datetimeFigureOut">
               <a:rPr lang="en-US" smtClean="0"/>
-              <a:t>9/12/2025</a:t>
+              <a:t>9/18/2025</a:t>
             </a:fld>
             <a:endParaRPr lang="en-US"/>
           </a:p>
@@ -6901,7 +6901,7 @@
           <a:p>
             <a:fld id="{846CE7D5-CF57-46EF-B807-FDD0502418D4}" type="datetimeFigureOut">
               <a:rPr lang="en-US" smtClean="0"/>
-              <a:t>9/12/2025</a:t>
+              <a:t>9/18/2025</a:t>
             </a:fld>
             <a:endParaRPr lang="en-US"/>
           </a:p>
@@ -7167,7 +7167,7 @@
           <a:p>
             <a:fld id="{846CE7D5-CF57-46EF-B807-FDD0502418D4}" type="datetimeFigureOut">
               <a:rPr lang="en-US" smtClean="0"/>
-              <a:t>9/12/2025</a:t>
+              <a:t>9/18/2025</a:t>
             </a:fld>
             <a:endParaRPr lang="en-US"/>
           </a:p>
@@ -7541,7 +7541,7 @@
           <a:p>
             <a:fld id="{846CE7D5-CF57-46EF-B807-FDD0502418D4}" type="datetimeFigureOut">
               <a:rPr lang="en-US" smtClean="0"/>
-              <a:t>9/12/2025</a:t>
+              <a:t>9/18/2025</a:t>
             </a:fld>
             <a:endParaRPr lang="en-US"/>
           </a:p>
@@ -7689,7 +7689,7 @@
           <a:p>
             <a:fld id="{846CE7D5-CF57-46EF-B807-FDD0502418D4}" type="datetimeFigureOut">
               <a:rPr lang="en-US" smtClean="0"/>
-              <a:t>9/12/2025</a:t>
+              <a:t>9/18/2025</a:t>
             </a:fld>
             <a:endParaRPr lang="en-US"/>
           </a:p>
@@ -7814,7 +7814,7 @@
           <a:p>
             <a:fld id="{846CE7D5-CF57-46EF-B807-FDD0502418D4}" type="datetimeFigureOut">
               <a:rPr lang="en-US" smtClean="0"/>
-              <a:t>9/12/2025</a:t>
+              <a:t>9/18/2025</a:t>
             </a:fld>
             <a:endParaRPr lang="en-US"/>
           </a:p>
@@ -8099,7 +8099,7 @@
           <a:p>
             <a:fld id="{846CE7D5-CF57-46EF-B807-FDD0502418D4}" type="datetimeFigureOut">
               <a:rPr lang="en-US" smtClean="0"/>
-              <a:t>9/12/2025</a:t>
+              <a:t>9/18/2025</a:t>
             </a:fld>
             <a:endParaRPr lang="en-US"/>
           </a:p>
@@ -8423,7 +8423,7 @@
           <a:p>
             <a:fld id="{846CE7D5-CF57-46EF-B807-FDD0502418D4}" type="datetimeFigureOut">
               <a:rPr lang="en-US" smtClean="0"/>
-              <a:t>9/12/2025</a:t>
+              <a:t>9/18/2025</a:t>
             </a:fld>
             <a:endParaRPr lang="en-US"/>
           </a:p>
@@ -8637,7 +8637,7 @@
           <a:p>
             <a:fld id="{846CE7D5-CF57-46EF-B807-FDD0502418D4}" type="datetimeFigureOut">
               <a:rPr lang="en-US" smtClean="0"/>
-              <a:t>9/12/2025</a:t>
+              <a:t>9/18/2025</a:t>
             </a:fld>
             <a:endParaRPr lang="en-US"/>
           </a:p>
@@ -10308,7 +10308,7 @@
           </p:nvPr>
         </p:nvPicPr>
         <p:blipFill rotWithShape="1">
-          <a:blip r:embed="rId3">
+          <a:blip r:embed="rId4" cstate="print">
             <a:extLst>
               <a:ext uri="{28A0092B-C50C-407E-A947-70E740481C1C}">
                 <a14:useLocalDpi xmlns:a14="http://schemas.microsoft.com/office/drawing/2010/main" val="0"/>
@@ -14465,7 +14465,7 @@
         <p:spPr>
           <a:xfrm>
             <a:off x="565029" y="4992012"/>
-            <a:ext cx="2195423" cy="369332"/>
+            <a:ext cx="2195423" cy="646331"/>
           </a:xfrm>
           <a:prstGeom prst="rect">
             <a:avLst/>
@@ -14479,10 +14479,15 @@
           <a:lstStyle/>
           <a:p>
             <a:r>
-              <a:rPr lang="en-US" dirty="0" err="1"/>
-              <a:t>Weather_Data.ipynb</a:t>
+              <a:rPr lang="en-US" dirty="0"/>
+              <a:t>download_data.py</a:t>
             </a:r>
-            <a:endParaRPr lang="en-US" dirty="0"/>
+          </a:p>
+          <a:p>
+            <a:r>
+              <a:rPr lang="en-US" dirty="0"/>
+              <a:t>unzip_data.py</a:t>
+            </a:r>
           </a:p>
         </p:txBody>
       </p:sp>
@@ -14500,8 +14505,8 @@
         </p:nvSpPr>
         <p:spPr>
           <a:xfrm>
-            <a:off x="2713036" y="4992014"/>
-            <a:ext cx="3260605" cy="369330"/>
+            <a:off x="3358401" y="4992012"/>
+            <a:ext cx="3260605" cy="646331"/>
           </a:xfrm>
           <a:prstGeom prst="rect">
             <a:avLst/>
@@ -14515,10 +14520,15 @@
           <a:lstStyle/>
           <a:p>
             <a:r>
-              <a:rPr lang="en-US" dirty="0" err="1"/>
-              <a:t>Thunder_data_per_station.ipynb</a:t>
+              <a:rPr lang="en-US" dirty="0"/>
+              <a:t>thunder_counts.py</a:t>
             </a:r>
-            <a:endParaRPr lang="en-US" dirty="0"/>
+          </a:p>
+          <a:p>
+            <a:r>
+              <a:rPr lang="en-US" dirty="0"/>
+              <a:t>thunder_averages.py</a:t>
+            </a:r>
           </a:p>
         </p:txBody>
       </p:sp>
@@ -19166,27 +19176,22 @@
           <a:p>
             <a:r>
               <a:rPr lang="en-US" dirty="0"/>
-              <a:t>Fell Meteorites have been observed to have fallen.</a:t>
+              <a:t>Fell Meteorites are those meteorites have been observed to have fallen.</a:t>
             </a:r>
           </a:p>
           <a:p>
             <a:pPr lvl="1"/>
             <a:r>
               <a:rPr lang="en-US" dirty="0"/>
-              <a:t>Meteorite rock associated with the witnessed fall event have been found</a:t>
+              <a:t>Meteorite rock associated with the witnessed fall event has been found</a:t>
             </a:r>
           </a:p>
           <a:p>
             <a:pPr lvl="1"/>
             <a:r>
               <a:rPr lang="en-US" dirty="0"/>
-              <a:t>Can be associated with a specific date when the fall </a:t>
+              <a:t>Can be associated with a specific date when the fall occurred</a:t>
             </a:r>
-            <a:r>
-              <a:rPr lang="en-US" dirty="0" err="1"/>
-              <a:t>occured</a:t>
-            </a:r>
-            <a:endParaRPr lang="en-US" dirty="0"/>
           </a:p>
           <a:p>
             <a:r>

</xml_diff>

<commit_message>
clarifications on in-progress work
</commit_message>
<xml_diff>
--- a/Mjolnir Group Presentation.pptx
+++ b/Mjolnir Group Presentation.pptx
@@ -14505,8 +14505,8 @@
         </p:nvSpPr>
         <p:spPr>
           <a:xfrm>
-            <a:off x="3358401" y="4992012"/>
-            <a:ext cx="3260605" cy="646331"/>
+            <a:off x="2957869" y="4992012"/>
+            <a:ext cx="3260605" cy="1200329"/>
           </a:xfrm>
           <a:prstGeom prst="rect">
             <a:avLst/>
@@ -14518,6 +14518,19 @@
             <a:spAutoFit/>
           </a:bodyPr>
           <a:lstStyle/>
+          <a:p>
+            <a:r>
+              <a:rPr lang="en-US" dirty="0" err="1"/>
+              <a:t>Thunder_data_per_station.ipynb</a:t>
+            </a:r>
+            <a:endParaRPr lang="en-US" dirty="0"/>
+          </a:p>
+          <a:p>
+            <a:r>
+              <a:rPr lang="en-US" dirty="0"/>
+              <a:t>	currently being converted:</a:t>
+            </a:r>
+          </a:p>
           <a:p>
             <a:r>
               <a:rPr lang="en-US" dirty="0"/>

</xml_diff>